<commit_message>
updating UA examples to UA
</commit_message>
<xml_diff>
--- a/IBFE Lectures/1-IBFE Getting Starting and Visualizing a Mesh.pptx
+++ b/IBFE Lectures/1-IBFE Getting Starting and Visualizing a Mesh.pptx
@@ -6,7 +6,7 @@
     <p:sldMasterId id="2147483666" r:id="rId2"/>
   </p:sldMasterIdLst>
   <p:notesMasterIdLst>
-    <p:notesMasterId r:id="rId27"/>
+    <p:notesMasterId r:id="rId28"/>
   </p:notesMasterIdLst>
   <p:sldIdLst>
     <p:sldId id="256" r:id="rId3"/>
@@ -19,20 +19,21 @@
     <p:sldId id="264" r:id="rId10"/>
     <p:sldId id="265" r:id="rId11"/>
     <p:sldId id="266" r:id="rId12"/>
-    <p:sldId id="267" r:id="rId13"/>
-    <p:sldId id="268" r:id="rId14"/>
-    <p:sldId id="271" r:id="rId15"/>
-    <p:sldId id="272" r:id="rId16"/>
-    <p:sldId id="273" r:id="rId17"/>
-    <p:sldId id="274" r:id="rId18"/>
-    <p:sldId id="275" r:id="rId19"/>
-    <p:sldId id="276" r:id="rId20"/>
-    <p:sldId id="277" r:id="rId21"/>
-    <p:sldId id="278" r:id="rId22"/>
-    <p:sldId id="279" r:id="rId23"/>
-    <p:sldId id="280" r:id="rId24"/>
-    <p:sldId id="281" r:id="rId25"/>
-    <p:sldId id="282" r:id="rId26"/>
+    <p:sldId id="284" r:id="rId13"/>
+    <p:sldId id="283" r:id="rId14"/>
+    <p:sldId id="268" r:id="rId15"/>
+    <p:sldId id="271" r:id="rId16"/>
+    <p:sldId id="272" r:id="rId17"/>
+    <p:sldId id="273" r:id="rId18"/>
+    <p:sldId id="274" r:id="rId19"/>
+    <p:sldId id="275" r:id="rId20"/>
+    <p:sldId id="276" r:id="rId21"/>
+    <p:sldId id="277" r:id="rId22"/>
+    <p:sldId id="278" r:id="rId23"/>
+    <p:sldId id="279" r:id="rId24"/>
+    <p:sldId id="280" r:id="rId25"/>
+    <p:sldId id="281" r:id="rId26"/>
+    <p:sldId id="282" r:id="rId27"/>
   </p:sldIdLst>
   <p:sldSz cx="9144000" cy="6858000" type="screen4x3"/>
   <p:notesSz cx="6858000" cy="9144000"/>
@@ -1019,6 +1020,11 @@
         </p:txBody>
       </p:sp>
     </p:spTree>
+    <p:extLst>
+      <p:ext uri="{BB962C8B-B14F-4D97-AF65-F5344CB8AC3E}">
+        <p14:creationId xmlns:p14="http://schemas.microsoft.com/office/powerpoint/2010/main" val="3053817763"/>
+      </p:ext>
+    </p:extLst>
   </p:cSld>
   <p:clrMapOvr>
     <a:masterClrMapping/>
@@ -19707,15 +19713,7 @@
             </a:r>
             <a:r>
               <a:rPr lang="en-US" sz="1400" dirty="0"/>
-              <a:t> double mu = 10.0; </a:t>
-            </a:r>
-            <a:r>
-              <a:rPr lang="en-US" sz="1400" dirty="0" smtClean="0"/>
-              <a:t>	//</a:t>
-            </a:r>
-            <a:r>
-              <a:rPr lang="en-US" sz="1400" dirty="0"/>
-              <a:t>Elastic modulus of the beam</a:t>
+              <a:t> double mu = 10.0; 	//Elastic modulus of the beam</a:t>
             </a:r>
             <a:endParaRPr sz="1400" dirty="0"/>
           </a:p>
@@ -19744,15 +19742,7 @@
             </a:r>
             <a:r>
               <a:rPr lang="en-US" sz="1400" dirty="0"/>
-              <a:t> = 1.0e6</a:t>
-            </a:r>
-            <a:r>
-              <a:rPr lang="en-US" sz="1400" dirty="0" smtClean="0"/>
-              <a:t>;	// </a:t>
-            </a:r>
-            <a:r>
-              <a:rPr lang="en-US" sz="1400" dirty="0"/>
-              <a:t>body force spring constant for applying a tether force</a:t>
+              <a:t> = 1.0e6;	// body force spring constant for applying a tether force</a:t>
             </a:r>
             <a:endParaRPr sz="1400" dirty="0"/>
           </a:p>
@@ -19794,7 +19784,6 @@
               <a:rPr lang="en-US" sz="1400" dirty="0"/>
               <a:t>&lt;double&gt;&amp; F,    </a:t>
             </a:r>
-            <a:endParaRPr lang="en-US" sz="1400" dirty="0" smtClean="0"/>
           </a:p>
           <a:p>
             <a:pPr marL="0" lvl="0" indent="0">
@@ -19802,11 +19791,11 @@
               <a:buNone/>
             </a:pPr>
             <a:r>
-              <a:rPr lang="en-US" sz="1400" dirty="0" err="1" smtClean="0"/>
+              <a:rPr lang="en-US" sz="1400" dirty="0" err="1"/>
               <a:t>const</a:t>
             </a:r>
             <a:r>
-              <a:rPr lang="en-US" sz="1400" dirty="0" smtClean="0"/>
+              <a:rPr lang="en-US" sz="1400" dirty="0"/>
               <a:t> </a:t>
             </a:r>
             <a:r>
@@ -19817,7 +19806,6 @@
               <a:rPr lang="en-US" sz="1400" dirty="0"/>
               <a:t>&lt;double&gt;&amp; /*FF*/,    </a:t>
             </a:r>
-            <a:endParaRPr lang="en-US" sz="1400" dirty="0" smtClean="0"/>
           </a:p>
           <a:p>
             <a:pPr marL="0" lvl="0" indent="0">
@@ -19825,11 +19813,11 @@
               <a:buNone/>
             </a:pPr>
             <a:r>
-              <a:rPr lang="en-US" sz="1400" dirty="0" err="1" smtClean="0"/>
+              <a:rPr lang="en-US" sz="1400" dirty="0" err="1"/>
               <a:t>const</a:t>
             </a:r>
             <a:r>
-              <a:rPr lang="en-US" sz="1400" dirty="0" smtClean="0"/>
+              <a:rPr lang="en-US" sz="1400" dirty="0"/>
               <a:t> </a:t>
             </a:r>
             <a:r>
@@ -19840,7 +19828,6 @@
               <a:rPr lang="en-US" sz="1400" dirty="0"/>
               <a:t>::Point&amp; X,    </a:t>
             </a:r>
-            <a:endParaRPr lang="en-US" sz="1400" dirty="0" smtClean="0"/>
           </a:p>
           <a:p>
             <a:pPr marL="0" lvl="0" indent="0">
@@ -19848,11 +19835,11 @@
               <a:buNone/>
             </a:pPr>
             <a:r>
-              <a:rPr lang="en-US" sz="1400" dirty="0" err="1" smtClean="0"/>
+              <a:rPr lang="en-US" sz="1400" dirty="0" err="1"/>
               <a:t>const</a:t>
             </a:r>
             <a:r>
-              <a:rPr lang="en-US" sz="1400" dirty="0" smtClean="0"/>
+              <a:rPr lang="en-US" sz="1400" dirty="0"/>
               <a:t> </a:t>
             </a:r>
             <a:r>
@@ -19863,7 +19850,6 @@
               <a:rPr lang="en-US" sz="1400" dirty="0"/>
               <a:t>::Point&amp; s,    </a:t>
             </a:r>
-            <a:endParaRPr lang="en-US" sz="1400" dirty="0" smtClean="0"/>
           </a:p>
           <a:p>
             <a:pPr marL="0" lvl="0" indent="0">
@@ -19871,12 +19857,8 @@
               <a:buNone/>
             </a:pPr>
             <a:r>
-              <a:rPr lang="en-US" sz="1400" dirty="0" smtClean="0"/>
-              <a:t>Elem</a:t>
-            </a:r>
-            <a:r>
               <a:rPr lang="en-US" sz="1400" dirty="0"/>
-              <a:t>* </a:t>
+              <a:t>Elem* </a:t>
             </a:r>
             <a:r>
               <a:rPr lang="en-US" sz="1400" dirty="0" err="1"/>
@@ -19894,7 +19876,6 @@
               <a:rPr lang="en-US" sz="1400" dirty="0"/>
               <a:t>*/,    </a:t>
             </a:r>
-            <a:endParaRPr lang="en-US" sz="1400" dirty="0" smtClean="0"/>
           </a:p>
           <a:p>
             <a:pPr marL="0" lvl="0" indent="0">
@@ -19902,11 +19883,11 @@
               <a:buNone/>
             </a:pPr>
             <a:r>
-              <a:rPr lang="en-US" sz="1400" dirty="0" err="1" smtClean="0"/>
+              <a:rPr lang="en-US" sz="1400" dirty="0" err="1"/>
               <a:t>const</a:t>
             </a:r>
             <a:r>
-              <a:rPr lang="en-US" sz="1400" dirty="0" smtClean="0"/>
+              <a:rPr lang="en-US" sz="1400" dirty="0"/>
               <a:t> </a:t>
             </a:r>
             <a:r>
@@ -19941,7 +19922,6 @@
               <a:rPr lang="en-US" sz="1400" dirty="0"/>
               <a:t>*/,    </a:t>
             </a:r>
-            <a:endParaRPr lang="en-US" sz="1400" dirty="0" smtClean="0"/>
           </a:p>
           <a:p>
             <a:pPr marL="0" lvl="0" indent="0">
@@ -19949,11 +19929,11 @@
               <a:buNone/>
             </a:pPr>
             <a:r>
-              <a:rPr lang="en-US" sz="1400" dirty="0" err="1" smtClean="0"/>
+              <a:rPr lang="en-US" sz="1400" dirty="0" err="1"/>
               <a:t>const</a:t>
             </a:r>
             <a:r>
-              <a:rPr lang="en-US" sz="1400" dirty="0" smtClean="0"/>
+              <a:rPr lang="en-US" sz="1400" dirty="0"/>
               <a:t> </a:t>
             </a:r>
             <a:r>
@@ -19996,7 +19976,6 @@
               <a:rPr lang="en-US" sz="1400" dirty="0"/>
               <a:t>*/,   </a:t>
             </a:r>
-            <a:endParaRPr lang="en-US" sz="1400" dirty="0" smtClean="0"/>
           </a:p>
           <a:p>
             <a:pPr marL="0" lvl="0" indent="0">
@@ -20004,14 +19983,9 @@
               <a:buNone/>
             </a:pPr>
             <a:r>
-              <a:rPr lang="en-US" sz="1400" dirty="0" smtClean="0"/>
-              <a:t>double </a:t>
-            </a:r>
-            <a:r>
               <a:rPr lang="en-US" sz="1400" dirty="0"/>
-              <a:t>time,	</a:t>
-            </a:r>
-            <a:endParaRPr lang="en-US" sz="1400" dirty="0" smtClean="0"/>
+              <a:t>double time,	</a:t>
+            </a:r>
           </a:p>
           <a:p>
             <a:pPr marL="0" lvl="0" indent="0">
@@ -20019,12 +19993,8 @@
               <a:buNone/>
             </a:pPr>
             <a:r>
-              <a:rPr lang="en-US" sz="1400" dirty="0" smtClean="0"/>
-              <a:t>void</a:t>
-            </a:r>
-            <a:r>
               <a:rPr lang="en-US" sz="1400" dirty="0"/>
-              <a:t>* /*</a:t>
+              <a:t>void* /*</a:t>
             </a:r>
             <a:r>
               <a:rPr lang="en-US" sz="1400" dirty="0" err="1"/>
@@ -20144,7 +20114,7 @@
               <a:buFont typeface="Arial"/>
               <a:buNone/>
             </a:pPr>
-            <a:endParaRPr lang="en-US" sz="1400" dirty="0" smtClean="0"/>
+            <a:endParaRPr lang="en-US" sz="1400" dirty="0"/>
           </a:p>
           <a:p>
             <a:pPr marL="0" lvl="0" indent="0">
@@ -20152,14 +20122,30 @@
               <a:buNone/>
             </a:pPr>
             <a:r>
+              <a:rPr lang="en-US" sz="1400" dirty="0" err="1"/>
+              <a:t>libMesh</a:t>
+            </a:r>
+            <a:r>
               <a:rPr lang="en-US" sz="1400" dirty="0"/>
-              <a:t>if(s(0)&gt;0.0</a:t>
-            </a:r>
-            <a:r>
-              <a:rPr lang="en-US" sz="1400" dirty="0" smtClean="0"/>
-              <a:t>){</a:t>
-            </a:r>
-            <a:endParaRPr sz="1400" dirty="0" smtClean="0"/>
+              <a:t>::Point </a:t>
+            </a:r>
+            <a:r>
+              <a:rPr lang="en-US" sz="1400" dirty="0" err="1"/>
+              <a:t>s_dump</a:t>
+            </a:r>
+            <a:r>
+              <a:rPr lang="en-US" sz="1400" dirty="0"/>
+              <a:t>;   //</a:t>
+            </a:r>
+            <a:r>
+              <a:rPr lang="en-US" sz="1400" dirty="0" err="1"/>
+              <a:t>s_dump</a:t>
+            </a:r>
+            <a:r>
+              <a:rPr lang="en-US" sz="1400" dirty="0"/>
+              <a:t> is the target point position</a:t>
+            </a:r>
+            <a:endParaRPr sz="1400" dirty="0"/>
           </a:p>
           <a:p>
             <a:pPr marL="0" lvl="0" indent="0" algn="l" rtl="0">
@@ -20177,34 +20163,10 @@
               <a:buNone/>
             </a:pPr>
             <a:r>
-              <a:rPr lang="en-US" sz="1400" dirty="0" smtClean="0"/>
-              <a:t>  </a:t>
-            </a:r>
-            <a:r>
-              <a:rPr lang="en-US" sz="1400" dirty="0" err="1" smtClean="0"/>
-              <a:t>libMesh</a:t>
-            </a:r>
-            <a:r>
-              <a:rPr lang="en-US" sz="1400" dirty="0" smtClean="0"/>
-              <a:t>::Point </a:t>
-            </a:r>
-            <a:r>
-              <a:rPr lang="en-US" sz="1400" dirty="0" err="1" smtClean="0"/>
-              <a:t>s_dump</a:t>
-            </a:r>
-            <a:r>
-              <a:rPr lang="en-US" sz="1400" dirty="0" smtClean="0"/>
-              <a:t>;   //</a:t>
-            </a:r>
-            <a:r>
-              <a:rPr lang="en-US" sz="1400" dirty="0" err="1" smtClean="0"/>
-              <a:t>s_dump</a:t>
-            </a:r>
-            <a:r>
-              <a:rPr lang="en-US" sz="1400" dirty="0" smtClean="0"/>
-              <a:t> is the target point position</a:t>
-            </a:r>
-            <a:endParaRPr sz="1400" dirty="0" smtClean="0"/>
+              <a:rPr lang="en-US" sz="1400" dirty="0"/>
+              <a:t>	if(time&lt;1)  //This will move the beam up with a speed of 0.5 from 0&lt;t&lt;1	 </a:t>
+            </a:r>
+            <a:endParaRPr sz="1400" dirty="0"/>
           </a:p>
           <a:p>
             <a:pPr marL="0" lvl="0" indent="0" algn="l" rtl="0">
@@ -20222,10 +20184,10 @@
               <a:buNone/>
             </a:pPr>
             <a:r>
-              <a:rPr lang="en-US" sz="1400" dirty="0" smtClean="0"/>
-              <a:t>	if(time&lt;1)  //This will move the beam up with a speed of 0.5 from 0&lt;t&lt;1	 </a:t>
-            </a:r>
-            <a:endParaRPr sz="1400" dirty="0" smtClean="0"/>
+              <a:rPr lang="en-US" sz="1400" dirty="0"/>
+              <a:t>    {</a:t>
+            </a:r>
+            <a:endParaRPr sz="1400" dirty="0"/>
           </a:p>
           <a:p>
             <a:pPr marL="0" lvl="0" indent="0" algn="l" rtl="0">
@@ -20243,10 +20205,18 @@
               <a:buNone/>
             </a:pPr>
             <a:r>
-              <a:rPr lang="en-US" sz="1400" dirty="0" smtClean="0"/>
-              <a:t>    {</a:t>
-            </a:r>
-            <a:endParaRPr sz="1400" dirty="0" smtClean="0"/>
+              <a:rPr lang="en-US" sz="1400" dirty="0"/>
+              <a:t>      </a:t>
+            </a:r>
+            <a:r>
+              <a:rPr lang="en-US" sz="1400" dirty="0" err="1"/>
+              <a:t>s_dump</a:t>
+            </a:r>
+            <a:r>
+              <a:rPr lang="en-US" sz="1400" dirty="0"/>
+              <a:t>(1)=s(1)+.5*time;  //only change the y-coordinate. s(1) is the x-coordinate of the reference configuration. </a:t>
+            </a:r>
+            <a:endParaRPr sz="1400" dirty="0"/>
           </a:p>
           <a:p>
             <a:pPr marL="0" lvl="0" indent="0" algn="l" rtl="0">
@@ -20264,18 +20234,18 @@
               <a:buNone/>
             </a:pPr>
             <a:r>
-              <a:rPr lang="en-US" sz="1400" dirty="0" smtClean="0"/>
+              <a:rPr lang="en-US" sz="1400" dirty="0"/>
               <a:t>      </a:t>
             </a:r>
             <a:r>
-              <a:rPr lang="en-US" sz="1400" dirty="0" err="1" smtClean="0"/>
+              <a:rPr lang="en-US" sz="1400" dirty="0" err="1"/>
               <a:t>s_dump</a:t>
             </a:r>
             <a:r>
-              <a:rPr lang="en-US" sz="1400" dirty="0" smtClean="0"/>
-              <a:t>(1)=s(1)+.5*time;  //only change the y-coordinate. s(1) is the x-coordinate of the reference configuration. </a:t>
-            </a:r>
-            <a:endParaRPr sz="1400" dirty="0" smtClean="0"/>
+              <a:rPr lang="en-US" sz="1400" dirty="0"/>
+              <a:t>(0)=s(0);   //s(0) is the x-coordinate of the reference configuration</a:t>
+            </a:r>
+            <a:endParaRPr sz="1400" dirty="0"/>
           </a:p>
           <a:p>
             <a:pPr marL="0" lvl="0" indent="0" algn="l" rtl="0">
@@ -20293,18 +20263,10 @@
               <a:buNone/>
             </a:pPr>
             <a:r>
-              <a:rPr lang="en-US" sz="1400" dirty="0" smtClean="0"/>
-              <a:t>      </a:t>
-            </a:r>
-            <a:r>
-              <a:rPr lang="en-US" sz="1400" dirty="0" err="1" smtClean="0"/>
-              <a:t>s_dump</a:t>
-            </a:r>
-            <a:r>
-              <a:rPr lang="en-US" sz="1400" dirty="0" smtClean="0"/>
-              <a:t>(0)=s(0);   //s(0) is the x-coordinate of the reference configuration</a:t>
-            </a:r>
-            <a:endParaRPr sz="1400" dirty="0" smtClean="0"/>
+              <a:rPr lang="en-US" sz="1400" dirty="0"/>
+              <a:t>    }</a:t>
+            </a:r>
+            <a:endParaRPr sz="1400" dirty="0"/>
           </a:p>
           <a:p>
             <a:pPr marL="0" lvl="0" indent="0" algn="l" rtl="0">
@@ -20322,10 +20284,10 @@
               <a:buNone/>
             </a:pPr>
             <a:r>
-              <a:rPr lang="en-US" sz="1400" dirty="0" smtClean="0"/>
-              <a:t>    }</a:t>
-            </a:r>
-            <a:endParaRPr sz="1400" dirty="0" smtClean="0"/>
+              <a:rPr lang="en-US" sz="1400" dirty="0"/>
+              <a:t>	else if(time&lt;3)  //This will move the beam down with a speed of -0.5 for 1&lt;t&lt;3</a:t>
+            </a:r>
+            <a:endParaRPr sz="1400" dirty="0"/>
           </a:p>
           <a:p>
             <a:pPr marL="0" lvl="0" indent="0" algn="l" rtl="0">
@@ -20343,10 +20305,10 @@
               <a:buNone/>
             </a:pPr>
             <a:r>
-              <a:rPr lang="en-US" sz="1400" dirty="0" smtClean="0"/>
-              <a:t>	else if(time&lt;3)  //This will move the beam down with a speed of -0.5 for 1&lt;t&lt;3</a:t>
-            </a:r>
-            <a:endParaRPr sz="1400" dirty="0" smtClean="0"/>
+              <a:rPr lang="en-US" sz="1400" dirty="0"/>
+              <a:t>    {</a:t>
+            </a:r>
+            <a:endParaRPr sz="1400" dirty="0"/>
           </a:p>
           <a:p>
             <a:pPr marL="0" lvl="0" indent="0" algn="l" rtl="0">
@@ -20364,10 +20326,18 @@
               <a:buNone/>
             </a:pPr>
             <a:r>
-              <a:rPr lang="en-US" sz="1400" dirty="0" smtClean="0"/>
-              <a:t>    {</a:t>
-            </a:r>
-            <a:endParaRPr sz="1400" dirty="0" smtClean="0"/>
+              <a:rPr lang="en-US" sz="1400" dirty="0"/>
+              <a:t>      </a:t>
+            </a:r>
+            <a:r>
+              <a:rPr lang="en-US" sz="1400" dirty="0" err="1"/>
+              <a:t>s_dump</a:t>
+            </a:r>
+            <a:r>
+              <a:rPr lang="en-US" sz="1400" dirty="0"/>
+              <a:t>(1)=s(1)+.5+.5*(1-time);</a:t>
+            </a:r>
+            <a:endParaRPr sz="1400" dirty="0"/>
           </a:p>
           <a:p>
             <a:pPr marL="0" lvl="0" indent="0" algn="l" rtl="0">
@@ -20385,18 +20355,18 @@
               <a:buNone/>
             </a:pPr>
             <a:r>
-              <a:rPr lang="en-US" sz="1400" dirty="0" smtClean="0"/>
+              <a:rPr lang="en-US" sz="1400" dirty="0"/>
               <a:t>      </a:t>
             </a:r>
             <a:r>
-              <a:rPr lang="en-US" sz="1400" dirty="0" err="1" smtClean="0"/>
+              <a:rPr lang="en-US" sz="1400" dirty="0" err="1"/>
               <a:t>s_dump</a:t>
             </a:r>
             <a:r>
-              <a:rPr lang="en-US" sz="1400" dirty="0" smtClean="0"/>
-              <a:t>(1)=s(1)+.5+.5*(1-time);</a:t>
-            </a:r>
-            <a:endParaRPr sz="1400" dirty="0" smtClean="0"/>
+              <a:rPr lang="en-US" sz="1400" dirty="0"/>
+              <a:t>(0)=s(0);</a:t>
+            </a:r>
+            <a:endParaRPr sz="1400" dirty="0"/>
           </a:p>
           <a:p>
             <a:pPr marL="0" lvl="0" indent="0" algn="l" rtl="0">
@@ -20414,18 +20384,10 @@
               <a:buNone/>
             </a:pPr>
             <a:r>
-              <a:rPr lang="en-US" sz="1400" dirty="0" smtClean="0"/>
-              <a:t>      </a:t>
-            </a:r>
-            <a:r>
-              <a:rPr lang="en-US" sz="1400" dirty="0" err="1" smtClean="0"/>
-              <a:t>s_dump</a:t>
-            </a:r>
-            <a:r>
-              <a:rPr lang="en-US" sz="1400" dirty="0" smtClean="0"/>
-              <a:t>(0)=s(0);</a:t>
-            </a:r>
-            <a:endParaRPr sz="1400" dirty="0" smtClean="0"/>
+              <a:rPr lang="en-US" sz="1400" dirty="0"/>
+              <a:t>    }</a:t>
+            </a:r>
+            <a:endParaRPr sz="1400" dirty="0"/>
           </a:p>
           <a:p>
             <a:pPr marL="0" lvl="0" indent="0" algn="l" rtl="0">
@@ -20443,10 +20405,10 @@
               <a:buNone/>
             </a:pPr>
             <a:r>
-              <a:rPr lang="en-US" sz="1400" dirty="0" smtClean="0"/>
-              <a:t>    }</a:t>
-            </a:r>
-            <a:endParaRPr sz="1400" dirty="0" smtClean="0"/>
+              <a:rPr lang="en-US" sz="1400" dirty="0"/>
+              <a:t>	else  //set the target point location to the actual location of the boundary (X) to make force equal to zero.</a:t>
+            </a:r>
+            <a:endParaRPr sz="1400" dirty="0"/>
           </a:p>
           <a:p>
             <a:pPr marL="0" lvl="0" indent="0" algn="l" rtl="0">
@@ -20464,10 +20426,10 @@
               <a:buNone/>
             </a:pPr>
             <a:r>
-              <a:rPr lang="en-US" sz="1400" dirty="0" smtClean="0"/>
-              <a:t>	else  //set the target point location to the actual location of the boundary (X) to make force equal to zero.</a:t>
-            </a:r>
-            <a:endParaRPr sz="1400" dirty="0" smtClean="0"/>
+              <a:rPr lang="en-US" sz="1400" dirty="0"/>
+              <a:t>  	{</a:t>
+            </a:r>
+            <a:endParaRPr sz="1400" dirty="0"/>
           </a:p>
           <a:p>
             <a:pPr marL="0" lvl="0" indent="0" algn="l" rtl="0">
@@ -20485,10 +20447,18 @@
               <a:buNone/>
             </a:pPr>
             <a:r>
-              <a:rPr lang="en-US" sz="1400" dirty="0" smtClean="0"/>
-              <a:t>  	{</a:t>
-            </a:r>
-            <a:endParaRPr sz="1400" dirty="0" smtClean="0"/>
+              <a:rPr lang="en-US" sz="1400" dirty="0"/>
+              <a:t>      </a:t>
+            </a:r>
+            <a:r>
+              <a:rPr lang="en-US" sz="1400" dirty="0" err="1"/>
+              <a:t>s_dump</a:t>
+            </a:r>
+            <a:r>
+              <a:rPr lang="en-US" sz="1400" dirty="0"/>
+              <a:t>(1)=X(1);</a:t>
+            </a:r>
+            <a:endParaRPr sz="1400" dirty="0"/>
           </a:p>
           <a:p>
             <a:pPr marL="0" lvl="0" indent="0" algn="l" rtl="0">
@@ -20506,18 +20476,18 @@
               <a:buNone/>
             </a:pPr>
             <a:r>
-              <a:rPr lang="en-US" sz="1400" dirty="0" smtClean="0"/>
+              <a:rPr lang="en-US" sz="1400" dirty="0"/>
               <a:t>      </a:t>
             </a:r>
             <a:r>
-              <a:rPr lang="en-US" sz="1400" dirty="0" err="1" smtClean="0"/>
+              <a:rPr lang="en-US" sz="1400" dirty="0" err="1"/>
               <a:t>s_dump</a:t>
             </a:r>
             <a:r>
-              <a:rPr lang="en-US" sz="1400" dirty="0" smtClean="0"/>
-              <a:t>(1)=X(1);</a:t>
-            </a:r>
-            <a:endParaRPr sz="1400" dirty="0" smtClean="0"/>
+              <a:rPr lang="en-US" sz="1400" dirty="0"/>
+              <a:t>(0)=X(0);</a:t>
+            </a:r>
+            <a:endParaRPr sz="1400" dirty="0"/>
           </a:p>
           <a:p>
             <a:pPr marL="0" lvl="0" indent="0" algn="l" rtl="0">
@@ -20535,18 +20505,10 @@
               <a:buNone/>
             </a:pPr>
             <a:r>
-              <a:rPr lang="en-US" sz="1400" dirty="0" smtClean="0"/>
-              <a:t>      </a:t>
-            </a:r>
-            <a:r>
-              <a:rPr lang="en-US" sz="1400" dirty="0" err="1" smtClean="0"/>
-              <a:t>s_dump</a:t>
-            </a:r>
-            <a:r>
-              <a:rPr lang="en-US" sz="1400" dirty="0" smtClean="0"/>
-              <a:t>(0)=X(0);</a:t>
-            </a:r>
-            <a:endParaRPr sz="1400" dirty="0" smtClean="0"/>
+              <a:rPr lang="en-US" sz="1400" dirty="0"/>
+              <a:t>  	}</a:t>
+            </a:r>
+            <a:endParaRPr sz="1400" dirty="0"/>
           </a:p>
           <a:p>
             <a:pPr marL="0" lvl="0" indent="0" algn="l" rtl="0">
@@ -20564,10 +20526,34 @@
               <a:buNone/>
             </a:pPr>
             <a:r>
-              <a:rPr lang="en-US" sz="1400" dirty="0" smtClean="0"/>
-              <a:t>  	}</a:t>
-            </a:r>
-            <a:endParaRPr sz="1400" dirty="0" smtClean="0"/>
+              <a:rPr lang="en-US" sz="1400" dirty="0"/>
+              <a:t>  	F = </a:t>
+            </a:r>
+            <a:r>
+              <a:rPr lang="en-US" sz="1400" dirty="0" err="1"/>
+              <a:t>kappa_s</a:t>
+            </a:r>
+            <a:r>
+              <a:rPr lang="en-US" sz="1400" dirty="0"/>
+              <a:t>*(</a:t>
+            </a:r>
+            <a:r>
+              <a:rPr lang="en-US" sz="1400" dirty="0" err="1"/>
+              <a:t>s_dump</a:t>
+            </a:r>
+            <a:r>
+              <a:rPr lang="en-US" sz="1400" dirty="0"/>
+              <a:t>-X);  //apply a target force equal to </a:t>
+            </a:r>
+            <a:r>
+              <a:rPr lang="en-US" sz="1400" dirty="0" err="1"/>
+              <a:t>kappa_s</a:t>
+            </a:r>
+            <a:r>
+              <a:rPr lang="en-US" sz="1400" dirty="0"/>
+              <a:t> times the difference between tether and actual positions.</a:t>
+            </a:r>
+            <a:endParaRPr sz="1400" dirty="0"/>
           </a:p>
           <a:p>
             <a:pPr marL="0" lvl="0" indent="0" algn="l" rtl="0">
@@ -20585,34 +20571,10 @@
               <a:buNone/>
             </a:pPr>
             <a:r>
-              <a:rPr lang="en-US" sz="1400" dirty="0" smtClean="0"/>
-              <a:t>  	F = </a:t>
-            </a:r>
-            <a:r>
-              <a:rPr lang="en-US" sz="1400" dirty="0" err="1" smtClean="0"/>
-              <a:t>kappa_s</a:t>
-            </a:r>
-            <a:r>
-              <a:rPr lang="en-US" sz="1400" dirty="0" smtClean="0"/>
-              <a:t>*(</a:t>
-            </a:r>
-            <a:r>
-              <a:rPr lang="en-US" sz="1400" dirty="0" err="1" smtClean="0"/>
-              <a:t>s_dump</a:t>
-            </a:r>
-            <a:r>
-              <a:rPr lang="en-US" sz="1400" dirty="0" smtClean="0"/>
-              <a:t>-X);  //apply a target force equal to </a:t>
-            </a:r>
-            <a:r>
-              <a:rPr lang="en-US" sz="1400" dirty="0" err="1" smtClean="0"/>
-              <a:t>kappa_s</a:t>
-            </a:r>
-            <a:r>
-              <a:rPr lang="en-US" sz="1400" dirty="0" smtClean="0"/>
-              <a:t> times the difference between tether and actual positions.</a:t>
-            </a:r>
-            <a:endParaRPr sz="1400" dirty="0" smtClean="0"/>
+              <a:rPr lang="en-US" sz="1400" dirty="0"/>
+              <a:t>	return;</a:t>
+            </a:r>
+            <a:endParaRPr sz="1400" dirty="0"/>
           </a:p>
           <a:p>
             <a:pPr marL="0" lvl="0" indent="0" algn="l" rtl="0">
@@ -20622,31 +20584,10 @@
               <a:spcAft>
                 <a:spcPts val="0"/>
               </a:spcAft>
-              <a:buClr>
-                <a:schemeClr val="dk1"/>
-              </a:buClr>
-              <a:buSzPts val="1100"/>
-              <a:buFont typeface="Arial"/>
-              <a:buNone/>
-            </a:pPr>
-            <a:r>
-              <a:rPr lang="en-US" sz="1400" dirty="0" smtClean="0"/>
-              <a:t>	return;</a:t>
-            </a:r>
-            <a:endParaRPr sz="1400" dirty="0" smtClean="0"/>
-          </a:p>
-          <a:p>
-            <a:pPr marL="0" lvl="0" indent="0" algn="l" rtl="0">
-              <a:spcBef>
-                <a:spcPts val="600"/>
-              </a:spcBef>
-              <a:spcAft>
-                <a:spcPts val="0"/>
-              </a:spcAft>
-              <a:buNone/>
-            </a:pPr>
-            <a:r>
-              <a:rPr lang="en-US" sz="1400" dirty="0" smtClean="0"/>
+              <a:buNone/>
+            </a:pPr>
+            <a:r>
+              <a:rPr lang="en-US" sz="1400" dirty="0"/>
               <a:t>}</a:t>
             </a:r>
             <a:endParaRPr sz="1400" dirty="0"/>
@@ -20654,6 +20595,11 @@
         </p:txBody>
       </p:sp>
     </p:spTree>
+    <p:extLst>
+      <p:ext uri="{BB962C8B-B14F-4D97-AF65-F5344CB8AC3E}">
+        <p14:creationId xmlns:p14="http://schemas.microsoft.com/office/powerpoint/2010/main" val="3680216204"/>
+      </p:ext>
+    </p:extLst>
   </p:cSld>
   <p:clrMapOvr>
     <a:masterClrMapping/>
@@ -20662,6 +20608,385 @@
 </file>
 
 <file path=ppt/slides/slide12.xml><?xml version="1.0" encoding="utf-8"?>
+<p:sld xmlns:a="http://schemas.openxmlformats.org/drawingml/2006/main" xmlns:r="http://schemas.openxmlformats.org/officeDocument/2006/relationships" xmlns:p="http://schemas.openxmlformats.org/presentationml/2006/main">
+  <p:cSld>
+    <p:spTree>
+      <p:nvGrpSpPr>
+        <p:cNvPr id="1" name=""/>
+        <p:cNvGrpSpPr/>
+        <p:nvPr/>
+      </p:nvGrpSpPr>
+      <p:grpSpPr>
+        <a:xfrm>
+          <a:off x="0" y="0"/>
+          <a:ext cx="0" cy="0"/>
+          <a:chOff x="0" y="0"/>
+          <a:chExt cx="0" cy="0"/>
+        </a:xfrm>
+      </p:grpSpPr>
+      <p:sp>
+        <p:nvSpPr>
+          <p:cNvPr id="2" name="Title 1">
+            <a:extLst>
+              <a:ext uri="{FF2B5EF4-FFF2-40B4-BE49-F238E27FC236}">
+                <a16:creationId xmlns:a16="http://schemas.microsoft.com/office/drawing/2014/main" id="{D295F318-A4EB-FDE5-5FC8-E99FAC89C022}"/>
+              </a:ext>
+            </a:extLst>
+          </p:cNvPr>
+          <p:cNvSpPr>
+            <a:spLocks noGrp="1"/>
+          </p:cNvSpPr>
+          <p:nvPr>
+            <p:ph type="title"/>
+          </p:nvPr>
+        </p:nvSpPr>
+        <p:spPr>
+          <a:xfrm>
+            <a:off x="457200" y="274638"/>
+            <a:ext cx="8229600" cy="599251"/>
+          </a:xfrm>
+        </p:spPr>
+        <p:txBody>
+          <a:bodyPr/>
+          <a:lstStyle/>
+          <a:p>
+            <a:r>
+              <a:rPr lang="en-US" sz="2800" dirty="0"/>
+              <a:t>Apply the force only on the right half of plate</a:t>
+            </a:r>
+          </a:p>
+        </p:txBody>
+      </p:sp>
+      <p:sp>
+        <p:nvSpPr>
+          <p:cNvPr id="3" name="Text Placeholder 2">
+            <a:extLst>
+              <a:ext uri="{FF2B5EF4-FFF2-40B4-BE49-F238E27FC236}">
+                <a16:creationId xmlns:a16="http://schemas.microsoft.com/office/drawing/2014/main" id="{1EE36097-09E5-C2BA-DF41-86D0FACFB0E5}"/>
+              </a:ext>
+            </a:extLst>
+          </p:cNvPr>
+          <p:cNvSpPr>
+            <a:spLocks noGrp="1"/>
+          </p:cNvSpPr>
+          <p:nvPr>
+            <p:ph type="body" idx="1"/>
+          </p:nvPr>
+        </p:nvSpPr>
+        <p:spPr>
+          <a:xfrm>
+            <a:off x="457200" y="945150"/>
+            <a:ext cx="8229600" cy="4967700"/>
+          </a:xfrm>
+        </p:spPr>
+        <p:txBody>
+          <a:bodyPr/>
+          <a:lstStyle/>
+          <a:p>
+            <a:r>
+              <a:rPr lang="en-US" sz="1400" dirty="0"/>
+              <a:t>Note the center of the plate is the origin. s(0)&gt;0.0 denotes the right side.</a:t>
+            </a:r>
+          </a:p>
+          <a:p>
+            <a:r>
+              <a:rPr lang="en-US" sz="1400" dirty="0"/>
+              <a:t>If statement only applies force on right side of plate.</a:t>
+            </a:r>
+          </a:p>
+        </p:txBody>
+      </p:sp>
+      <p:sp>
+        <p:nvSpPr>
+          <p:cNvPr id="5" name="TextBox 4">
+            <a:extLst>
+              <a:ext uri="{FF2B5EF4-FFF2-40B4-BE49-F238E27FC236}">
+                <a16:creationId xmlns:a16="http://schemas.microsoft.com/office/drawing/2014/main" id="{4EFE79EE-4506-72E3-DBE7-5325B87D4725}"/>
+              </a:ext>
+            </a:extLst>
+          </p:cNvPr>
+          <p:cNvSpPr txBox="1"/>
+          <p:nvPr/>
+        </p:nvSpPr>
+        <p:spPr>
+          <a:xfrm>
+            <a:off x="376177" y="1887008"/>
+            <a:ext cx="8530541" cy="4832092"/>
+          </a:xfrm>
+          <a:prstGeom prst="rect">
+            <a:avLst/>
+          </a:prstGeom>
+          <a:noFill/>
+        </p:spPr>
+        <p:txBody>
+          <a:bodyPr wrap="square">
+            <a:spAutoFit/>
+          </a:bodyPr>
+          <a:lstStyle/>
+          <a:p>
+            <a:r>
+              <a:rPr lang="en-US" sz="1100" dirty="0"/>
+              <a:t> if(s(0)&gt;0.0){</a:t>
+            </a:r>
+          </a:p>
+          <a:p>
+            <a:r>
+              <a:rPr lang="en-US" sz="1100" dirty="0"/>
+              <a:t>  </a:t>
+            </a:r>
+            <a:r>
+              <a:rPr lang="en-US" sz="1100" dirty="0" err="1"/>
+              <a:t>libMesh</a:t>
+            </a:r>
+            <a:r>
+              <a:rPr lang="en-US" sz="1100" dirty="0"/>
+              <a:t>::Point </a:t>
+            </a:r>
+            <a:r>
+              <a:rPr lang="en-US" sz="1100" dirty="0" err="1"/>
+              <a:t>s_dump</a:t>
+            </a:r>
+            <a:r>
+              <a:rPr lang="en-US" sz="1100" dirty="0"/>
+              <a:t>;			//</a:t>
+            </a:r>
+            <a:r>
+              <a:rPr lang="en-US" sz="1100" dirty="0" err="1"/>
+              <a:t>s_dump</a:t>
+            </a:r>
+            <a:r>
+              <a:rPr lang="en-US" sz="1100" dirty="0"/>
+              <a:t> is the target point position</a:t>
+            </a:r>
+          </a:p>
+          <a:p>
+            <a:r>
+              <a:rPr lang="en-US" sz="1100" dirty="0"/>
+              <a:t>    if(time&lt;1.0)      				//This will move the beam up with a speed of 0.5 from 0&lt;t&lt;1</a:t>
+            </a:r>
+          </a:p>
+          <a:p>
+            <a:r>
+              <a:rPr lang="en-US" sz="1100" dirty="0"/>
+              <a:t>	{</a:t>
+            </a:r>
+          </a:p>
+          <a:p>
+            <a:r>
+              <a:rPr lang="en-US" sz="1100" dirty="0"/>
+              <a:t>	  </a:t>
+            </a:r>
+            <a:r>
+              <a:rPr lang="en-US" sz="1100" dirty="0" err="1"/>
+              <a:t>s_dump</a:t>
+            </a:r>
+            <a:r>
+              <a:rPr lang="en-US" sz="1100" dirty="0"/>
+              <a:t>(1)=s(1)+0.5*time;		//only change the y-coordinate. s(1) is the x-coordinate of the reference </a:t>
+            </a:r>
+          </a:p>
+          <a:p>
+            <a:r>
+              <a:rPr lang="en-US" sz="1100" dirty="0"/>
+              <a:t>	  </a:t>
+            </a:r>
+            <a:r>
+              <a:rPr lang="en-US" sz="1100" dirty="0" err="1"/>
+              <a:t>s_dump</a:t>
+            </a:r>
+            <a:r>
+              <a:rPr lang="en-US" sz="1100" dirty="0"/>
+              <a:t>(0)=s(0);				//s(0) is the x-coordinate of the reference configuration</a:t>
+            </a:r>
+          </a:p>
+          <a:p>
+            <a:r>
+              <a:rPr lang="en-US" sz="1100" dirty="0"/>
+              <a:t>	}</a:t>
+            </a:r>
+          </a:p>
+          <a:p>
+            <a:r>
+              <a:rPr lang="en-US" sz="1100" dirty="0"/>
+              <a:t>    else if(time&lt;3.0)				//This will move the beam down with a speed of -0.5 for 1&lt;t&lt;3</a:t>
+            </a:r>
+          </a:p>
+          <a:p>
+            <a:r>
+              <a:rPr lang="en-US" sz="1100" dirty="0"/>
+              <a:t>	{</a:t>
+            </a:r>
+          </a:p>
+          <a:p>
+            <a:r>
+              <a:rPr lang="en-US" sz="1100" dirty="0"/>
+              <a:t>	  </a:t>
+            </a:r>
+            <a:r>
+              <a:rPr lang="en-US" sz="1100" dirty="0" err="1"/>
+              <a:t>s_dump</a:t>
+            </a:r>
+            <a:r>
+              <a:rPr lang="en-US" sz="1100" dirty="0"/>
+              <a:t>(1)=s(1)+0.5+0.5*(1.0-time);</a:t>
+            </a:r>
+          </a:p>
+          <a:p>
+            <a:r>
+              <a:rPr lang="en-US" sz="1100" dirty="0"/>
+              <a:t>	  </a:t>
+            </a:r>
+            <a:r>
+              <a:rPr lang="en-US" sz="1100" dirty="0" err="1"/>
+              <a:t>s_dump</a:t>
+            </a:r>
+            <a:r>
+              <a:rPr lang="en-US" sz="1100" dirty="0"/>
+              <a:t>(0)=s(0);</a:t>
+            </a:r>
+          </a:p>
+          <a:p>
+            <a:r>
+              <a:rPr lang="en-US" sz="1100" dirty="0"/>
+              <a:t>	}</a:t>
+            </a:r>
+          </a:p>
+          <a:p>
+            <a:r>
+              <a:rPr lang="en-US" sz="1100" dirty="0"/>
+              <a:t>    else 							//set the target point location to the actual location of the boundary (X) to make force equal to zero.</a:t>
+            </a:r>
+          </a:p>
+          <a:p>
+            <a:r>
+              <a:rPr lang="en-US" sz="1100" dirty="0"/>
+              <a:t>      {</a:t>
+            </a:r>
+          </a:p>
+          <a:p>
+            <a:r>
+              <a:rPr lang="en-US" sz="1100" dirty="0"/>
+              <a:t>	  </a:t>
+            </a:r>
+            <a:r>
+              <a:rPr lang="en-US" sz="1100" dirty="0" err="1"/>
+              <a:t>s_dump</a:t>
+            </a:r>
+            <a:r>
+              <a:rPr lang="en-US" sz="1100" dirty="0"/>
+              <a:t>(1)=X(1);</a:t>
+            </a:r>
+          </a:p>
+          <a:p>
+            <a:r>
+              <a:rPr lang="en-US" sz="1100" dirty="0"/>
+              <a:t>	  </a:t>
+            </a:r>
+            <a:r>
+              <a:rPr lang="en-US" sz="1100" dirty="0" err="1"/>
+              <a:t>s_dump</a:t>
+            </a:r>
+            <a:r>
+              <a:rPr lang="en-US" sz="1100" dirty="0"/>
+              <a:t>(0)=X(0);</a:t>
+            </a:r>
+          </a:p>
+          <a:p>
+            <a:r>
+              <a:rPr lang="en-US" sz="1100" dirty="0"/>
+              <a:t>      }</a:t>
+            </a:r>
+          </a:p>
+          <a:p>
+            <a:r>
+              <a:rPr lang="en-US" sz="1100" dirty="0"/>
+              <a:t>      F = </a:t>
+            </a:r>
+            <a:r>
+              <a:rPr lang="en-US" sz="1100" dirty="0" err="1"/>
+              <a:t>kappa_s</a:t>
+            </a:r>
+            <a:r>
+              <a:rPr lang="en-US" sz="1100" dirty="0"/>
+              <a:t>*(</a:t>
+            </a:r>
+            <a:r>
+              <a:rPr lang="en-US" sz="1100" dirty="0" err="1"/>
+              <a:t>s_dump</a:t>
+            </a:r>
+            <a:r>
+              <a:rPr lang="en-US" sz="1100" dirty="0"/>
+              <a:t>-X);		//apply a target force equal to </a:t>
+            </a:r>
+            <a:r>
+              <a:rPr lang="en-US" sz="1100" dirty="0" err="1"/>
+              <a:t>kappa_s</a:t>
+            </a:r>
+            <a:r>
+              <a:rPr lang="en-US" sz="1100" dirty="0"/>
+              <a:t> times the difference between tether and actual positions.</a:t>
+            </a:r>
+          </a:p>
+          <a:p>
+            <a:r>
+              <a:rPr lang="en-US" sz="1100" dirty="0"/>
+              <a:t>}</a:t>
+            </a:r>
+          </a:p>
+          <a:p>
+            <a:r>
+              <a:rPr lang="en-US" sz="1100" dirty="0"/>
+              <a:t> else{</a:t>
+            </a:r>
+          </a:p>
+          <a:p>
+            <a:r>
+              <a:rPr lang="en-US" sz="1100" dirty="0"/>
+              <a:t>   </a:t>
+            </a:r>
+            <a:r>
+              <a:rPr lang="en-US" sz="1100" dirty="0" err="1"/>
+              <a:t>F.zero</a:t>
+            </a:r>
+            <a:r>
+              <a:rPr lang="en-US" sz="1100" dirty="0"/>
+              <a:t>();</a:t>
+            </a:r>
+          </a:p>
+          <a:p>
+            <a:r>
+              <a:rPr lang="en-US" sz="1100" dirty="0"/>
+              <a:t> }</a:t>
+            </a:r>
+          </a:p>
+          <a:p>
+            <a:r>
+              <a:rPr lang="en-US" sz="1100" dirty="0"/>
+              <a:t>    return;</a:t>
+            </a:r>
+          </a:p>
+          <a:p>
+            <a:r>
+              <a:rPr lang="en-US" sz="1100" dirty="0"/>
+              <a:t>}</a:t>
+            </a:r>
+          </a:p>
+        </p:txBody>
+      </p:sp>
+    </p:spTree>
+    <p:extLst>
+      <p:ext uri="{BB962C8B-B14F-4D97-AF65-F5344CB8AC3E}">
+        <p14:creationId xmlns:p14="http://schemas.microsoft.com/office/powerpoint/2010/main" val="3154748893"/>
+      </p:ext>
+    </p:extLst>
+  </p:cSld>
+  <p:clrMapOvr>
+    <a:masterClrMapping/>
+  </p:clrMapOvr>
+</p:sld>
+</file>
+
+<file path=ppt/slides/slide13.xml><?xml version="1.0" encoding="utf-8"?>
 <p:sld xmlns:a="http://schemas.openxmlformats.org/drawingml/2006/main" xmlns:r="http://schemas.openxmlformats.org/officeDocument/2006/relationships" xmlns:p="http://schemas.openxmlformats.org/presentationml/2006/main">
   <p:cSld>
     <p:spTree>
@@ -20713,7 +21038,7 @@
               <a:buNone/>
             </a:pPr>
             <a:r>
-              <a:rPr lang="en-US" dirty="0" smtClean="0"/>
+              <a:rPr lang="en-US" dirty="0"/>
               <a:t>1-IBFE-Example_TetherForceHalfPlate2D</a:t>
             </a:r>
           </a:p>
@@ -20832,7 +21157,7 @@
 </p:sld>
 </file>
 
-<file path=ppt/slides/slide13.xml><?xml version="1.0" encoding="utf-8"?>
+<file path=ppt/slides/slide14.xml><?xml version="1.0" encoding="utf-8"?>
 <p:sld xmlns:a="http://schemas.openxmlformats.org/drawingml/2006/main" xmlns:r="http://schemas.openxmlformats.org/officeDocument/2006/relationships" xmlns:p="http://schemas.openxmlformats.org/presentationml/2006/main">
   <p:cSld>
     <p:spTree>
@@ -20884,7 +21209,7 @@
               <a:buNone/>
             </a:pPr>
             <a:r>
-              <a:rPr lang="en-US" sz="2400" smtClean="0"/>
+              <a:rPr lang="en-US" sz="2400"/>
               <a:t>1-IBFE-Example_TetherForceFullPlate2D-Rotate</a:t>
             </a:r>
             <a:endParaRPr sz="2400" dirty="0"/>
@@ -20955,7 +21280,7 @@
 </p:sld>
 </file>
 
-<file path=ppt/slides/slide14.xml><?xml version="1.0" encoding="utf-8"?>
+<file path=ppt/slides/slide15.xml><?xml version="1.0" encoding="utf-8"?>
 <p:sld xmlns:a="http://schemas.openxmlformats.org/drawingml/2006/main" xmlns:r="http://schemas.openxmlformats.org/officeDocument/2006/relationships" xmlns:p="http://schemas.openxmlformats.org/presentationml/2006/main">
   <p:cSld>
     <p:spTree>
@@ -21012,12 +21337,8 @@
               <a:buNone/>
             </a:pPr>
             <a:r>
-              <a:rPr lang="en-US" sz="1400" dirty="0" smtClean="0"/>
-              <a:t>if(time&lt;1</a:t>
-            </a:r>
-            <a:r>
               <a:rPr lang="en-US" sz="1400" dirty="0"/>
-              <a:t>) 	 </a:t>
+              <a:t>if(time&lt;1) 	 </a:t>
             </a:r>
             <a:endParaRPr sz="1400" dirty="0"/>
           </a:p>
@@ -21037,7 +21358,7 @@
               <a:buNone/>
             </a:pPr>
             <a:r>
-              <a:rPr lang="en-US" sz="1400" dirty="0" smtClean="0"/>
+              <a:rPr lang="en-US" sz="1400" dirty="0"/>
               <a:t>{</a:t>
             </a:r>
             <a:endParaRPr sz="1400" dirty="0"/>
@@ -21062,13 +21383,9 @@
             </a:r>
             <a:r>
               <a:rPr lang="en-US" sz="1400" dirty="0"/>
-              <a:t>(1)=s(1)+s(0)*sin(2*3.14*0.5*time);  //y-coordinate gets moved more the farther along the beam you </a:t>
-            </a:r>
-            <a:r>
-              <a:rPr lang="en-US" sz="1400" dirty="0" smtClean="0"/>
-              <a:t>are, We should really define PI better here</a:t>
-            </a:r>
-            <a:endParaRPr sz="1400" dirty="0" smtClean="0"/>
+              <a:t>(1)=s(1)+s(0)*sin(2*3.14*0.5*time);  //y-coordinate gets moved more the farther along the beam you are, We should really define PI better here</a:t>
+            </a:r>
+            <a:endParaRPr sz="1400" dirty="0"/>
           </a:p>
           <a:p>
             <a:pPr marL="0" lvl="0" indent="0" algn="l" rtl="0">
@@ -21136,12 +21453,8 @@
               <a:buNone/>
             </a:pPr>
             <a:r>
-              <a:rPr lang="en-US" sz="1400" dirty="0" smtClean="0"/>
-              <a:t>else </a:t>
-            </a:r>
-            <a:r>
               <a:rPr lang="en-US" sz="1400" dirty="0"/>
-              <a:t>//turns off all forcing, target coordinates set to current coordinates</a:t>
+              <a:t>else //turns off all forcing, target coordinates set to current coordinates</a:t>
             </a:r>
             <a:endParaRPr sz="1400" dirty="0"/>
           </a:p>
@@ -21161,7 +21474,7 @@
               <a:buNone/>
             </a:pPr>
             <a:r>
-              <a:rPr lang="en-US" sz="1400" dirty="0" smtClean="0"/>
+              <a:rPr lang="en-US" sz="1400" dirty="0"/>
               <a:t>{</a:t>
             </a:r>
             <a:endParaRPr sz="1400" dirty="0"/>
@@ -21240,7 +21553,7 @@
               <a:buNone/>
             </a:pPr>
             <a:r>
-              <a:rPr lang="en-US" sz="1400" dirty="0" smtClean="0"/>
+              <a:rPr lang="en-US" sz="1400" dirty="0"/>
               <a:t>}</a:t>
             </a:r>
             <a:endParaRPr sz="1400" dirty="0"/>
@@ -21261,12 +21574,8 @@
               <a:buNone/>
             </a:pPr>
             <a:r>
-              <a:rPr lang="en-US" sz="1400" dirty="0" smtClean="0"/>
-              <a:t>F </a:t>
-            </a:r>
-            <a:r>
               <a:rPr lang="en-US" sz="1400" dirty="0"/>
-              <a:t>= </a:t>
+              <a:t>F = </a:t>
             </a:r>
             <a:r>
               <a:rPr lang="en-US" sz="1400" dirty="0" err="1"/>
@@ -21302,12 +21611,8 @@
               <a:buNone/>
             </a:pPr>
             <a:r>
-              <a:rPr lang="en-US" sz="1400" dirty="0" smtClean="0"/>
-              <a:t>return</a:t>
-            </a:r>
-            <a:r>
               <a:rPr lang="en-US" sz="1400" dirty="0"/>
-              <a:t>;</a:t>
+              <a:t>return;</a:t>
             </a:r>
             <a:endParaRPr sz="1400" dirty="0"/>
           </a:p>
@@ -21337,7 +21642,7 @@
 </p:sld>
 </file>
 
-<file path=ppt/slides/slide15.xml><?xml version="1.0" encoding="utf-8"?>
+<file path=ppt/slides/slide16.xml><?xml version="1.0" encoding="utf-8"?>
 <p:sld xmlns:a="http://schemas.openxmlformats.org/drawingml/2006/main" xmlns:r="http://schemas.openxmlformats.org/officeDocument/2006/relationships" xmlns:p="http://schemas.openxmlformats.org/presentationml/2006/main">
   <p:cSld>
     <p:spTree>
@@ -21455,12 +21760,8 @@
               <a:buNone/>
             </a:pPr>
             <a:r>
-              <a:rPr lang="en-US" sz="1600" dirty="0" smtClean="0"/>
-              <a:t>Mesh </a:t>
-            </a:r>
-            <a:r>
               <a:rPr lang="en-US" sz="1600" dirty="0"/>
-              <a:t>mesh(</a:t>
+              <a:t>Mesh mesh(</a:t>
             </a:r>
             <a:r>
               <a:rPr lang="en-US" sz="1600" dirty="0" err="1"/>
@@ -21470,7 +21771,6 @@
               <a:rPr lang="en-US" sz="1600" dirty="0"/>
               <a:t>(), NDIM); </a:t>
             </a:r>
-            <a:endParaRPr lang="en-US" sz="1600" dirty="0" smtClean="0"/>
           </a:p>
           <a:p>
             <a:pPr marL="0" lvl="0" indent="0" algn="l" rtl="0">
@@ -21483,16 +21783,12 @@
               <a:buNone/>
             </a:pPr>
             <a:r>
-              <a:rPr lang="en-US" sz="1600" dirty="0" err="1" smtClean="0"/>
+              <a:rPr lang="en-US" sz="1600" dirty="0" err="1"/>
               <a:t>const</a:t>
             </a:r>
             <a:r>
-              <a:rPr lang="en-US" sz="1600" dirty="0" smtClean="0"/>
-              <a:t> </a:t>
-            </a:r>
-            <a:r>
               <a:rPr lang="en-US" sz="1600" dirty="0"/>
-              <a:t>double dx = </a:t>
+              <a:t> double dx = </a:t>
             </a:r>
             <a:r>
               <a:rPr lang="en-US" sz="1600" dirty="0" err="1"/>
@@ -21528,16 +21824,12 @@
               <a:buNone/>
             </a:pPr>
             <a:r>
-              <a:rPr lang="en-US" sz="1600" dirty="0" err="1" smtClean="0"/>
+              <a:rPr lang="en-US" sz="1600" dirty="0" err="1"/>
               <a:t>const</a:t>
             </a:r>
             <a:r>
-              <a:rPr lang="en-US" sz="1600" dirty="0" smtClean="0"/>
-              <a:t> </a:t>
-            </a:r>
-            <a:r>
               <a:rPr lang="en-US" sz="1600" dirty="0"/>
-              <a:t>double ds = </a:t>
+              <a:t> double ds = </a:t>
             </a:r>
             <a:r>
               <a:rPr lang="en-US" sz="1600" dirty="0" err="1"/>
@@ -21573,7 +21865,7 @@
               <a:buNone/>
             </a:pPr>
             <a:r>
-              <a:rPr lang="en-US" sz="1600" dirty="0" smtClean="0"/>
+              <a:rPr lang="en-US" sz="1600" dirty="0"/>
               <a:t>string </a:t>
             </a:r>
             <a:r>
@@ -21618,7 +21910,7 @@
               <a:buNone/>
             </a:pPr>
             <a:r>
-              <a:rPr lang="en-US" sz="1600" dirty="0" err="1" smtClean="0"/>
+              <a:rPr lang="en-US" sz="1600" dirty="0" err="1"/>
               <a:t>mesh.read</a:t>
             </a:r>
             <a:r>
@@ -21638,7 +21930,7 @@
               <a:buNone/>
             </a:pPr>
             <a:r>
-              <a:rPr lang="en-US" sz="1600" dirty="0" err="1" smtClean="0"/>
+              <a:rPr lang="en-US" sz="1600" dirty="0" err="1"/>
               <a:t>mesh.prepare_for_use</a:t>
             </a:r>
             <a:r>
@@ -21685,7 +21977,7 @@
 </p:sld>
 </file>
 
-<file path=ppt/slides/slide16.xml><?xml version="1.0" encoding="utf-8"?>
+<file path=ppt/slides/slide17.xml><?xml version="1.0" encoding="utf-8"?>
 <p:sld xmlns:a="http://schemas.openxmlformats.org/drawingml/2006/main" xmlns:r="http://schemas.openxmlformats.org/officeDocument/2006/relationships" xmlns:p="http://schemas.openxmlformats.org/presentationml/2006/main">
   <p:cSld>
     <p:spTree>
@@ -21768,7 +22060,7 @@
 </p:sld>
 </file>
 
-<file path=ppt/slides/slide17.xml><?xml version="1.0" encoding="utf-8"?>
+<file path=ppt/slides/slide18.xml><?xml version="1.0" encoding="utf-8"?>
 <p:sld xmlns:a="http://schemas.openxmlformats.org/drawingml/2006/main" xmlns:r="http://schemas.openxmlformats.org/officeDocument/2006/relationships" xmlns:p="http://schemas.openxmlformats.org/presentationml/2006/main">
   <p:cSld>
     <p:spTree>
@@ -21851,7 +22143,7 @@
 </p:sld>
 </file>
 
-<file path=ppt/slides/slide18.xml><?xml version="1.0" encoding="utf-8"?>
+<file path=ppt/slides/slide19.xml><?xml version="1.0" encoding="utf-8"?>
 <p:sld xmlns:a="http://schemas.openxmlformats.org/drawingml/2006/main" xmlns:r="http://schemas.openxmlformats.org/officeDocument/2006/relationships" xmlns:p="http://schemas.openxmlformats.org/presentationml/2006/main">
   <p:cSld>
     <p:spTree>
@@ -22100,284 +22392,6 @@
               </a:rPr>
               <a:t>Can have multiple files of this type for different parts of object</a:t>
             </a:r>
-            <a:endParaRPr sz="1800" b="0" i="0" u="none" strike="noStrike" cap="none">
-              <a:solidFill>
-                <a:schemeClr val="dk1"/>
-              </a:solidFill>
-              <a:latin typeface="Calibri"/>
-              <a:ea typeface="Calibri"/>
-              <a:cs typeface="Calibri"/>
-              <a:sym typeface="Calibri"/>
-            </a:endParaRPr>
-          </a:p>
-        </p:txBody>
-      </p:sp>
-    </p:spTree>
-  </p:cSld>
-  <p:clrMapOvr>
-    <a:masterClrMapping/>
-  </p:clrMapOvr>
-</p:sld>
-</file>
-
-<file path=ppt/slides/slide19.xml><?xml version="1.0" encoding="utf-8"?>
-<p:sld xmlns:a="http://schemas.openxmlformats.org/drawingml/2006/main" xmlns:r="http://schemas.openxmlformats.org/officeDocument/2006/relationships" xmlns:p="http://schemas.openxmlformats.org/presentationml/2006/main">
-  <p:cSld>
-    <p:spTree>
-      <p:nvGrpSpPr>
-        <p:cNvPr id="1" name="Shape 215"/>
-        <p:cNvGrpSpPr/>
-        <p:nvPr/>
-      </p:nvGrpSpPr>
-      <p:grpSpPr>
-        <a:xfrm>
-          <a:off x="0" y="0"/>
-          <a:ext cx="0" cy="0"/>
-          <a:chOff x="0" y="0"/>
-          <a:chExt cx="0" cy="0"/>
-        </a:xfrm>
-      </p:grpSpPr>
-      <p:sp>
-        <p:nvSpPr>
-          <p:cNvPr id="216" name="Google Shape;216;p41"/>
-          <p:cNvSpPr txBox="1">
-            <a:spLocks noGrp="1"/>
-          </p:cNvSpPr>
-          <p:nvPr>
-            <p:ph type="body" idx="1"/>
-          </p:nvPr>
-        </p:nvSpPr>
-        <p:spPr>
-          <a:xfrm>
-            <a:off x="457200" y="600638"/>
-            <a:ext cx="8229600" cy="5512583"/>
-          </a:xfrm>
-          <a:prstGeom prst="rect">
-            <a:avLst/>
-          </a:prstGeom>
-          <a:noFill/>
-          <a:ln>
-            <a:noFill/>
-          </a:ln>
-        </p:spPr>
-        <p:txBody>
-          <a:bodyPr spcFirstLastPara="1" wrap="square" lIns="91425" tIns="45700" rIns="91425" bIns="45700" anchor="t" anchorCtr="0">
-            <a:noAutofit/>
-          </a:bodyPr>
-          <a:lstStyle/>
-          <a:p>
-            <a:pPr marL="342900" marR="0" lvl="0" indent="-342900" algn="l" rtl="0">
-              <a:spcBef>
-                <a:spcPts val="640"/>
-              </a:spcBef>
-              <a:spcAft>
-                <a:spcPts val="0"/>
-              </a:spcAft>
-              <a:buClr>
-                <a:schemeClr val="dk1"/>
-              </a:buClr>
-              <a:buSzPts val="1900"/>
-              <a:buFont typeface="Calibri"/>
-              <a:buChar char="●"/>
-            </a:pPr>
-            <a:r>
-              <a:rPr lang="en-US" sz="3200" b="0" i="0" u="none" strike="noStrike" cap="none">
-                <a:solidFill>
-                  <a:schemeClr val="dk1"/>
-                </a:solidFill>
-                <a:latin typeface="Calibri"/>
-                <a:ea typeface="Calibri"/>
-                <a:cs typeface="Calibri"/>
-                <a:sym typeface="Calibri"/>
-              </a:rPr>
-              <a:t>Open dump.visit and output.ex2 in VisIt</a:t>
-            </a:r>
-            <a:endParaRPr sz="1800" b="0" i="0" u="none" strike="noStrike" cap="none">
-              <a:solidFill>
-                <a:schemeClr val="dk1"/>
-              </a:solidFill>
-              <a:latin typeface="Calibri"/>
-              <a:ea typeface="Calibri"/>
-              <a:cs typeface="Calibri"/>
-              <a:sym typeface="Calibri"/>
-            </a:endParaRPr>
-          </a:p>
-          <a:p>
-            <a:pPr marL="342900" marR="0" lvl="0" indent="-342900" algn="l" rtl="0">
-              <a:spcBef>
-                <a:spcPts val="0"/>
-              </a:spcBef>
-              <a:spcAft>
-                <a:spcPts val="0"/>
-              </a:spcAft>
-              <a:buClr>
-                <a:schemeClr val="dk1"/>
-              </a:buClr>
-              <a:buSzPts val="1900"/>
-              <a:buFont typeface="Calibri"/>
-              <a:buChar char="●"/>
-            </a:pPr>
-            <a:r>
-              <a:rPr lang="en-US" sz="3200" b="0" i="0" u="none" strike="noStrike" cap="none">
-                <a:solidFill>
-                  <a:schemeClr val="dk1"/>
-                </a:solidFill>
-                <a:latin typeface="Calibri"/>
-                <a:ea typeface="Calibri"/>
-                <a:cs typeface="Calibri"/>
-                <a:sym typeface="Calibri"/>
-              </a:rPr>
-              <a:t>In the left hand corner, unclick the “Apply operators to all plots” option</a:t>
-            </a:r>
-            <a:endParaRPr sz="3200" b="0" i="0" u="none" strike="noStrike" cap="none">
-              <a:solidFill>
-                <a:schemeClr val="dk1"/>
-              </a:solidFill>
-              <a:latin typeface="Calibri"/>
-              <a:ea typeface="Calibri"/>
-              <a:cs typeface="Calibri"/>
-              <a:sym typeface="Calibri"/>
-            </a:endParaRPr>
-          </a:p>
-          <a:p>
-            <a:pPr marL="342900" marR="0" lvl="0" indent="-222250" algn="l" rtl="0">
-              <a:spcBef>
-                <a:spcPts val="640"/>
-              </a:spcBef>
-              <a:spcAft>
-                <a:spcPts val="0"/>
-              </a:spcAft>
-              <a:buClr>
-                <a:schemeClr val="dk1"/>
-              </a:buClr>
-              <a:buSzPts val="1900"/>
-              <a:buFont typeface="Calibri"/>
-              <a:buNone/>
-            </a:pPr>
-            <a:endParaRPr sz="1800" b="0" i="0" u="none" strike="noStrike" cap="none">
-              <a:solidFill>
-                <a:schemeClr val="dk1"/>
-              </a:solidFill>
-              <a:latin typeface="Calibri"/>
-              <a:ea typeface="Calibri"/>
-              <a:cs typeface="Calibri"/>
-              <a:sym typeface="Calibri"/>
-            </a:endParaRPr>
-          </a:p>
-          <a:p>
-            <a:pPr marL="342900" marR="0" lvl="0" indent="-222250" algn="l" rtl="0">
-              <a:spcBef>
-                <a:spcPts val="640"/>
-              </a:spcBef>
-              <a:spcAft>
-                <a:spcPts val="0"/>
-              </a:spcAft>
-              <a:buClr>
-                <a:schemeClr val="dk1"/>
-              </a:buClr>
-              <a:buSzPts val="1900"/>
-              <a:buFont typeface="Calibri"/>
-              <a:buNone/>
-            </a:pPr>
-            <a:endParaRPr sz="1800" b="0" i="0" u="none" strike="noStrike" cap="none">
-              <a:solidFill>
-                <a:schemeClr val="dk1"/>
-              </a:solidFill>
-              <a:latin typeface="Calibri"/>
-              <a:ea typeface="Calibri"/>
-              <a:cs typeface="Calibri"/>
-              <a:sym typeface="Calibri"/>
-            </a:endParaRPr>
-          </a:p>
-          <a:p>
-            <a:pPr marL="342900" marR="0" lvl="0" indent="-342900" algn="l" rtl="0">
-              <a:spcBef>
-                <a:spcPts val="640"/>
-              </a:spcBef>
-              <a:spcAft>
-                <a:spcPts val="0"/>
-              </a:spcAft>
-              <a:buClr>
-                <a:schemeClr val="dk1"/>
-              </a:buClr>
-              <a:buSzPts val="1900"/>
-              <a:buFont typeface="Calibri"/>
-              <a:buChar char="●"/>
-            </a:pPr>
-            <a:r>
-              <a:rPr lang="en-US" sz="3200" b="0" i="0" u="none" strike="noStrike" cap="none">
-                <a:solidFill>
-                  <a:schemeClr val="dk1"/>
-                </a:solidFill>
-                <a:latin typeface="Calibri"/>
-                <a:ea typeface="Calibri"/>
-                <a:cs typeface="Calibri"/>
-                <a:sym typeface="Calibri"/>
-              </a:rPr>
-              <a:t>Under active source, choose the output.ex2</a:t>
-            </a:r>
-            <a:endParaRPr sz="3200" b="0" i="0" u="none" strike="noStrike" cap="none">
-              <a:solidFill>
-                <a:schemeClr val="dk1"/>
-              </a:solidFill>
-              <a:latin typeface="Calibri"/>
-              <a:ea typeface="Calibri"/>
-              <a:cs typeface="Calibri"/>
-              <a:sym typeface="Calibri"/>
-            </a:endParaRPr>
-          </a:p>
-          <a:p>
-            <a:pPr marL="342900" marR="0" lvl="0" indent="-342900" algn="l" rtl="0">
-              <a:spcBef>
-                <a:spcPts val="0"/>
-              </a:spcBef>
-              <a:spcAft>
-                <a:spcPts val="0"/>
-              </a:spcAft>
-              <a:buClr>
-                <a:schemeClr val="dk1"/>
-              </a:buClr>
-              <a:buSzPts val="1900"/>
-              <a:buFont typeface="Calibri"/>
-              <a:buChar char="●"/>
-            </a:pPr>
-            <a:r>
-              <a:rPr lang="en-US" sz="3200" b="0" i="0" u="none" strike="noStrike" cap="none">
-                <a:solidFill>
-                  <a:schemeClr val="dk1"/>
-                </a:solidFill>
-                <a:latin typeface="Calibri"/>
-                <a:ea typeface="Calibri"/>
-                <a:cs typeface="Calibri"/>
-                <a:sym typeface="Calibri"/>
-              </a:rPr>
-              <a:t>Load mesh (but don’t Draw)</a:t>
-            </a:r>
-            <a:endParaRPr sz="3200" b="0" i="0" u="none" strike="noStrike" cap="none">
-              <a:solidFill>
-                <a:schemeClr val="dk1"/>
-              </a:solidFill>
-              <a:latin typeface="Calibri"/>
-              <a:ea typeface="Calibri"/>
-              <a:cs typeface="Calibri"/>
-              <a:sym typeface="Calibri"/>
-            </a:endParaRPr>
-          </a:p>
-          <a:p>
-            <a:pPr marL="342900" marR="0" lvl="0" indent="-222250" algn="l" rtl="0">
-              <a:spcBef>
-                <a:spcPts val="640"/>
-              </a:spcBef>
-              <a:spcAft>
-                <a:spcPts val="0"/>
-              </a:spcAft>
-              <a:buClr>
-                <a:schemeClr val="dk1"/>
-              </a:buClr>
-              <a:buSzPts val="1900"/>
-              <a:buFont typeface="Calibri"/>
-              <a:buNone/>
-            </a:pPr>
             <a:endParaRPr sz="1800" b="0" i="0" u="none" strike="noStrike" cap="none">
               <a:solidFill>
                 <a:schemeClr val="dk1"/>
@@ -22702,6 +22716,284 @@
 </file>
 
 <file path=ppt/slides/slide20.xml><?xml version="1.0" encoding="utf-8"?>
+<p:sld xmlns:a="http://schemas.openxmlformats.org/drawingml/2006/main" xmlns:r="http://schemas.openxmlformats.org/officeDocument/2006/relationships" xmlns:p="http://schemas.openxmlformats.org/presentationml/2006/main">
+  <p:cSld>
+    <p:spTree>
+      <p:nvGrpSpPr>
+        <p:cNvPr id="1" name="Shape 215"/>
+        <p:cNvGrpSpPr/>
+        <p:nvPr/>
+      </p:nvGrpSpPr>
+      <p:grpSpPr>
+        <a:xfrm>
+          <a:off x="0" y="0"/>
+          <a:ext cx="0" cy="0"/>
+          <a:chOff x="0" y="0"/>
+          <a:chExt cx="0" cy="0"/>
+        </a:xfrm>
+      </p:grpSpPr>
+      <p:sp>
+        <p:nvSpPr>
+          <p:cNvPr id="216" name="Google Shape;216;p41"/>
+          <p:cNvSpPr txBox="1">
+            <a:spLocks noGrp="1"/>
+          </p:cNvSpPr>
+          <p:nvPr>
+            <p:ph type="body" idx="1"/>
+          </p:nvPr>
+        </p:nvSpPr>
+        <p:spPr>
+          <a:xfrm>
+            <a:off x="457200" y="600638"/>
+            <a:ext cx="8229600" cy="5512583"/>
+          </a:xfrm>
+          <a:prstGeom prst="rect">
+            <a:avLst/>
+          </a:prstGeom>
+          <a:noFill/>
+          <a:ln>
+            <a:noFill/>
+          </a:ln>
+        </p:spPr>
+        <p:txBody>
+          <a:bodyPr spcFirstLastPara="1" wrap="square" lIns="91425" tIns="45700" rIns="91425" bIns="45700" anchor="t" anchorCtr="0">
+            <a:noAutofit/>
+          </a:bodyPr>
+          <a:lstStyle/>
+          <a:p>
+            <a:pPr marL="342900" marR="0" lvl="0" indent="-342900" algn="l" rtl="0">
+              <a:spcBef>
+                <a:spcPts val="640"/>
+              </a:spcBef>
+              <a:spcAft>
+                <a:spcPts val="0"/>
+              </a:spcAft>
+              <a:buClr>
+                <a:schemeClr val="dk1"/>
+              </a:buClr>
+              <a:buSzPts val="1900"/>
+              <a:buFont typeface="Calibri"/>
+              <a:buChar char="●"/>
+            </a:pPr>
+            <a:r>
+              <a:rPr lang="en-US" sz="3200" b="0" i="0" u="none" strike="noStrike" cap="none">
+                <a:solidFill>
+                  <a:schemeClr val="dk1"/>
+                </a:solidFill>
+                <a:latin typeface="Calibri"/>
+                <a:ea typeface="Calibri"/>
+                <a:cs typeface="Calibri"/>
+                <a:sym typeface="Calibri"/>
+              </a:rPr>
+              <a:t>Open dump.visit and output.ex2 in VisIt</a:t>
+            </a:r>
+            <a:endParaRPr sz="1800" b="0" i="0" u="none" strike="noStrike" cap="none">
+              <a:solidFill>
+                <a:schemeClr val="dk1"/>
+              </a:solidFill>
+              <a:latin typeface="Calibri"/>
+              <a:ea typeface="Calibri"/>
+              <a:cs typeface="Calibri"/>
+              <a:sym typeface="Calibri"/>
+            </a:endParaRPr>
+          </a:p>
+          <a:p>
+            <a:pPr marL="342900" marR="0" lvl="0" indent="-342900" algn="l" rtl="0">
+              <a:spcBef>
+                <a:spcPts val="0"/>
+              </a:spcBef>
+              <a:spcAft>
+                <a:spcPts val="0"/>
+              </a:spcAft>
+              <a:buClr>
+                <a:schemeClr val="dk1"/>
+              </a:buClr>
+              <a:buSzPts val="1900"/>
+              <a:buFont typeface="Calibri"/>
+              <a:buChar char="●"/>
+            </a:pPr>
+            <a:r>
+              <a:rPr lang="en-US" sz="3200" b="0" i="0" u="none" strike="noStrike" cap="none">
+                <a:solidFill>
+                  <a:schemeClr val="dk1"/>
+                </a:solidFill>
+                <a:latin typeface="Calibri"/>
+                <a:ea typeface="Calibri"/>
+                <a:cs typeface="Calibri"/>
+                <a:sym typeface="Calibri"/>
+              </a:rPr>
+              <a:t>In the left hand corner, unclick the “Apply operators to all plots” option</a:t>
+            </a:r>
+            <a:endParaRPr sz="3200" b="0" i="0" u="none" strike="noStrike" cap="none">
+              <a:solidFill>
+                <a:schemeClr val="dk1"/>
+              </a:solidFill>
+              <a:latin typeface="Calibri"/>
+              <a:ea typeface="Calibri"/>
+              <a:cs typeface="Calibri"/>
+              <a:sym typeface="Calibri"/>
+            </a:endParaRPr>
+          </a:p>
+          <a:p>
+            <a:pPr marL="342900" marR="0" lvl="0" indent="-222250" algn="l" rtl="0">
+              <a:spcBef>
+                <a:spcPts val="640"/>
+              </a:spcBef>
+              <a:spcAft>
+                <a:spcPts val="0"/>
+              </a:spcAft>
+              <a:buClr>
+                <a:schemeClr val="dk1"/>
+              </a:buClr>
+              <a:buSzPts val="1900"/>
+              <a:buFont typeface="Calibri"/>
+              <a:buNone/>
+            </a:pPr>
+            <a:endParaRPr sz="1800" b="0" i="0" u="none" strike="noStrike" cap="none">
+              <a:solidFill>
+                <a:schemeClr val="dk1"/>
+              </a:solidFill>
+              <a:latin typeface="Calibri"/>
+              <a:ea typeface="Calibri"/>
+              <a:cs typeface="Calibri"/>
+              <a:sym typeface="Calibri"/>
+            </a:endParaRPr>
+          </a:p>
+          <a:p>
+            <a:pPr marL="342900" marR="0" lvl="0" indent="-222250" algn="l" rtl="0">
+              <a:spcBef>
+                <a:spcPts val="640"/>
+              </a:spcBef>
+              <a:spcAft>
+                <a:spcPts val="0"/>
+              </a:spcAft>
+              <a:buClr>
+                <a:schemeClr val="dk1"/>
+              </a:buClr>
+              <a:buSzPts val="1900"/>
+              <a:buFont typeface="Calibri"/>
+              <a:buNone/>
+            </a:pPr>
+            <a:endParaRPr sz="1800" b="0" i="0" u="none" strike="noStrike" cap="none">
+              <a:solidFill>
+                <a:schemeClr val="dk1"/>
+              </a:solidFill>
+              <a:latin typeface="Calibri"/>
+              <a:ea typeface="Calibri"/>
+              <a:cs typeface="Calibri"/>
+              <a:sym typeface="Calibri"/>
+            </a:endParaRPr>
+          </a:p>
+          <a:p>
+            <a:pPr marL="342900" marR="0" lvl="0" indent="-342900" algn="l" rtl="0">
+              <a:spcBef>
+                <a:spcPts val="640"/>
+              </a:spcBef>
+              <a:spcAft>
+                <a:spcPts val="0"/>
+              </a:spcAft>
+              <a:buClr>
+                <a:schemeClr val="dk1"/>
+              </a:buClr>
+              <a:buSzPts val="1900"/>
+              <a:buFont typeface="Calibri"/>
+              <a:buChar char="●"/>
+            </a:pPr>
+            <a:r>
+              <a:rPr lang="en-US" sz="3200" b="0" i="0" u="none" strike="noStrike" cap="none">
+                <a:solidFill>
+                  <a:schemeClr val="dk1"/>
+                </a:solidFill>
+                <a:latin typeface="Calibri"/>
+                <a:ea typeface="Calibri"/>
+                <a:cs typeface="Calibri"/>
+                <a:sym typeface="Calibri"/>
+              </a:rPr>
+              <a:t>Under active source, choose the output.ex2</a:t>
+            </a:r>
+            <a:endParaRPr sz="3200" b="0" i="0" u="none" strike="noStrike" cap="none">
+              <a:solidFill>
+                <a:schemeClr val="dk1"/>
+              </a:solidFill>
+              <a:latin typeface="Calibri"/>
+              <a:ea typeface="Calibri"/>
+              <a:cs typeface="Calibri"/>
+              <a:sym typeface="Calibri"/>
+            </a:endParaRPr>
+          </a:p>
+          <a:p>
+            <a:pPr marL="342900" marR="0" lvl="0" indent="-342900" algn="l" rtl="0">
+              <a:spcBef>
+                <a:spcPts val="0"/>
+              </a:spcBef>
+              <a:spcAft>
+                <a:spcPts val="0"/>
+              </a:spcAft>
+              <a:buClr>
+                <a:schemeClr val="dk1"/>
+              </a:buClr>
+              <a:buSzPts val="1900"/>
+              <a:buFont typeface="Calibri"/>
+              <a:buChar char="●"/>
+            </a:pPr>
+            <a:r>
+              <a:rPr lang="en-US" sz="3200" b="0" i="0" u="none" strike="noStrike" cap="none">
+                <a:solidFill>
+                  <a:schemeClr val="dk1"/>
+                </a:solidFill>
+                <a:latin typeface="Calibri"/>
+                <a:ea typeface="Calibri"/>
+                <a:cs typeface="Calibri"/>
+                <a:sym typeface="Calibri"/>
+              </a:rPr>
+              <a:t>Load mesh (but don’t Draw)</a:t>
+            </a:r>
+            <a:endParaRPr sz="3200" b="0" i="0" u="none" strike="noStrike" cap="none">
+              <a:solidFill>
+                <a:schemeClr val="dk1"/>
+              </a:solidFill>
+              <a:latin typeface="Calibri"/>
+              <a:ea typeface="Calibri"/>
+              <a:cs typeface="Calibri"/>
+              <a:sym typeface="Calibri"/>
+            </a:endParaRPr>
+          </a:p>
+          <a:p>
+            <a:pPr marL="342900" marR="0" lvl="0" indent="-222250" algn="l" rtl="0">
+              <a:spcBef>
+                <a:spcPts val="640"/>
+              </a:spcBef>
+              <a:spcAft>
+                <a:spcPts val="0"/>
+              </a:spcAft>
+              <a:buClr>
+                <a:schemeClr val="dk1"/>
+              </a:buClr>
+              <a:buSzPts val="1900"/>
+              <a:buFont typeface="Calibri"/>
+              <a:buNone/>
+            </a:pPr>
+            <a:endParaRPr sz="1800" b="0" i="0" u="none" strike="noStrike" cap="none">
+              <a:solidFill>
+                <a:schemeClr val="dk1"/>
+              </a:solidFill>
+              <a:latin typeface="Calibri"/>
+              <a:ea typeface="Calibri"/>
+              <a:cs typeface="Calibri"/>
+              <a:sym typeface="Calibri"/>
+            </a:endParaRPr>
+          </a:p>
+        </p:txBody>
+      </p:sp>
+    </p:spTree>
+  </p:cSld>
+  <p:clrMapOvr>
+    <a:masterClrMapping/>
+  </p:clrMapOvr>
+</p:sld>
+</file>
+
+<file path=ppt/slides/slide21.xml><?xml version="1.0" encoding="utf-8"?>
 <p:sld xmlns:a="http://schemas.openxmlformats.org/drawingml/2006/main" xmlns:r="http://schemas.openxmlformats.org/officeDocument/2006/relationships" xmlns:p="http://schemas.openxmlformats.org/presentationml/2006/main">
   <p:cSld>
     <p:spTree>
@@ -23194,7 +23486,7 @@
 </p:sld>
 </file>
 
-<file path=ppt/slides/slide21.xml><?xml version="1.0" encoding="utf-8"?>
+<file path=ppt/slides/slide22.xml><?xml version="1.0" encoding="utf-8"?>
 <p:sld xmlns:a="http://schemas.openxmlformats.org/drawingml/2006/main" xmlns:r="http://schemas.openxmlformats.org/officeDocument/2006/relationships" xmlns:p="http://schemas.openxmlformats.org/presentationml/2006/main">
   <p:cSld>
     <p:spTree>
@@ -23502,7 +23794,7 @@
 </p:sld>
 </file>
 
-<file path=ppt/slides/slide22.xml><?xml version="1.0" encoding="utf-8"?>
+<file path=ppt/slides/slide23.xml><?xml version="1.0" encoding="utf-8"?>
 <p:sld xmlns:a="http://schemas.openxmlformats.org/drawingml/2006/main" xmlns:r="http://schemas.openxmlformats.org/officeDocument/2006/relationships" xmlns:p="http://schemas.openxmlformats.org/presentationml/2006/main">
   <p:cSld>
     <p:spTree>
@@ -23871,7 +24163,7 @@
 </p:sld>
 </file>
 
-<file path=ppt/slides/slide23.xml><?xml version="1.0" encoding="utf-8"?>
+<file path=ppt/slides/slide24.xml><?xml version="1.0" encoding="utf-8"?>
 <p:sld xmlns:a="http://schemas.openxmlformats.org/drawingml/2006/main" xmlns:r="http://schemas.openxmlformats.org/officeDocument/2006/relationships" xmlns:p="http://schemas.openxmlformats.org/presentationml/2006/main">
   <p:cSld>
     <p:spTree>
@@ -24169,7 +24461,7 @@
 </p:sld>
 </file>
 
-<file path=ppt/slides/slide24.xml><?xml version="1.0" encoding="utf-8"?>
+<file path=ppt/slides/slide25.xml><?xml version="1.0" encoding="utf-8"?>
 <p:sld xmlns:a="http://schemas.openxmlformats.org/drawingml/2006/main" xmlns:r="http://schemas.openxmlformats.org/officeDocument/2006/relationships" xmlns:p="http://schemas.openxmlformats.org/presentationml/2006/main">
   <p:cSld>
     <p:spTree>
@@ -24725,15 +25017,7 @@
             </a:r>
             <a:r>
               <a:rPr lang="en-US" sz="1800" dirty="0"/>
-              <a:t>, </a:t>
-            </a:r>
-            <a:r>
-              <a:rPr lang="en-US" sz="1800" dirty="0" smtClean="0"/>
-              <a:t>Trellis, Bolt) </a:t>
-            </a:r>
-            <a:r>
-              <a:rPr lang="en-US" sz="1800" dirty="0"/>
-              <a:t>and read it in your </a:t>
+              <a:t>, Trellis, Bolt) and read it in your </a:t>
             </a:r>
             <a:r>
               <a:rPr lang="en-US" sz="1800" dirty="0" err="1"/>
@@ -24871,7 +25155,7 @@
               </a:spcAft>
               <a:buNone/>
             </a:pPr>
-            <a:endParaRPr lang="en-US" sz="1800" dirty="0" smtClean="0"/>
+            <a:endParaRPr lang="en-US" sz="1800" dirty="0"/>
           </a:p>
           <a:p>
             <a:pPr marL="0" lvl="0" indent="0" algn="l" rtl="0">
@@ -24884,7 +25168,7 @@
               <a:buNone/>
             </a:pPr>
             <a:r>
-              <a:rPr lang="en-US" sz="1800" dirty="0" smtClean="0"/>
+              <a:rPr lang="en-US" sz="1800" dirty="0"/>
               <a:t>For review of solid mechanics, see</a:t>
             </a:r>
           </a:p>
@@ -24906,15 +25190,7 @@
             </a:pPr>
             <a:r>
               <a:rPr lang="en-US" sz="1800" dirty="0"/>
-              <a:t>For PK1, see </a:t>
-            </a:r>
-            <a:r>
-              <a:rPr lang="en-US" sz="1800" dirty="0" smtClean="0"/>
-              <a:t>3.5 Stress </a:t>
-            </a:r>
-            <a:r>
-              <a:rPr lang="en-US" sz="1800" dirty="0"/>
-              <a:t>Measures for Large Deformations</a:t>
+              <a:t>For PK1, see 3.5 Stress Measures for Large Deformations</a:t>
             </a:r>
             <a:endParaRPr sz="1800" dirty="0"/>
           </a:p>
@@ -25242,11 +25518,7 @@
             </a:pPr>
             <a:r>
               <a:rPr lang="en-US" dirty="0"/>
-              <a:t>Input2D - IBFE specific </a:t>
-            </a:r>
-            <a:r>
-              <a:rPr lang="en-US" dirty="0" smtClean="0"/>
-              <a:t>lines</a:t>
+              <a:t>Input2D - IBFE specific lines</a:t>
             </a:r>
           </a:p>
           <a:p>
@@ -25847,7 +26119,6 @@
               <a:rPr lang="en-US" dirty="0"/>
               <a:t> flags </a:t>
             </a:r>
-            <a:endParaRPr lang="en-US" dirty="0" smtClean="0"/>
           </a:p>
           <a:p>
             <a:pPr marL="0" lvl="0" indent="0" algn="l" rtl="0">
@@ -25859,7 +26130,7 @@
               </a:spcAft>
               <a:buNone/>
             </a:pPr>
-            <a:endParaRPr lang="en-US" sz="1400" dirty="0" smtClean="0"/>
+            <a:endParaRPr lang="en-US" sz="1400" dirty="0"/>
           </a:p>
           <a:p>
             <a:pPr marL="0" lvl="0" indent="0" algn="l" rtl="0">
@@ -25872,12 +26143,8 @@
               <a:buNone/>
             </a:pPr>
             <a:r>
-              <a:rPr lang="en-US" sz="1400" dirty="0" smtClean="0"/>
-              <a:t>At </a:t>
-            </a:r>
-            <a:r>
               <a:rPr lang="en-US" sz="1400" dirty="0"/>
-              <a:t>the beginning of the </a:t>
+              <a:t>At the beginning of the </a:t>
             </a:r>
             <a:r>
               <a:rPr lang="en-US" sz="1400" dirty="0" err="1"/>
@@ -25971,102 +26238,6 @@
               <a:t>IBAMR_SRC_DIR = /</a:t>
             </a:r>
             <a:r>
-              <a:rPr lang="en-US" sz="1200" dirty="0" err="1" smtClean="0">
-                <a:latin typeface="Courier New"/>
-                <a:ea typeface="Courier New"/>
-                <a:cs typeface="Courier New"/>
-                <a:sym typeface="Courier New"/>
-              </a:rPr>
-              <a:t>nas</a:t>
-            </a:r>
-            <a:r>
-              <a:rPr lang="en-US" sz="1200" dirty="0" smtClean="0">
-                <a:latin typeface="Courier New"/>
-                <a:ea typeface="Courier New"/>
-                <a:cs typeface="Courier New"/>
-                <a:sym typeface="Courier New"/>
-              </a:rPr>
-              <a:t>/longleaf/apps-dogwood/</a:t>
-            </a:r>
-            <a:r>
-              <a:rPr lang="en-US" sz="1200" dirty="0" err="1" smtClean="0">
-                <a:latin typeface="Courier New"/>
-                <a:ea typeface="Courier New"/>
-                <a:cs typeface="Courier New"/>
-                <a:sym typeface="Courier New"/>
-              </a:rPr>
-              <a:t>ibamr</a:t>
-            </a:r>
-            <a:r>
-              <a:rPr lang="en-US" sz="1200" dirty="0" smtClean="0">
-                <a:latin typeface="Courier New"/>
-                <a:ea typeface="Courier New"/>
-                <a:cs typeface="Courier New"/>
-                <a:sym typeface="Courier New"/>
-              </a:rPr>
-              <a:t>/2018-03/</a:t>
-            </a:r>
-            <a:r>
-              <a:rPr lang="en-US" sz="1200" dirty="0" err="1" smtClean="0">
-                <a:latin typeface="Courier New"/>
-                <a:ea typeface="Courier New"/>
-                <a:cs typeface="Courier New"/>
-                <a:sym typeface="Courier New"/>
-              </a:rPr>
-              <a:t>sfw</a:t>
-            </a:r>
-            <a:r>
-              <a:rPr lang="en-US" sz="1200" dirty="0" smtClean="0">
-                <a:latin typeface="Courier New"/>
-                <a:ea typeface="Courier New"/>
-                <a:cs typeface="Courier New"/>
-                <a:sym typeface="Courier New"/>
-              </a:rPr>
-              <a:t>/</a:t>
-            </a:r>
-            <a:r>
-              <a:rPr lang="en-US" sz="1200" dirty="0" err="1" smtClean="0">
-                <a:latin typeface="Courier New"/>
-                <a:ea typeface="Courier New"/>
-                <a:cs typeface="Courier New"/>
-                <a:sym typeface="Courier New"/>
-              </a:rPr>
-              <a:t>ibamr</a:t>
-            </a:r>
-            <a:r>
-              <a:rPr lang="en-US" sz="1200" dirty="0" smtClean="0">
-                <a:latin typeface="Courier New"/>
-                <a:ea typeface="Courier New"/>
-                <a:cs typeface="Courier New"/>
-                <a:sym typeface="Courier New"/>
-              </a:rPr>
-              <a:t>/IBAMR</a:t>
-            </a:r>
-          </a:p>
-          <a:p>
-            <a:pPr marL="0" lvl="0" indent="0">
-              <a:buSzPts val="1100"/>
-              <a:buNone/>
-            </a:pPr>
-            <a:r>
-              <a:rPr lang="en-US" sz="1200" dirty="0" smtClean="0">
-                <a:latin typeface="Courier New"/>
-                <a:ea typeface="Courier New"/>
-                <a:cs typeface="Courier New"/>
-                <a:sym typeface="Courier New"/>
-              </a:rPr>
-              <a:t>IBAMR_BUILD_DIR  </a:t>
-            </a:r>
-            <a:r>
-              <a:rPr lang="en-US" sz="1200" dirty="0">
-                <a:latin typeface="Courier New"/>
-                <a:ea typeface="Courier New"/>
-                <a:cs typeface="Courier New"/>
-                <a:sym typeface="Courier New"/>
-              </a:rPr>
-              <a:t>=/</a:t>
-            </a:r>
-            <a:r>
               <a:rPr lang="en-US" sz="1200" dirty="0" err="1">
                 <a:latin typeface="Courier New"/>
                 <a:ea typeface="Courier New"/>
@@ -26136,7 +26307,40 @@
                 <a:cs typeface="Courier New"/>
                 <a:sym typeface="Courier New"/>
               </a:rPr>
-              <a:t>/</a:t>
+              <a:t>/IBAMR</a:t>
+            </a:r>
+          </a:p>
+          <a:p>
+            <a:pPr marL="0" lvl="0" indent="0">
+              <a:buSzPts val="1100"/>
+              <a:buNone/>
+            </a:pPr>
+            <a:r>
+              <a:rPr lang="en-US" sz="1200" dirty="0">
+                <a:latin typeface="Courier New"/>
+                <a:ea typeface="Courier New"/>
+                <a:cs typeface="Courier New"/>
+                <a:sym typeface="Courier New"/>
+              </a:rPr>
+              <a:t>IBAMR_BUILD_DIR  =/</a:t>
+            </a:r>
+            <a:r>
+              <a:rPr lang="en-US" sz="1200" dirty="0" err="1">
+                <a:latin typeface="Courier New"/>
+                <a:ea typeface="Courier New"/>
+                <a:cs typeface="Courier New"/>
+                <a:sym typeface="Courier New"/>
+              </a:rPr>
+              <a:t>nas</a:t>
+            </a:r>
+            <a:r>
+              <a:rPr lang="en-US" sz="1200" dirty="0">
+                <a:latin typeface="Courier New"/>
+                <a:ea typeface="Courier New"/>
+                <a:cs typeface="Courier New"/>
+                <a:sym typeface="Courier New"/>
+              </a:rPr>
+              <a:t>/longleaf/apps-dogwood/</a:t>
             </a:r>
             <a:r>
               <a:rPr lang="en-US" sz="1200" dirty="0" err="1">
@@ -26154,6 +26358,60 @@
                 <a:cs typeface="Courier New"/>
                 <a:sym typeface="Courier New"/>
               </a:rPr>
+              <a:t>/2018-03/</a:t>
+            </a:r>
+            <a:r>
+              <a:rPr lang="en-US" sz="1200" dirty="0" err="1">
+                <a:latin typeface="Courier New"/>
+                <a:ea typeface="Courier New"/>
+                <a:cs typeface="Courier New"/>
+                <a:sym typeface="Courier New"/>
+              </a:rPr>
+              <a:t>sfw</a:t>
+            </a:r>
+            <a:r>
+              <a:rPr lang="en-US" sz="1200" dirty="0">
+                <a:latin typeface="Courier New"/>
+                <a:ea typeface="Courier New"/>
+                <a:cs typeface="Courier New"/>
+                <a:sym typeface="Courier New"/>
+              </a:rPr>
+              <a:t>/</a:t>
+            </a:r>
+            <a:r>
+              <a:rPr lang="en-US" sz="1200" dirty="0" err="1">
+                <a:latin typeface="Courier New"/>
+                <a:ea typeface="Courier New"/>
+                <a:cs typeface="Courier New"/>
+                <a:sym typeface="Courier New"/>
+              </a:rPr>
+              <a:t>ibamr</a:t>
+            </a:r>
+            <a:r>
+              <a:rPr lang="en-US" sz="1200" dirty="0">
+                <a:latin typeface="Courier New"/>
+                <a:ea typeface="Courier New"/>
+                <a:cs typeface="Courier New"/>
+                <a:sym typeface="Courier New"/>
+              </a:rPr>
+              <a:t>/</a:t>
+            </a:r>
+            <a:r>
+              <a:rPr lang="en-US" sz="1200" dirty="0" err="1">
+                <a:latin typeface="Courier New"/>
+                <a:ea typeface="Courier New"/>
+                <a:cs typeface="Courier New"/>
+                <a:sym typeface="Courier New"/>
+              </a:rPr>
+              <a:t>ibamr</a:t>
+            </a:r>
+            <a:r>
+              <a:rPr lang="en-US" sz="1200" dirty="0">
+                <a:latin typeface="Courier New"/>
+                <a:ea typeface="Courier New"/>
+                <a:cs typeface="Courier New"/>
+                <a:sym typeface="Courier New"/>
+              </a:rPr>
               <a:t>-</a:t>
             </a:r>
             <a:r>
@@ -26191,7 +26449,7 @@
               </a:spcAft>
               <a:buNone/>
             </a:pPr>
-            <a:endParaRPr lang="en-US" sz="1400" dirty="0" smtClean="0"/>
+            <a:endParaRPr lang="en-US" sz="1400" dirty="0"/>
           </a:p>
           <a:p>
             <a:pPr marL="0" lvl="0" indent="0" algn="l" rtl="0">
@@ -26400,7 +26658,6 @@
               <a:rPr lang="en-US" sz="1800" dirty="0"/>
               <a:t>Goal: have a plate move up to .5 (in 1 s) then down 1.0 (in 2s), after which the force is turned off (for 1 s). </a:t>
             </a:r>
-            <a:endParaRPr lang="en-US" sz="1800" dirty="0" smtClean="0"/>
           </a:p>
           <a:p>
             <a:pPr marL="0" lvl="0" indent="0" algn="l" rtl="0">
@@ -26425,12 +26682,8 @@
               <a:buNone/>
             </a:pPr>
             <a:r>
-              <a:rPr lang="en-US" sz="1800" dirty="0" smtClean="0"/>
-              <a:t>This is similar to target </a:t>
-            </a:r>
-            <a:r>
               <a:rPr lang="en-US" sz="1800" dirty="0"/>
-              <a:t>points, but you’re using </a:t>
+              <a:t>This is similar to target points, but you’re using </a:t>
             </a:r>
             <a:r>
               <a:rPr lang="en-US" sz="1800" i="1" dirty="0"/>
@@ -26631,7 +26884,6 @@
               <a:rPr lang="en-US" sz="1600" dirty="0"/>
               <a:t>Below is an example of moving the beam. </a:t>
             </a:r>
-            <a:endParaRPr lang="en-US" sz="1600" dirty="0" smtClean="0"/>
           </a:p>
           <a:p>
             <a:pPr marL="0" lvl="0" indent="0" algn="l" rtl="0">
@@ -26644,12 +26896,8 @@
               <a:buNone/>
             </a:pPr>
             <a:r>
-              <a:rPr lang="en-US" sz="1600" dirty="0" smtClean="0"/>
-              <a:t>(</a:t>
-            </a:r>
-            <a:r>
               <a:rPr lang="en-US" sz="1600" dirty="0"/>
-              <a:t>s(0), s(1)) are the (</a:t>
+              <a:t>(s(0), s(1)) are the (</a:t>
             </a:r>
             <a:r>
               <a:rPr lang="en-US" sz="1600" dirty="0" err="1"/>
@@ -26671,7 +26919,7 @@
               </a:spcAft>
               <a:buNone/>
             </a:pPr>
-            <a:endParaRPr lang="en-US" sz="1600" dirty="0" smtClean="0"/>
+            <a:endParaRPr lang="en-US" sz="1600" dirty="0"/>
           </a:p>
           <a:p>
             <a:pPr marL="0" lvl="0" indent="0" algn="l" rtl="0">
@@ -26684,7 +26932,7 @@
               <a:buNone/>
             </a:pPr>
             <a:r>
-              <a:rPr lang="en-US" sz="1600" dirty="0" smtClean="0"/>
+              <a:rPr lang="en-US" sz="1600" dirty="0"/>
               <a:t>(</a:t>
             </a:r>
             <a:r>
@@ -26693,11 +26941,7 @@
             </a:r>
             <a:r>
               <a:rPr lang="en-US" sz="1600" dirty="0"/>
-              <a:t>(0</a:t>
-            </a:r>
-            <a:r>
-              <a:rPr lang="en-US" sz="1600" dirty="0" smtClean="0"/>
-              <a:t>), </a:t>
+              <a:t>(0), </a:t>
             </a:r>
             <a:r>
               <a:rPr lang="en-US" sz="1600" dirty="0" err="1"/>
@@ -26755,7 +26999,7 @@
               </a:spcAft>
               <a:buNone/>
             </a:pPr>
-            <a:endParaRPr lang="en-US" sz="1600" dirty="0" smtClean="0"/>
+            <a:endParaRPr lang="en-US" sz="1600" dirty="0"/>
           </a:p>
           <a:p>
             <a:pPr marL="0" lvl="0" indent="0">
@@ -26783,24 +27027,12 @@
               <a:buNone/>
             </a:pPr>
             <a:r>
-              <a:rPr lang="en-US" sz="1600" dirty="0" err="1" smtClean="0"/>
+              <a:rPr lang="en-US" sz="1600" dirty="0" err="1"/>
               <a:t>s_dump</a:t>
             </a:r>
             <a:r>
-              <a:rPr lang="en-US" sz="1600" dirty="0" smtClean="0"/>
-              <a:t>(1</a:t>
-            </a:r>
-            <a:r>
               <a:rPr lang="en-US" sz="1600" dirty="0"/>
-              <a:t>)=s(1)+.5*time; </a:t>
-            </a:r>
-            <a:r>
-              <a:rPr lang="en-US" sz="1600" dirty="0" smtClean="0"/>
-              <a:t>	// s(1</a:t>
-            </a:r>
-            <a:r>
-              <a:rPr lang="en-US" sz="1600" dirty="0"/>
-              <a:t>) is the x-coordinate of the reference configuration. </a:t>
+              <a:t>(1)=s(1)+.5*time; 	// s(1) is the x-coordinate of the reference configuration. </a:t>
             </a:r>
             <a:endParaRPr sz="1600" dirty="0"/>
           </a:p>
@@ -26820,24 +27052,12 @@
               <a:buNone/>
             </a:pPr>
             <a:r>
-              <a:rPr lang="en-US" sz="1600" dirty="0" err="1" smtClean="0"/>
+              <a:rPr lang="en-US" sz="1600" dirty="0" err="1"/>
               <a:t>s_dump</a:t>
             </a:r>
             <a:r>
-              <a:rPr lang="en-US" sz="1600" dirty="0" smtClean="0"/>
-              <a:t>(0</a:t>
-            </a:r>
-            <a:r>
               <a:rPr lang="en-US" sz="1600" dirty="0"/>
-              <a:t>)=s(0);   </a:t>
-            </a:r>
-            <a:r>
-              <a:rPr lang="en-US" sz="1600" dirty="0" smtClean="0"/>
-              <a:t>		//</a:t>
-            </a:r>
-            <a:r>
-              <a:rPr lang="en-US" sz="1600" dirty="0"/>
-              <a:t>s(0) is the x-coordinate of the reference configuration</a:t>
+              <a:t>(0)=s(0);   		//s(0) is the x-coordinate of the reference configuration</a:t>
             </a:r>
             <a:endParaRPr sz="1600" dirty="0"/>
           </a:p>
@@ -26975,7 +27195,7 @@
               <a:buFont typeface="Arial"/>
               <a:buNone/>
             </a:pPr>
-            <a:endParaRPr lang="en-US" sz="1600" dirty="0" smtClean="0"/>
+            <a:endParaRPr lang="en-US" sz="1600" dirty="0"/>
           </a:p>
           <a:p>
             <a:pPr marL="0" lvl="0" indent="0">
@@ -26984,15 +27204,7 @@
             </a:pPr>
             <a:r>
               <a:rPr lang="en-US" sz="1600" dirty="0"/>
-              <a:t>//only change the </a:t>
-            </a:r>
-            <a:r>
-              <a:rPr lang="en-US" sz="1600" dirty="0" smtClean="0"/>
-              <a:t>x-coordinate</a:t>
-            </a:r>
-            <a:r>
-              <a:rPr lang="en-US" sz="1600" dirty="0"/>
-              <a:t>.</a:t>
+              <a:t>//only change the x-coordinate.</a:t>
             </a:r>
             <a:endParaRPr sz="1600" dirty="0"/>
           </a:p>
@@ -27012,32 +27224,12 @@
               <a:buNone/>
             </a:pPr>
             <a:r>
-              <a:rPr lang="en-US" sz="1600" dirty="0" err="1" smtClean="0"/>
+              <a:rPr lang="en-US" sz="1600" dirty="0" err="1"/>
               <a:t>s_dump</a:t>
             </a:r>
             <a:r>
-              <a:rPr lang="en-US" sz="1600" dirty="0" smtClean="0"/>
-              <a:t>(1</a:t>
-            </a:r>
-            <a:r>
               <a:rPr lang="en-US" sz="1600" dirty="0"/>
-              <a:t>)=s(1); </a:t>
-            </a:r>
-            <a:r>
-              <a:rPr lang="en-US" sz="1600" dirty="0" smtClean="0"/>
-              <a:t>		//s(1</a:t>
-            </a:r>
-            <a:r>
-              <a:rPr lang="en-US" sz="1600" dirty="0"/>
-              <a:t>) is the </a:t>
-            </a:r>
-            <a:r>
-              <a:rPr lang="en-US" sz="1600" dirty="0" smtClean="0"/>
-              <a:t>y-coordinate </a:t>
-            </a:r>
-            <a:r>
-              <a:rPr lang="en-US" sz="1600" dirty="0"/>
-              <a:t>of the reference configuration. </a:t>
+              <a:t>(1)=s(1); 		//s(1) is the y-coordinate of the reference configuration. </a:t>
             </a:r>
             <a:endParaRPr sz="1600" dirty="0"/>
           </a:p>
@@ -27057,24 +27249,12 @@
               <a:buNone/>
             </a:pPr>
             <a:r>
-              <a:rPr lang="en-US" sz="1600" dirty="0" err="1" smtClean="0"/>
+              <a:rPr lang="en-US" sz="1600" dirty="0" err="1"/>
               <a:t>s_dump</a:t>
             </a:r>
             <a:r>
-              <a:rPr lang="en-US" sz="1600" dirty="0" smtClean="0"/>
-              <a:t>(0</a:t>
-            </a:r>
-            <a:r>
               <a:rPr lang="en-US" sz="1600" dirty="0"/>
-              <a:t>)=s(0)-0.3*time;   </a:t>
-            </a:r>
-            <a:r>
-              <a:rPr lang="en-US" sz="1600" dirty="0" smtClean="0"/>
-              <a:t>	//</a:t>
-            </a:r>
-            <a:r>
-              <a:rPr lang="en-US" sz="1600" dirty="0"/>
-              <a:t>s(0) is the x-coordinate of the reference configuration</a:t>
+              <a:t>(0)=s(0)-0.3*time;   	//s(0) is the x-coordinate of the reference configuration</a:t>
             </a:r>
             <a:endParaRPr dirty="0"/>
           </a:p>

</xml_diff>

<commit_message>
Corrected IBFE - 1 examples
</commit_message>
<xml_diff>
--- a/IBFE Lectures/1-IBFE Getting Starting and Visualizing a Mesh.pptx
+++ b/IBFE Lectures/1-IBFE Getting Starting and Visualizing a Mesh.pptx
@@ -6,7 +6,7 @@
     <p:sldMasterId id="2147483666" r:id="rId2"/>
   </p:sldMasterIdLst>
   <p:notesMasterIdLst>
-    <p:notesMasterId r:id="rId28"/>
+    <p:notesMasterId r:id="rId29"/>
   </p:notesMasterIdLst>
   <p:sldIdLst>
     <p:sldId id="256" r:id="rId3"/>
@@ -20,20 +20,21 @@
     <p:sldId id="265" r:id="rId11"/>
     <p:sldId id="266" r:id="rId12"/>
     <p:sldId id="284" r:id="rId13"/>
-    <p:sldId id="283" r:id="rId14"/>
-    <p:sldId id="268" r:id="rId15"/>
-    <p:sldId id="271" r:id="rId16"/>
+    <p:sldId id="285" r:id="rId14"/>
+    <p:sldId id="283" r:id="rId15"/>
+    <p:sldId id="268" r:id="rId16"/>
     <p:sldId id="272" r:id="rId17"/>
-    <p:sldId id="273" r:id="rId18"/>
-    <p:sldId id="274" r:id="rId19"/>
-    <p:sldId id="275" r:id="rId20"/>
-    <p:sldId id="276" r:id="rId21"/>
-    <p:sldId id="277" r:id="rId22"/>
-    <p:sldId id="278" r:id="rId23"/>
-    <p:sldId id="279" r:id="rId24"/>
-    <p:sldId id="280" r:id="rId25"/>
-    <p:sldId id="281" r:id="rId26"/>
-    <p:sldId id="282" r:id="rId27"/>
+    <p:sldId id="271" r:id="rId18"/>
+    <p:sldId id="273" r:id="rId19"/>
+    <p:sldId id="274" r:id="rId20"/>
+    <p:sldId id="275" r:id="rId21"/>
+    <p:sldId id="276" r:id="rId22"/>
+    <p:sldId id="277" r:id="rId23"/>
+    <p:sldId id="278" r:id="rId24"/>
+    <p:sldId id="279" r:id="rId25"/>
+    <p:sldId id="280" r:id="rId26"/>
+    <p:sldId id="281" r:id="rId27"/>
+    <p:sldId id="282" r:id="rId28"/>
   </p:sldIdLst>
   <p:sldSz cx="9144000" cy="6858000" type="screen4x3"/>
   <p:notesSz cx="6858000" cy="9144000"/>
@@ -1141,6 +1142,110 @@
   <p:cSld>
     <p:spTree>
       <p:nvGrpSpPr>
+        <p:cNvPr id="1" name="Shape 185"/>
+        <p:cNvGrpSpPr/>
+        <p:nvPr/>
+      </p:nvGrpSpPr>
+      <p:grpSpPr>
+        <a:xfrm>
+          <a:off x="0" y="0"/>
+          <a:ext cx="0" cy="0"/>
+          <a:chOff x="0" y="0"/>
+          <a:chExt cx="0" cy="0"/>
+        </a:xfrm>
+      </p:grpSpPr>
+      <p:sp>
+        <p:nvSpPr>
+          <p:cNvPr id="186" name="Google Shape;186;g368ef03ea2_0_71:notes"/>
+          <p:cNvSpPr>
+            <a:spLocks noGrp="1" noRot="1" noChangeAspect="1"/>
+          </p:cNvSpPr>
+          <p:nvPr>
+            <p:ph type="sldImg" idx="2"/>
+          </p:nvPr>
+        </p:nvSpPr>
+        <p:spPr>
+          <a:xfrm>
+            <a:off x="1143000" y="685800"/>
+            <a:ext cx="4572000" cy="3429000"/>
+          </a:xfrm>
+          <a:custGeom>
+            <a:avLst/>
+            <a:gdLst/>
+            <a:ahLst/>
+            <a:cxnLst/>
+            <a:rect l="l" t="t" r="r" b="b"/>
+            <a:pathLst>
+              <a:path w="120000" h="120000" extrusionOk="0">
+                <a:moveTo>
+                  <a:pt x="0" y="0"/>
+                </a:moveTo>
+                <a:lnTo>
+                  <a:pt x="120000" y="0"/>
+                </a:lnTo>
+                <a:lnTo>
+                  <a:pt x="120000" y="120000"/>
+                </a:lnTo>
+                <a:lnTo>
+                  <a:pt x="0" y="120000"/>
+                </a:lnTo>
+                <a:close/>
+              </a:path>
+            </a:pathLst>
+          </a:custGeom>
+        </p:spPr>
+      </p:sp>
+      <p:sp>
+        <p:nvSpPr>
+          <p:cNvPr id="187" name="Google Shape;187;g368ef03ea2_0_71:notes"/>
+          <p:cNvSpPr txBox="1">
+            <a:spLocks noGrp="1"/>
+          </p:cNvSpPr>
+          <p:nvPr>
+            <p:ph type="body" idx="1"/>
+          </p:nvPr>
+        </p:nvSpPr>
+        <p:spPr>
+          <a:xfrm>
+            <a:off x="685800" y="4343400"/>
+            <a:ext cx="5486400" cy="4114800"/>
+          </a:xfrm>
+          <a:prstGeom prst="rect">
+            <a:avLst/>
+          </a:prstGeom>
+        </p:spPr>
+        <p:txBody>
+          <a:bodyPr spcFirstLastPara="1" wrap="square" lIns="91425" tIns="91425" rIns="91425" bIns="91425" anchor="t" anchorCtr="0">
+            <a:noAutofit/>
+          </a:bodyPr>
+          <a:lstStyle/>
+          <a:p>
+            <a:pPr marL="0" lvl="0" indent="0" algn="l" rtl="0">
+              <a:spcBef>
+                <a:spcPts val="0"/>
+              </a:spcBef>
+              <a:spcAft>
+                <a:spcPts val="0"/>
+              </a:spcAft>
+              <a:buNone/>
+            </a:pPr>
+            <a:endParaRPr/>
+          </a:p>
+        </p:txBody>
+      </p:sp>
+    </p:spTree>
+  </p:cSld>
+  <p:clrMapOvr>
+    <a:masterClrMapping/>
+  </p:clrMapOvr>
+</p:notes>
+</file>
+
+<file path=ppt/notesSlides/notesSlide14.xml><?xml version="1.0" encoding="utf-8"?>
+<p:notes xmlns:a="http://schemas.openxmlformats.org/drawingml/2006/main" xmlns:r="http://schemas.openxmlformats.org/officeDocument/2006/relationships" xmlns:p="http://schemas.openxmlformats.org/presentationml/2006/main" showMasterSp="0" showMasterPhAnim="0">
+  <p:cSld>
+    <p:spTree>
+      <p:nvGrpSpPr>
         <p:cNvPr id="1" name="Shape 179"/>
         <p:cNvGrpSpPr/>
         <p:nvPr/>
@@ -1197,110 +1302,6 @@
       <p:sp>
         <p:nvSpPr>
           <p:cNvPr id="181" name="Google Shape;181;g368ef03ea2_0_66:notes"/>
-          <p:cNvSpPr txBox="1">
-            <a:spLocks noGrp="1"/>
-          </p:cNvSpPr>
-          <p:nvPr>
-            <p:ph type="body" idx="1"/>
-          </p:nvPr>
-        </p:nvSpPr>
-        <p:spPr>
-          <a:xfrm>
-            <a:off x="685800" y="4343400"/>
-            <a:ext cx="5486400" cy="4114800"/>
-          </a:xfrm>
-          <a:prstGeom prst="rect">
-            <a:avLst/>
-          </a:prstGeom>
-        </p:spPr>
-        <p:txBody>
-          <a:bodyPr spcFirstLastPara="1" wrap="square" lIns="91425" tIns="91425" rIns="91425" bIns="91425" anchor="t" anchorCtr="0">
-            <a:noAutofit/>
-          </a:bodyPr>
-          <a:lstStyle/>
-          <a:p>
-            <a:pPr marL="0" lvl="0" indent="0" algn="l" rtl="0">
-              <a:spcBef>
-                <a:spcPts val="0"/>
-              </a:spcBef>
-              <a:spcAft>
-                <a:spcPts val="0"/>
-              </a:spcAft>
-              <a:buNone/>
-            </a:pPr>
-            <a:endParaRPr/>
-          </a:p>
-        </p:txBody>
-      </p:sp>
-    </p:spTree>
-  </p:cSld>
-  <p:clrMapOvr>
-    <a:masterClrMapping/>
-  </p:clrMapOvr>
-</p:notes>
-</file>
-
-<file path=ppt/notesSlides/notesSlide14.xml><?xml version="1.0" encoding="utf-8"?>
-<p:notes xmlns:a="http://schemas.openxmlformats.org/drawingml/2006/main" xmlns:r="http://schemas.openxmlformats.org/officeDocument/2006/relationships" xmlns:p="http://schemas.openxmlformats.org/presentationml/2006/main" showMasterSp="0" showMasterPhAnim="0">
-  <p:cSld>
-    <p:spTree>
-      <p:nvGrpSpPr>
-        <p:cNvPr id="1" name="Shape 185"/>
-        <p:cNvGrpSpPr/>
-        <p:nvPr/>
-      </p:nvGrpSpPr>
-      <p:grpSpPr>
-        <a:xfrm>
-          <a:off x="0" y="0"/>
-          <a:ext cx="0" cy="0"/>
-          <a:chOff x="0" y="0"/>
-          <a:chExt cx="0" cy="0"/>
-        </a:xfrm>
-      </p:grpSpPr>
-      <p:sp>
-        <p:nvSpPr>
-          <p:cNvPr id="186" name="Google Shape;186;g368ef03ea2_0_71:notes"/>
-          <p:cNvSpPr>
-            <a:spLocks noGrp="1" noRot="1" noChangeAspect="1"/>
-          </p:cNvSpPr>
-          <p:nvPr>
-            <p:ph type="sldImg" idx="2"/>
-          </p:nvPr>
-        </p:nvSpPr>
-        <p:spPr>
-          <a:xfrm>
-            <a:off x="1143000" y="685800"/>
-            <a:ext cx="4572000" cy="3429000"/>
-          </a:xfrm>
-          <a:custGeom>
-            <a:avLst/>
-            <a:gdLst/>
-            <a:ahLst/>
-            <a:cxnLst/>
-            <a:rect l="l" t="t" r="r" b="b"/>
-            <a:pathLst>
-              <a:path w="120000" h="120000" extrusionOk="0">
-                <a:moveTo>
-                  <a:pt x="0" y="0"/>
-                </a:moveTo>
-                <a:lnTo>
-                  <a:pt x="120000" y="0"/>
-                </a:lnTo>
-                <a:lnTo>
-                  <a:pt x="120000" y="120000"/>
-                </a:lnTo>
-                <a:lnTo>
-                  <a:pt x="0" y="120000"/>
-                </a:lnTo>
-                <a:close/>
-              </a:path>
-            </a:pathLst>
-          </a:custGeom>
-        </p:spPr>
-      </p:sp>
-      <p:sp>
-        <p:nvSpPr>
-          <p:cNvPr id="187" name="Google Shape;187;g368ef03ea2_0_71:notes"/>
           <p:cNvSpPr txBox="1">
             <a:spLocks noGrp="1"/>
           </p:cNvSpPr>
@@ -20043,10 +20044,14 @@
               <a:buNone/>
             </a:pPr>
             <a:r>
-              <a:rPr lang="en-US" sz="3200"/>
-              <a:t>Target force function at top of main.C</a:t>
-            </a:r>
-            <a:endParaRPr sz="3200"/>
+              <a:rPr lang="en-US" sz="3200" dirty="0"/>
+              <a:t>Target force function at top of </a:t>
+            </a:r>
+            <a:r>
+              <a:rPr lang="en-US" sz="3200" dirty="0" err="1"/>
+              <a:t>main.C</a:t>
+            </a:r>
+            <a:endParaRPr sz="3200" dirty="0"/>
           </a:p>
         </p:txBody>
       </p:sp>
@@ -20087,7 +20092,7 @@
         </p:nvSpPr>
         <p:spPr>
           <a:xfrm>
-            <a:off x="321224" y="-121920"/>
+            <a:off x="303862" y="1000824"/>
             <a:ext cx="8229600" cy="4967700"/>
           </a:xfrm>
           <a:prstGeom prst="rect">
@@ -20114,7 +20119,11 @@
               <a:buFont typeface="Arial"/>
               <a:buNone/>
             </a:pPr>
-            <a:endParaRPr lang="en-US" sz="1400" dirty="0"/>
+            <a:endParaRPr lang="en-US" sz="1200" dirty="0">
+              <a:solidFill>
+                <a:schemeClr val="bg2"/>
+              </a:solidFill>
+            </a:endParaRPr>
           </a:p>
           <a:p>
             <a:pPr marL="0" lvl="0" indent="0">
@@ -20122,30 +20131,58 @@
               <a:buNone/>
             </a:pPr>
             <a:r>
-              <a:rPr lang="en-US" sz="1400" dirty="0" err="1"/>
+              <a:rPr lang="en-US" sz="1200" dirty="0" err="1">
+                <a:solidFill>
+                  <a:schemeClr val="bg2"/>
+                </a:solidFill>
+              </a:rPr>
               <a:t>libMesh</a:t>
             </a:r>
             <a:r>
-              <a:rPr lang="en-US" sz="1400" dirty="0"/>
+              <a:rPr lang="en-US" sz="1200" dirty="0">
+                <a:solidFill>
+                  <a:schemeClr val="bg2"/>
+                </a:solidFill>
+              </a:rPr>
               <a:t>::Point </a:t>
             </a:r>
             <a:r>
-              <a:rPr lang="en-US" sz="1400" dirty="0" err="1"/>
+              <a:rPr lang="en-US" sz="1200" dirty="0" err="1">
+                <a:solidFill>
+                  <a:schemeClr val="bg2"/>
+                </a:solidFill>
+              </a:rPr>
               <a:t>s_dump</a:t>
             </a:r>
             <a:r>
-              <a:rPr lang="en-US" sz="1400" dirty="0"/>
+              <a:rPr lang="en-US" sz="1200" dirty="0">
+                <a:solidFill>
+                  <a:schemeClr val="bg2"/>
+                </a:solidFill>
+              </a:rPr>
               <a:t>;   //</a:t>
             </a:r>
             <a:r>
-              <a:rPr lang="en-US" sz="1400" dirty="0" err="1"/>
+              <a:rPr lang="en-US" sz="1200" dirty="0" err="1">
+                <a:solidFill>
+                  <a:schemeClr val="bg2"/>
+                </a:solidFill>
+              </a:rPr>
               <a:t>s_dump</a:t>
             </a:r>
             <a:r>
-              <a:rPr lang="en-US" sz="1400" dirty="0"/>
+              <a:rPr lang="en-US" sz="1200" dirty="0">
+                <a:solidFill>
+                  <a:schemeClr val="bg2"/>
+                </a:solidFill>
+              </a:rPr>
               <a:t> is the target point position</a:t>
             </a:r>
-            <a:endParaRPr sz="1400" dirty="0"/>
+            <a:endParaRPr sz="1200" dirty="0">
+              <a:solidFill>
+                <a:schemeClr val="bg2"/>
+              </a:solidFill>
+            </a:endParaRPr>
           </a:p>
           <a:p>
             <a:pPr marL="0" lvl="0" indent="0" algn="l" rtl="0">
@@ -20163,10 +20200,18 @@
               <a:buNone/>
             </a:pPr>
             <a:r>
-              <a:rPr lang="en-US" sz="1400" dirty="0"/>
+              <a:rPr lang="en-US" sz="1200" dirty="0">
+                <a:solidFill>
+                  <a:schemeClr val="bg2"/>
+                </a:solidFill>
+              </a:rPr>
               <a:t>	if(time&lt;1)  //This will move the beam up with a speed of 0.5 from 0&lt;t&lt;1	 </a:t>
             </a:r>
-            <a:endParaRPr sz="1400" dirty="0"/>
+            <a:endParaRPr sz="1200" dirty="0">
+              <a:solidFill>
+                <a:schemeClr val="bg2"/>
+              </a:solidFill>
+            </a:endParaRPr>
           </a:p>
           <a:p>
             <a:pPr marL="0" lvl="0" indent="0" algn="l" rtl="0">
@@ -20184,10 +20229,18 @@
               <a:buNone/>
             </a:pPr>
             <a:r>
-              <a:rPr lang="en-US" sz="1400" dirty="0"/>
+              <a:rPr lang="en-US" sz="1200" dirty="0">
+                <a:solidFill>
+                  <a:schemeClr val="bg2"/>
+                </a:solidFill>
+              </a:rPr>
               <a:t>    {</a:t>
             </a:r>
-            <a:endParaRPr sz="1400" dirty="0"/>
+            <a:endParaRPr sz="1200" dirty="0">
+              <a:solidFill>
+                <a:schemeClr val="bg2"/>
+              </a:solidFill>
+            </a:endParaRPr>
           </a:p>
           <a:p>
             <a:pPr marL="0" lvl="0" indent="0" algn="l" rtl="0">
@@ -20205,18 +20258,34 @@
               <a:buNone/>
             </a:pPr>
             <a:r>
-              <a:rPr lang="en-US" sz="1400" dirty="0"/>
+              <a:rPr lang="en-US" sz="1200" dirty="0">
+                <a:solidFill>
+                  <a:schemeClr val="bg2"/>
+                </a:solidFill>
+              </a:rPr>
               <a:t>      </a:t>
             </a:r>
             <a:r>
-              <a:rPr lang="en-US" sz="1400" dirty="0" err="1"/>
+              <a:rPr lang="en-US" sz="1200" dirty="0" err="1">
+                <a:solidFill>
+                  <a:schemeClr val="bg2"/>
+                </a:solidFill>
+              </a:rPr>
               <a:t>s_dump</a:t>
             </a:r>
             <a:r>
-              <a:rPr lang="en-US" sz="1400" dirty="0"/>
+              <a:rPr lang="en-US" sz="1200" dirty="0">
+                <a:solidFill>
+                  <a:schemeClr val="bg2"/>
+                </a:solidFill>
+              </a:rPr>
               <a:t>(1)=s(1)+.5*time;  //only change the y-coordinate. s(1) is the x-coordinate of the reference configuration. </a:t>
             </a:r>
-            <a:endParaRPr sz="1400" dirty="0"/>
+            <a:endParaRPr sz="1200" dirty="0">
+              <a:solidFill>
+                <a:schemeClr val="bg2"/>
+              </a:solidFill>
+            </a:endParaRPr>
           </a:p>
           <a:p>
             <a:pPr marL="0" lvl="0" indent="0" algn="l" rtl="0">
@@ -20234,18 +20303,34 @@
               <a:buNone/>
             </a:pPr>
             <a:r>
-              <a:rPr lang="en-US" sz="1400" dirty="0"/>
+              <a:rPr lang="en-US" sz="1200" dirty="0">
+                <a:solidFill>
+                  <a:schemeClr val="bg2"/>
+                </a:solidFill>
+              </a:rPr>
               <a:t>      </a:t>
             </a:r>
             <a:r>
-              <a:rPr lang="en-US" sz="1400" dirty="0" err="1"/>
+              <a:rPr lang="en-US" sz="1200" dirty="0" err="1">
+                <a:solidFill>
+                  <a:schemeClr val="bg2"/>
+                </a:solidFill>
+              </a:rPr>
               <a:t>s_dump</a:t>
             </a:r>
             <a:r>
-              <a:rPr lang="en-US" sz="1400" dirty="0"/>
+              <a:rPr lang="en-US" sz="1200" dirty="0">
+                <a:solidFill>
+                  <a:schemeClr val="bg2"/>
+                </a:solidFill>
+              </a:rPr>
               <a:t>(0)=s(0);   //s(0) is the x-coordinate of the reference configuration</a:t>
             </a:r>
-            <a:endParaRPr sz="1400" dirty="0"/>
+            <a:endParaRPr sz="1200" dirty="0">
+              <a:solidFill>
+                <a:schemeClr val="bg2"/>
+              </a:solidFill>
+            </a:endParaRPr>
           </a:p>
           <a:p>
             <a:pPr marL="0" lvl="0" indent="0" algn="l" rtl="0">
@@ -20263,10 +20348,18 @@
               <a:buNone/>
             </a:pPr>
             <a:r>
-              <a:rPr lang="en-US" sz="1400" dirty="0"/>
+              <a:rPr lang="en-US" sz="1200" dirty="0">
+                <a:solidFill>
+                  <a:schemeClr val="bg2"/>
+                </a:solidFill>
+              </a:rPr>
               <a:t>    }</a:t>
             </a:r>
-            <a:endParaRPr sz="1400" dirty="0"/>
+            <a:endParaRPr sz="1200" dirty="0">
+              <a:solidFill>
+                <a:schemeClr val="bg2"/>
+              </a:solidFill>
+            </a:endParaRPr>
           </a:p>
           <a:p>
             <a:pPr marL="0" lvl="0" indent="0" algn="l" rtl="0">
@@ -20284,10 +20377,18 @@
               <a:buNone/>
             </a:pPr>
             <a:r>
-              <a:rPr lang="en-US" sz="1400" dirty="0"/>
+              <a:rPr lang="en-US" sz="1200" dirty="0">
+                <a:solidFill>
+                  <a:schemeClr val="bg2"/>
+                </a:solidFill>
+              </a:rPr>
               <a:t>	else if(time&lt;3)  //This will move the beam down with a speed of -0.5 for 1&lt;t&lt;3</a:t>
             </a:r>
-            <a:endParaRPr sz="1400" dirty="0"/>
+            <a:endParaRPr sz="1200" dirty="0">
+              <a:solidFill>
+                <a:schemeClr val="bg2"/>
+              </a:solidFill>
+            </a:endParaRPr>
           </a:p>
           <a:p>
             <a:pPr marL="0" lvl="0" indent="0" algn="l" rtl="0">
@@ -20305,10 +20406,18 @@
               <a:buNone/>
             </a:pPr>
             <a:r>
-              <a:rPr lang="en-US" sz="1400" dirty="0"/>
+              <a:rPr lang="en-US" sz="1200" dirty="0">
+                <a:solidFill>
+                  <a:schemeClr val="bg2"/>
+                </a:solidFill>
+              </a:rPr>
               <a:t>    {</a:t>
             </a:r>
-            <a:endParaRPr sz="1400" dirty="0"/>
+            <a:endParaRPr sz="1200" dirty="0">
+              <a:solidFill>
+                <a:schemeClr val="bg2"/>
+              </a:solidFill>
+            </a:endParaRPr>
           </a:p>
           <a:p>
             <a:pPr marL="0" lvl="0" indent="0" algn="l" rtl="0">
@@ -20326,18 +20435,34 @@
               <a:buNone/>
             </a:pPr>
             <a:r>
-              <a:rPr lang="en-US" sz="1400" dirty="0"/>
+              <a:rPr lang="en-US" sz="1200" dirty="0">
+                <a:solidFill>
+                  <a:schemeClr val="bg2"/>
+                </a:solidFill>
+              </a:rPr>
               <a:t>      </a:t>
             </a:r>
             <a:r>
-              <a:rPr lang="en-US" sz="1400" dirty="0" err="1"/>
+              <a:rPr lang="en-US" sz="1200" dirty="0" err="1">
+                <a:solidFill>
+                  <a:schemeClr val="bg2"/>
+                </a:solidFill>
+              </a:rPr>
               <a:t>s_dump</a:t>
             </a:r>
             <a:r>
-              <a:rPr lang="en-US" sz="1400" dirty="0"/>
+              <a:rPr lang="en-US" sz="1200" dirty="0">
+                <a:solidFill>
+                  <a:schemeClr val="bg2"/>
+                </a:solidFill>
+              </a:rPr>
               <a:t>(1)=s(1)+.5+.5*(1-time);</a:t>
             </a:r>
-            <a:endParaRPr sz="1400" dirty="0"/>
+            <a:endParaRPr sz="1200" dirty="0">
+              <a:solidFill>
+                <a:schemeClr val="bg2"/>
+              </a:solidFill>
+            </a:endParaRPr>
           </a:p>
           <a:p>
             <a:pPr marL="0" lvl="0" indent="0" algn="l" rtl="0">
@@ -20355,18 +20480,34 @@
               <a:buNone/>
             </a:pPr>
             <a:r>
-              <a:rPr lang="en-US" sz="1400" dirty="0"/>
+              <a:rPr lang="en-US" sz="1200" dirty="0">
+                <a:solidFill>
+                  <a:schemeClr val="bg2"/>
+                </a:solidFill>
+              </a:rPr>
               <a:t>      </a:t>
             </a:r>
             <a:r>
-              <a:rPr lang="en-US" sz="1400" dirty="0" err="1"/>
+              <a:rPr lang="en-US" sz="1200" dirty="0" err="1">
+                <a:solidFill>
+                  <a:schemeClr val="bg2"/>
+                </a:solidFill>
+              </a:rPr>
               <a:t>s_dump</a:t>
             </a:r>
             <a:r>
-              <a:rPr lang="en-US" sz="1400" dirty="0"/>
+              <a:rPr lang="en-US" sz="1200" dirty="0">
+                <a:solidFill>
+                  <a:schemeClr val="bg2"/>
+                </a:solidFill>
+              </a:rPr>
               <a:t>(0)=s(0);</a:t>
             </a:r>
-            <a:endParaRPr sz="1400" dirty="0"/>
+            <a:endParaRPr sz="1200" dirty="0">
+              <a:solidFill>
+                <a:schemeClr val="bg2"/>
+              </a:solidFill>
+            </a:endParaRPr>
           </a:p>
           <a:p>
             <a:pPr marL="0" lvl="0" indent="0" algn="l" rtl="0">
@@ -20384,10 +20525,18 @@
               <a:buNone/>
             </a:pPr>
             <a:r>
-              <a:rPr lang="en-US" sz="1400" dirty="0"/>
+              <a:rPr lang="en-US" sz="1200" dirty="0">
+                <a:solidFill>
+                  <a:schemeClr val="bg2"/>
+                </a:solidFill>
+              </a:rPr>
               <a:t>    }</a:t>
             </a:r>
-            <a:endParaRPr sz="1400" dirty="0"/>
+            <a:endParaRPr sz="1200" dirty="0">
+              <a:solidFill>
+                <a:schemeClr val="bg2"/>
+              </a:solidFill>
+            </a:endParaRPr>
           </a:p>
           <a:p>
             <a:pPr marL="0" lvl="0" indent="0" algn="l" rtl="0">
@@ -20405,10 +20554,18 @@
               <a:buNone/>
             </a:pPr>
             <a:r>
-              <a:rPr lang="en-US" sz="1400" dirty="0"/>
+              <a:rPr lang="en-US" sz="1200" dirty="0">
+                <a:solidFill>
+                  <a:schemeClr val="bg2"/>
+                </a:solidFill>
+              </a:rPr>
               <a:t>	else  //set the target point location to the actual location of the boundary (X) to make force equal to zero.</a:t>
             </a:r>
-            <a:endParaRPr sz="1400" dirty="0"/>
+            <a:endParaRPr sz="1200" dirty="0">
+              <a:solidFill>
+                <a:schemeClr val="bg2"/>
+              </a:solidFill>
+            </a:endParaRPr>
           </a:p>
           <a:p>
             <a:pPr marL="0" lvl="0" indent="0" algn="l" rtl="0">
@@ -20426,10 +20583,18 @@
               <a:buNone/>
             </a:pPr>
             <a:r>
-              <a:rPr lang="en-US" sz="1400" dirty="0"/>
+              <a:rPr lang="en-US" sz="1200" dirty="0">
+                <a:solidFill>
+                  <a:schemeClr val="bg2"/>
+                </a:solidFill>
+              </a:rPr>
               <a:t>  	{</a:t>
             </a:r>
-            <a:endParaRPr sz="1400" dirty="0"/>
+            <a:endParaRPr sz="1200" dirty="0">
+              <a:solidFill>
+                <a:schemeClr val="bg2"/>
+              </a:solidFill>
+            </a:endParaRPr>
           </a:p>
           <a:p>
             <a:pPr marL="0" lvl="0" indent="0" algn="l" rtl="0">
@@ -20447,18 +20612,34 @@
               <a:buNone/>
             </a:pPr>
             <a:r>
-              <a:rPr lang="en-US" sz="1400" dirty="0"/>
+              <a:rPr lang="en-US" sz="1200" dirty="0">
+                <a:solidFill>
+                  <a:schemeClr val="bg2"/>
+                </a:solidFill>
+              </a:rPr>
               <a:t>      </a:t>
             </a:r>
             <a:r>
-              <a:rPr lang="en-US" sz="1400" dirty="0" err="1"/>
+              <a:rPr lang="en-US" sz="1200" dirty="0" err="1">
+                <a:solidFill>
+                  <a:schemeClr val="bg2"/>
+                </a:solidFill>
+              </a:rPr>
               <a:t>s_dump</a:t>
             </a:r>
             <a:r>
-              <a:rPr lang="en-US" sz="1400" dirty="0"/>
+              <a:rPr lang="en-US" sz="1200" dirty="0">
+                <a:solidFill>
+                  <a:schemeClr val="bg2"/>
+                </a:solidFill>
+              </a:rPr>
               <a:t>(1)=X(1);</a:t>
             </a:r>
-            <a:endParaRPr sz="1400" dirty="0"/>
+            <a:endParaRPr sz="1200" dirty="0">
+              <a:solidFill>
+                <a:schemeClr val="bg2"/>
+              </a:solidFill>
+            </a:endParaRPr>
           </a:p>
           <a:p>
             <a:pPr marL="0" lvl="0" indent="0" algn="l" rtl="0">
@@ -20476,18 +20657,34 @@
               <a:buNone/>
             </a:pPr>
             <a:r>
-              <a:rPr lang="en-US" sz="1400" dirty="0"/>
+              <a:rPr lang="en-US" sz="1200" dirty="0">
+                <a:solidFill>
+                  <a:schemeClr val="bg2"/>
+                </a:solidFill>
+              </a:rPr>
               <a:t>      </a:t>
             </a:r>
             <a:r>
-              <a:rPr lang="en-US" sz="1400" dirty="0" err="1"/>
+              <a:rPr lang="en-US" sz="1200" dirty="0" err="1">
+                <a:solidFill>
+                  <a:schemeClr val="bg2"/>
+                </a:solidFill>
+              </a:rPr>
               <a:t>s_dump</a:t>
             </a:r>
             <a:r>
-              <a:rPr lang="en-US" sz="1400" dirty="0"/>
+              <a:rPr lang="en-US" sz="1200" dirty="0">
+                <a:solidFill>
+                  <a:schemeClr val="bg2"/>
+                </a:solidFill>
+              </a:rPr>
               <a:t>(0)=X(0);</a:t>
             </a:r>
-            <a:endParaRPr sz="1400" dirty="0"/>
+            <a:endParaRPr sz="1200" dirty="0">
+              <a:solidFill>
+                <a:schemeClr val="bg2"/>
+              </a:solidFill>
+            </a:endParaRPr>
           </a:p>
           <a:p>
             <a:pPr marL="0" lvl="0" indent="0" algn="l" rtl="0">
@@ -20505,10 +20702,18 @@
               <a:buNone/>
             </a:pPr>
             <a:r>
-              <a:rPr lang="en-US" sz="1400" dirty="0"/>
+              <a:rPr lang="en-US" sz="1200" dirty="0">
+                <a:solidFill>
+                  <a:schemeClr val="bg2"/>
+                </a:solidFill>
+              </a:rPr>
               <a:t>  	}</a:t>
             </a:r>
-            <a:endParaRPr sz="1400" dirty="0"/>
+            <a:endParaRPr sz="1200" dirty="0">
+              <a:solidFill>
+                <a:schemeClr val="bg2"/>
+              </a:solidFill>
+            </a:endParaRPr>
           </a:p>
           <a:p>
             <a:pPr marL="0" lvl="0" indent="0" algn="l" rtl="0">
@@ -20526,34 +20731,66 @@
               <a:buNone/>
             </a:pPr>
             <a:r>
-              <a:rPr lang="en-US" sz="1400" dirty="0"/>
+              <a:rPr lang="en-US" sz="1200" dirty="0">
+                <a:solidFill>
+                  <a:schemeClr val="bg2"/>
+                </a:solidFill>
+              </a:rPr>
               <a:t>  	F = </a:t>
             </a:r>
             <a:r>
-              <a:rPr lang="en-US" sz="1400" dirty="0" err="1"/>
+              <a:rPr lang="en-US" sz="1200" dirty="0" err="1">
+                <a:solidFill>
+                  <a:schemeClr val="bg2"/>
+                </a:solidFill>
+              </a:rPr>
               <a:t>kappa_s</a:t>
             </a:r>
             <a:r>
-              <a:rPr lang="en-US" sz="1400" dirty="0"/>
+              <a:rPr lang="en-US" sz="1200" dirty="0">
+                <a:solidFill>
+                  <a:schemeClr val="bg2"/>
+                </a:solidFill>
+              </a:rPr>
               <a:t>*(</a:t>
             </a:r>
             <a:r>
-              <a:rPr lang="en-US" sz="1400" dirty="0" err="1"/>
+              <a:rPr lang="en-US" sz="1200" dirty="0" err="1">
+                <a:solidFill>
+                  <a:schemeClr val="bg2"/>
+                </a:solidFill>
+              </a:rPr>
               <a:t>s_dump</a:t>
             </a:r>
             <a:r>
-              <a:rPr lang="en-US" sz="1400" dirty="0"/>
+              <a:rPr lang="en-US" sz="1200" dirty="0">
+                <a:solidFill>
+                  <a:schemeClr val="bg2"/>
+                </a:solidFill>
+              </a:rPr>
               <a:t>-X);  //apply a target force equal to </a:t>
             </a:r>
             <a:r>
-              <a:rPr lang="en-US" sz="1400" dirty="0" err="1"/>
+              <a:rPr lang="en-US" sz="1200" dirty="0" err="1">
+                <a:solidFill>
+                  <a:schemeClr val="bg2"/>
+                </a:solidFill>
+              </a:rPr>
               <a:t>kappa_s</a:t>
             </a:r>
             <a:r>
-              <a:rPr lang="en-US" sz="1400" dirty="0"/>
+              <a:rPr lang="en-US" sz="1200" dirty="0">
+                <a:solidFill>
+                  <a:schemeClr val="bg2"/>
+                </a:solidFill>
+              </a:rPr>
               <a:t> times the difference between tether and actual positions.</a:t>
             </a:r>
-            <a:endParaRPr sz="1400" dirty="0"/>
+            <a:endParaRPr sz="1200" dirty="0">
+              <a:solidFill>
+                <a:schemeClr val="bg2"/>
+              </a:solidFill>
+            </a:endParaRPr>
           </a:p>
           <a:p>
             <a:pPr marL="0" lvl="0" indent="0" algn="l" rtl="0">
@@ -20571,10 +20808,18 @@
               <a:buNone/>
             </a:pPr>
             <a:r>
-              <a:rPr lang="en-US" sz="1400" dirty="0"/>
+              <a:rPr lang="en-US" sz="1200" dirty="0">
+                <a:solidFill>
+                  <a:schemeClr val="bg2"/>
+                </a:solidFill>
+              </a:rPr>
               <a:t>	return;</a:t>
             </a:r>
-            <a:endParaRPr sz="1400" dirty="0"/>
+            <a:endParaRPr sz="1200" dirty="0">
+              <a:solidFill>
+                <a:schemeClr val="bg2"/>
+              </a:solidFill>
+            </a:endParaRPr>
           </a:p>
           <a:p>
             <a:pPr marL="0" lvl="0" indent="0" algn="l" rtl="0">
@@ -20587,10 +20832,53 @@
               <a:buNone/>
             </a:pPr>
             <a:r>
-              <a:rPr lang="en-US" sz="1400" dirty="0"/>
+              <a:rPr lang="en-US" sz="1200" dirty="0">
+                <a:solidFill>
+                  <a:schemeClr val="bg2"/>
+                </a:solidFill>
+              </a:rPr>
               <a:t>}</a:t>
             </a:r>
-            <a:endParaRPr sz="1400" dirty="0"/>
+            <a:endParaRPr sz="1200" dirty="0">
+              <a:solidFill>
+                <a:schemeClr val="bg2"/>
+              </a:solidFill>
+            </a:endParaRPr>
+          </a:p>
+        </p:txBody>
+      </p:sp>
+      <p:sp>
+        <p:nvSpPr>
+          <p:cNvPr id="3" name="TextBox 2">
+            <a:extLst>
+              <a:ext uri="{FF2B5EF4-FFF2-40B4-BE49-F238E27FC236}">
+                <a16:creationId xmlns:a16="http://schemas.microsoft.com/office/drawing/2014/main" id="{B0E57C6A-75F0-CD07-8865-1812CBBF81AE}"/>
+              </a:ext>
+            </a:extLst>
+          </p:cNvPr>
+          <p:cNvSpPr txBox="1"/>
+          <p:nvPr/>
+        </p:nvSpPr>
+        <p:spPr>
+          <a:xfrm>
+            <a:off x="381966" y="477604"/>
+            <a:ext cx="7292050" cy="523220"/>
+          </a:xfrm>
+          <a:prstGeom prst="rect">
+            <a:avLst/>
+          </a:prstGeom>
+          <a:noFill/>
+        </p:spPr>
+        <p:txBody>
+          <a:bodyPr wrap="square">
+            <a:spAutoFit/>
+          </a:bodyPr>
+          <a:lstStyle/>
+          <a:p>
+            <a:r>
+              <a:rPr lang="en-US" sz="2800" b="1" dirty="0"/>
+              <a:t>Code to move plate with target force</a:t>
+            </a:r>
           </a:p>
         </p:txBody>
       </p:sp>
@@ -20608,6 +20896,124 @@
 </file>
 
 <file path=ppt/slides/slide12.xml><?xml version="1.0" encoding="utf-8"?>
+<p:sld xmlns:a="http://schemas.openxmlformats.org/drawingml/2006/main" xmlns:r="http://schemas.openxmlformats.org/officeDocument/2006/relationships" xmlns:p="http://schemas.openxmlformats.org/presentationml/2006/main">
+  <p:cSld>
+    <p:spTree>
+      <p:nvGrpSpPr>
+        <p:cNvPr id="1" name=""/>
+        <p:cNvGrpSpPr/>
+        <p:nvPr/>
+      </p:nvGrpSpPr>
+      <p:grpSpPr>
+        <a:xfrm>
+          <a:off x="0" y="0"/>
+          <a:ext cx="0" cy="0"/>
+          <a:chOff x="0" y="0"/>
+          <a:chExt cx="0" cy="0"/>
+        </a:xfrm>
+      </p:grpSpPr>
+      <p:sp>
+        <p:nvSpPr>
+          <p:cNvPr id="2" name="Title 1">
+            <a:extLst>
+              <a:ext uri="{FF2B5EF4-FFF2-40B4-BE49-F238E27FC236}">
+                <a16:creationId xmlns:a16="http://schemas.microsoft.com/office/drawing/2014/main" id="{952B04EA-893C-420A-8728-45103182E1DF}"/>
+              </a:ext>
+            </a:extLst>
+          </p:cNvPr>
+          <p:cNvSpPr>
+            <a:spLocks noGrp="1"/>
+          </p:cNvSpPr>
+          <p:nvPr>
+            <p:ph type="title"/>
+          </p:nvPr>
+        </p:nvSpPr>
+        <p:spPr/>
+        <p:txBody>
+          <a:bodyPr/>
+          <a:lstStyle/>
+          <a:p>
+            <a:r>
+              <a:rPr lang="en-US" sz="3200" dirty="0"/>
+              <a:t>Example_IBFE_TetherForceFullPlate2D</a:t>
+            </a:r>
+          </a:p>
+        </p:txBody>
+      </p:sp>
+      <p:pic>
+        <p:nvPicPr>
+          <p:cNvPr id="5" name="Picture 4">
+            <a:extLst>
+              <a:ext uri="{FF2B5EF4-FFF2-40B4-BE49-F238E27FC236}">
+                <a16:creationId xmlns:a16="http://schemas.microsoft.com/office/drawing/2014/main" id="{B9CDF712-5482-938F-0533-52A4B27DD816}"/>
+              </a:ext>
+            </a:extLst>
+          </p:cNvPr>
+          <p:cNvPicPr>
+            <a:picLocks noChangeAspect="1"/>
+          </p:cNvPicPr>
+          <p:nvPr/>
+        </p:nvPicPr>
+        <p:blipFill>
+          <a:blip r:embed="rId2"/>
+          <a:stretch>
+            <a:fillRect/>
+          </a:stretch>
+        </p:blipFill>
+        <p:spPr>
+          <a:xfrm>
+            <a:off x="401695" y="1839090"/>
+            <a:ext cx="4407587" cy="3803568"/>
+          </a:xfrm>
+          <a:prstGeom prst="rect">
+            <a:avLst/>
+          </a:prstGeom>
+        </p:spPr>
+      </p:pic>
+      <p:pic>
+        <p:nvPicPr>
+          <p:cNvPr id="7" name="Picture 6">
+            <a:extLst>
+              <a:ext uri="{FF2B5EF4-FFF2-40B4-BE49-F238E27FC236}">
+                <a16:creationId xmlns:a16="http://schemas.microsoft.com/office/drawing/2014/main" id="{2AA26F1E-4980-02FB-CBB9-2E4CAFEBBB95}"/>
+              </a:ext>
+            </a:extLst>
+          </p:cNvPr>
+          <p:cNvPicPr>
+            <a:picLocks noChangeAspect="1"/>
+          </p:cNvPicPr>
+          <p:nvPr/>
+        </p:nvPicPr>
+        <p:blipFill>
+          <a:blip r:embed="rId3"/>
+          <a:stretch>
+            <a:fillRect/>
+          </a:stretch>
+        </p:blipFill>
+        <p:spPr>
+          <a:xfrm>
+            <a:off x="4699322" y="1839090"/>
+            <a:ext cx="4357869" cy="3823678"/>
+          </a:xfrm>
+          <a:prstGeom prst="rect">
+            <a:avLst/>
+          </a:prstGeom>
+        </p:spPr>
+      </p:pic>
+    </p:spTree>
+    <p:extLst>
+      <p:ext uri="{BB962C8B-B14F-4D97-AF65-F5344CB8AC3E}">
+        <p14:creationId xmlns:p14="http://schemas.microsoft.com/office/powerpoint/2010/main" val="3050750043"/>
+      </p:ext>
+    </p:extLst>
+  </p:cSld>
+  <p:clrMapOvr>
+    <a:masterClrMapping/>
+  </p:clrMapOvr>
+</p:sld>
+</file>
+
+<file path=ppt/slides/slide13.xml><?xml version="1.0" encoding="utf-8"?>
 <p:sld xmlns:a="http://schemas.openxmlformats.org/drawingml/2006/main" xmlns:r="http://schemas.openxmlformats.org/officeDocument/2006/relationships" xmlns:p="http://schemas.openxmlformats.org/presentationml/2006/main">
   <p:cSld>
     <p:spTree>
@@ -20683,12 +21089,20 @@
           <a:bodyPr/>
           <a:lstStyle/>
           <a:p>
+            <a:pPr>
+              <a:buFont typeface="Courier New" panose="02070309020205020404" pitchFamily="49" charset="0"/>
+              <a:buChar char="o"/>
+            </a:pPr>
             <a:r>
               <a:rPr lang="en-US" sz="1400" dirty="0"/>
               <a:t>Note the center of the plate is the origin. s(0)&gt;0.0 denotes the right side.</a:t>
             </a:r>
           </a:p>
           <a:p>
+            <a:pPr>
+              <a:buFont typeface="Courier New" panose="02070309020205020404" pitchFamily="49" charset="0"/>
+              <a:buChar char="o"/>
+            </a:pPr>
             <a:r>
               <a:rPr lang="en-US" sz="1400" dirty="0"/>
               <a:t>If statement only applies force on right side of plate.</a:t>
@@ -20725,249 +21139,449 @@
           <a:lstStyle/>
           <a:p>
             <a:r>
-              <a:rPr lang="en-US" sz="1100" dirty="0"/>
+              <a:rPr lang="en-US" sz="1100" dirty="0">
+                <a:solidFill>
+                  <a:schemeClr val="bg2"/>
+                </a:solidFill>
+              </a:rPr>
               <a:t> if(s(0)&gt;0.0){</a:t>
             </a:r>
           </a:p>
           <a:p>
             <a:r>
-              <a:rPr lang="en-US" sz="1100" dirty="0"/>
+              <a:rPr lang="en-US" sz="1100" dirty="0">
+                <a:solidFill>
+                  <a:schemeClr val="bg2"/>
+                </a:solidFill>
+              </a:rPr>
               <a:t>  </a:t>
             </a:r>
             <a:r>
-              <a:rPr lang="en-US" sz="1100" dirty="0" err="1"/>
+              <a:rPr lang="en-US" sz="1100" dirty="0" err="1">
+                <a:solidFill>
+                  <a:schemeClr val="bg2"/>
+                </a:solidFill>
+              </a:rPr>
               <a:t>libMesh</a:t>
             </a:r>
             <a:r>
-              <a:rPr lang="en-US" sz="1100" dirty="0"/>
+              <a:rPr lang="en-US" sz="1100" dirty="0">
+                <a:solidFill>
+                  <a:schemeClr val="bg2"/>
+                </a:solidFill>
+              </a:rPr>
               <a:t>::Point </a:t>
             </a:r>
             <a:r>
-              <a:rPr lang="en-US" sz="1100" dirty="0" err="1"/>
+              <a:rPr lang="en-US" sz="1100" dirty="0" err="1">
+                <a:solidFill>
+                  <a:schemeClr val="bg2"/>
+                </a:solidFill>
+              </a:rPr>
               <a:t>s_dump</a:t>
             </a:r>
             <a:r>
-              <a:rPr lang="en-US" sz="1100" dirty="0"/>
+              <a:rPr lang="en-US" sz="1100" dirty="0">
+                <a:solidFill>
+                  <a:schemeClr val="bg2"/>
+                </a:solidFill>
+              </a:rPr>
               <a:t>;			//</a:t>
             </a:r>
             <a:r>
-              <a:rPr lang="en-US" sz="1100" dirty="0" err="1"/>
+              <a:rPr lang="en-US" sz="1100" dirty="0" err="1">
+                <a:solidFill>
+                  <a:schemeClr val="bg2"/>
+                </a:solidFill>
+              </a:rPr>
               <a:t>s_dump</a:t>
             </a:r>
             <a:r>
-              <a:rPr lang="en-US" sz="1100" dirty="0"/>
+              <a:rPr lang="en-US" sz="1100" dirty="0">
+                <a:solidFill>
+                  <a:schemeClr val="bg2"/>
+                </a:solidFill>
+              </a:rPr>
               <a:t> is the target point position</a:t>
             </a:r>
           </a:p>
           <a:p>
             <a:r>
-              <a:rPr lang="en-US" sz="1100" dirty="0"/>
+              <a:rPr lang="en-US" sz="1100" dirty="0">
+                <a:solidFill>
+                  <a:schemeClr val="bg2"/>
+                </a:solidFill>
+              </a:rPr>
               <a:t>    if(time&lt;1.0)      				//This will move the beam up with a speed of 0.5 from 0&lt;t&lt;1</a:t>
             </a:r>
           </a:p>
           <a:p>
             <a:r>
-              <a:rPr lang="en-US" sz="1100" dirty="0"/>
+              <a:rPr lang="en-US" sz="1100" dirty="0">
+                <a:solidFill>
+                  <a:schemeClr val="bg2"/>
+                </a:solidFill>
+              </a:rPr>
               <a:t>	{</a:t>
             </a:r>
           </a:p>
           <a:p>
             <a:r>
-              <a:rPr lang="en-US" sz="1100" dirty="0"/>
+              <a:rPr lang="en-US" sz="1100" dirty="0">
+                <a:solidFill>
+                  <a:schemeClr val="bg2"/>
+                </a:solidFill>
+              </a:rPr>
               <a:t>	  </a:t>
             </a:r>
             <a:r>
-              <a:rPr lang="en-US" sz="1100" dirty="0" err="1"/>
+              <a:rPr lang="en-US" sz="1100" dirty="0" err="1">
+                <a:solidFill>
+                  <a:schemeClr val="bg2"/>
+                </a:solidFill>
+              </a:rPr>
               <a:t>s_dump</a:t>
             </a:r>
             <a:r>
-              <a:rPr lang="en-US" sz="1100" dirty="0"/>
+              <a:rPr lang="en-US" sz="1100" dirty="0">
+                <a:solidFill>
+                  <a:schemeClr val="bg2"/>
+                </a:solidFill>
+              </a:rPr>
               <a:t>(1)=s(1)+0.5*time;		//only change the y-coordinate. s(1) is the x-coordinate of the reference </a:t>
             </a:r>
           </a:p>
           <a:p>
             <a:r>
-              <a:rPr lang="en-US" sz="1100" dirty="0"/>
+              <a:rPr lang="en-US" sz="1100" dirty="0">
+                <a:solidFill>
+                  <a:schemeClr val="bg2"/>
+                </a:solidFill>
+              </a:rPr>
               <a:t>	  </a:t>
             </a:r>
             <a:r>
-              <a:rPr lang="en-US" sz="1100" dirty="0" err="1"/>
+              <a:rPr lang="en-US" sz="1100" dirty="0" err="1">
+                <a:solidFill>
+                  <a:schemeClr val="bg2"/>
+                </a:solidFill>
+              </a:rPr>
               <a:t>s_dump</a:t>
             </a:r>
             <a:r>
-              <a:rPr lang="en-US" sz="1100" dirty="0"/>
+              <a:rPr lang="en-US" sz="1100" dirty="0">
+                <a:solidFill>
+                  <a:schemeClr val="bg2"/>
+                </a:solidFill>
+              </a:rPr>
               <a:t>(0)=s(0);				//s(0) is the x-coordinate of the reference configuration</a:t>
             </a:r>
           </a:p>
           <a:p>
             <a:r>
-              <a:rPr lang="en-US" sz="1100" dirty="0"/>
+              <a:rPr lang="en-US" sz="1100" dirty="0">
+                <a:solidFill>
+                  <a:schemeClr val="bg2"/>
+                </a:solidFill>
+              </a:rPr>
               <a:t>	}</a:t>
             </a:r>
           </a:p>
           <a:p>
             <a:r>
-              <a:rPr lang="en-US" sz="1100" dirty="0"/>
+              <a:rPr lang="en-US" sz="1100" dirty="0">
+                <a:solidFill>
+                  <a:schemeClr val="bg2"/>
+                </a:solidFill>
+              </a:rPr>
               <a:t>    else if(time&lt;3.0)				//This will move the beam down with a speed of -0.5 for 1&lt;t&lt;3</a:t>
             </a:r>
           </a:p>
           <a:p>
             <a:r>
-              <a:rPr lang="en-US" sz="1100" dirty="0"/>
+              <a:rPr lang="en-US" sz="1100" dirty="0">
+                <a:solidFill>
+                  <a:schemeClr val="bg2"/>
+                </a:solidFill>
+              </a:rPr>
               <a:t>	{</a:t>
             </a:r>
           </a:p>
           <a:p>
             <a:r>
-              <a:rPr lang="en-US" sz="1100" dirty="0"/>
+              <a:rPr lang="en-US" sz="1100" dirty="0">
+                <a:solidFill>
+                  <a:schemeClr val="bg2"/>
+                </a:solidFill>
+              </a:rPr>
               <a:t>	  </a:t>
             </a:r>
             <a:r>
-              <a:rPr lang="en-US" sz="1100" dirty="0" err="1"/>
+              <a:rPr lang="en-US" sz="1100" dirty="0" err="1">
+                <a:solidFill>
+                  <a:schemeClr val="bg2"/>
+                </a:solidFill>
+              </a:rPr>
               <a:t>s_dump</a:t>
             </a:r>
             <a:r>
-              <a:rPr lang="en-US" sz="1100" dirty="0"/>
+              <a:rPr lang="en-US" sz="1100" dirty="0">
+                <a:solidFill>
+                  <a:schemeClr val="bg2"/>
+                </a:solidFill>
+              </a:rPr>
               <a:t>(1)=s(1)+0.5+0.5*(1.0-time);</a:t>
             </a:r>
           </a:p>
           <a:p>
             <a:r>
-              <a:rPr lang="en-US" sz="1100" dirty="0"/>
+              <a:rPr lang="en-US" sz="1100" dirty="0">
+                <a:solidFill>
+                  <a:schemeClr val="bg2"/>
+                </a:solidFill>
+              </a:rPr>
               <a:t>	  </a:t>
             </a:r>
             <a:r>
-              <a:rPr lang="en-US" sz="1100" dirty="0" err="1"/>
+              <a:rPr lang="en-US" sz="1100" dirty="0" err="1">
+                <a:solidFill>
+                  <a:schemeClr val="bg2"/>
+                </a:solidFill>
+              </a:rPr>
               <a:t>s_dump</a:t>
             </a:r>
             <a:r>
-              <a:rPr lang="en-US" sz="1100" dirty="0"/>
+              <a:rPr lang="en-US" sz="1100" dirty="0">
+                <a:solidFill>
+                  <a:schemeClr val="bg2"/>
+                </a:solidFill>
+              </a:rPr>
               <a:t>(0)=s(0);</a:t>
             </a:r>
           </a:p>
           <a:p>
             <a:r>
-              <a:rPr lang="en-US" sz="1100" dirty="0"/>
+              <a:rPr lang="en-US" sz="1100" dirty="0">
+                <a:solidFill>
+                  <a:schemeClr val="bg2"/>
+                </a:solidFill>
+              </a:rPr>
               <a:t>	}</a:t>
             </a:r>
           </a:p>
           <a:p>
             <a:r>
-              <a:rPr lang="en-US" sz="1100" dirty="0"/>
+              <a:rPr lang="en-US" sz="1100" dirty="0">
+                <a:solidFill>
+                  <a:schemeClr val="bg2"/>
+                </a:solidFill>
+              </a:rPr>
               <a:t>    else 							//set the target point location to the actual location of the boundary (X) to make force equal to zero.</a:t>
             </a:r>
           </a:p>
           <a:p>
             <a:r>
-              <a:rPr lang="en-US" sz="1100" dirty="0"/>
+              <a:rPr lang="en-US" sz="1100" dirty="0">
+                <a:solidFill>
+                  <a:schemeClr val="bg2"/>
+                </a:solidFill>
+              </a:rPr>
               <a:t>      {</a:t>
             </a:r>
           </a:p>
           <a:p>
             <a:r>
-              <a:rPr lang="en-US" sz="1100" dirty="0"/>
+              <a:rPr lang="en-US" sz="1100" dirty="0">
+                <a:solidFill>
+                  <a:schemeClr val="bg2"/>
+                </a:solidFill>
+              </a:rPr>
               <a:t>	  </a:t>
             </a:r>
             <a:r>
-              <a:rPr lang="en-US" sz="1100" dirty="0" err="1"/>
+              <a:rPr lang="en-US" sz="1100" dirty="0" err="1">
+                <a:solidFill>
+                  <a:schemeClr val="bg2"/>
+                </a:solidFill>
+              </a:rPr>
               <a:t>s_dump</a:t>
             </a:r>
             <a:r>
-              <a:rPr lang="en-US" sz="1100" dirty="0"/>
+              <a:rPr lang="en-US" sz="1100" dirty="0">
+                <a:solidFill>
+                  <a:schemeClr val="bg2"/>
+                </a:solidFill>
+              </a:rPr>
               <a:t>(1)=X(1);</a:t>
             </a:r>
           </a:p>
           <a:p>
             <a:r>
-              <a:rPr lang="en-US" sz="1100" dirty="0"/>
+              <a:rPr lang="en-US" sz="1100" dirty="0">
+                <a:solidFill>
+                  <a:schemeClr val="bg2"/>
+                </a:solidFill>
+              </a:rPr>
               <a:t>	  </a:t>
             </a:r>
             <a:r>
-              <a:rPr lang="en-US" sz="1100" dirty="0" err="1"/>
+              <a:rPr lang="en-US" sz="1100" dirty="0" err="1">
+                <a:solidFill>
+                  <a:schemeClr val="bg2"/>
+                </a:solidFill>
+              </a:rPr>
               <a:t>s_dump</a:t>
             </a:r>
             <a:r>
-              <a:rPr lang="en-US" sz="1100" dirty="0"/>
+              <a:rPr lang="en-US" sz="1100" dirty="0">
+                <a:solidFill>
+                  <a:schemeClr val="bg2"/>
+                </a:solidFill>
+              </a:rPr>
               <a:t>(0)=X(0);</a:t>
             </a:r>
           </a:p>
           <a:p>
             <a:r>
-              <a:rPr lang="en-US" sz="1100" dirty="0"/>
+              <a:rPr lang="en-US" sz="1100" dirty="0">
+                <a:solidFill>
+                  <a:schemeClr val="bg2"/>
+                </a:solidFill>
+              </a:rPr>
               <a:t>      }</a:t>
             </a:r>
           </a:p>
           <a:p>
             <a:r>
-              <a:rPr lang="en-US" sz="1100" dirty="0"/>
+              <a:rPr lang="en-US" sz="1100" dirty="0">
+                <a:solidFill>
+                  <a:schemeClr val="bg2"/>
+                </a:solidFill>
+              </a:rPr>
               <a:t>      F = </a:t>
             </a:r>
             <a:r>
-              <a:rPr lang="en-US" sz="1100" dirty="0" err="1"/>
+              <a:rPr lang="en-US" sz="1100" dirty="0" err="1">
+                <a:solidFill>
+                  <a:schemeClr val="bg2"/>
+                </a:solidFill>
+              </a:rPr>
               <a:t>kappa_s</a:t>
             </a:r>
             <a:r>
-              <a:rPr lang="en-US" sz="1100" dirty="0"/>
+              <a:rPr lang="en-US" sz="1100" dirty="0">
+                <a:solidFill>
+                  <a:schemeClr val="bg2"/>
+                </a:solidFill>
+              </a:rPr>
               <a:t>*(</a:t>
             </a:r>
             <a:r>
-              <a:rPr lang="en-US" sz="1100" dirty="0" err="1"/>
+              <a:rPr lang="en-US" sz="1100" dirty="0" err="1">
+                <a:solidFill>
+                  <a:schemeClr val="bg2"/>
+                </a:solidFill>
+              </a:rPr>
               <a:t>s_dump</a:t>
             </a:r>
             <a:r>
-              <a:rPr lang="en-US" sz="1100" dirty="0"/>
+              <a:rPr lang="en-US" sz="1100" dirty="0">
+                <a:solidFill>
+                  <a:schemeClr val="bg2"/>
+                </a:solidFill>
+              </a:rPr>
               <a:t>-X);		//apply a target force equal to </a:t>
             </a:r>
             <a:r>
-              <a:rPr lang="en-US" sz="1100" dirty="0" err="1"/>
+              <a:rPr lang="en-US" sz="1100" dirty="0" err="1">
+                <a:solidFill>
+                  <a:schemeClr val="bg2"/>
+                </a:solidFill>
+              </a:rPr>
               <a:t>kappa_s</a:t>
             </a:r>
             <a:r>
-              <a:rPr lang="en-US" sz="1100" dirty="0"/>
+              <a:rPr lang="en-US" sz="1100" dirty="0">
+                <a:solidFill>
+                  <a:schemeClr val="bg2"/>
+                </a:solidFill>
+              </a:rPr>
               <a:t> times the difference between tether and actual positions.</a:t>
             </a:r>
           </a:p>
           <a:p>
             <a:r>
-              <a:rPr lang="en-US" sz="1100" dirty="0"/>
+              <a:rPr lang="en-US" sz="1100" dirty="0">
+                <a:solidFill>
+                  <a:schemeClr val="bg2"/>
+                </a:solidFill>
+              </a:rPr>
               <a:t>}</a:t>
             </a:r>
           </a:p>
           <a:p>
             <a:r>
-              <a:rPr lang="en-US" sz="1100" dirty="0"/>
+              <a:rPr lang="en-US" sz="1100" dirty="0">
+                <a:solidFill>
+                  <a:schemeClr val="bg2"/>
+                </a:solidFill>
+              </a:rPr>
               <a:t> else{</a:t>
             </a:r>
           </a:p>
           <a:p>
             <a:r>
-              <a:rPr lang="en-US" sz="1100" dirty="0"/>
+              <a:rPr lang="en-US" sz="1100" dirty="0">
+                <a:solidFill>
+                  <a:schemeClr val="bg2"/>
+                </a:solidFill>
+              </a:rPr>
               <a:t>   </a:t>
             </a:r>
             <a:r>
-              <a:rPr lang="en-US" sz="1100" dirty="0" err="1"/>
+              <a:rPr lang="en-US" sz="1100" dirty="0" err="1">
+                <a:solidFill>
+                  <a:schemeClr val="bg2"/>
+                </a:solidFill>
+              </a:rPr>
               <a:t>F.zero</a:t>
             </a:r>
             <a:r>
-              <a:rPr lang="en-US" sz="1100" dirty="0"/>
+              <a:rPr lang="en-US" sz="1100" dirty="0">
+                <a:solidFill>
+                  <a:schemeClr val="bg2"/>
+                </a:solidFill>
+              </a:rPr>
               <a:t>();</a:t>
             </a:r>
           </a:p>
           <a:p>
             <a:r>
-              <a:rPr lang="en-US" sz="1100" dirty="0"/>
+              <a:rPr lang="en-US" sz="1100" dirty="0">
+                <a:solidFill>
+                  <a:schemeClr val="bg2"/>
+                </a:solidFill>
+              </a:rPr>
               <a:t> }</a:t>
             </a:r>
           </a:p>
           <a:p>
             <a:r>
-              <a:rPr lang="en-US" sz="1100" dirty="0"/>
+              <a:rPr lang="en-US" sz="1100" dirty="0">
+                <a:solidFill>
+                  <a:schemeClr val="bg2"/>
+                </a:solidFill>
+              </a:rPr>
               <a:t>    return;</a:t>
             </a:r>
           </a:p>
           <a:p>
             <a:r>
-              <a:rPr lang="en-US" sz="1100" dirty="0"/>
+              <a:rPr lang="en-US" sz="1100" dirty="0">
+                <a:solidFill>
+                  <a:schemeClr val="bg2"/>
+                </a:solidFill>
+              </a:rPr>
               <a:t>}</a:t>
             </a:r>
           </a:p>
@@ -20986,7 +21600,7 @@
 </p:sld>
 </file>
 
-<file path=ppt/slides/slide13.xml><?xml version="1.0" encoding="utf-8"?>
+<file path=ppt/slides/slide14.xml><?xml version="1.0" encoding="utf-8"?>
 <p:sld xmlns:a="http://schemas.openxmlformats.org/drawingml/2006/main" xmlns:r="http://schemas.openxmlformats.org/officeDocument/2006/relationships" xmlns:p="http://schemas.openxmlformats.org/presentationml/2006/main">
   <p:cSld>
     <p:spTree>
@@ -21139,129 +21753,6 @@
           <a:xfrm>
             <a:off x="2317777" y="2770907"/>
             <a:ext cx="3757076" cy="3216850"/>
-          </a:xfrm>
-          <a:prstGeom prst="rect">
-            <a:avLst/>
-          </a:prstGeom>
-          <a:noFill/>
-          <a:ln>
-            <a:noFill/>
-          </a:ln>
-        </p:spPr>
-      </p:pic>
-    </p:spTree>
-  </p:cSld>
-  <p:clrMapOvr>
-    <a:masterClrMapping/>
-  </p:clrMapOvr>
-</p:sld>
-</file>
-
-<file path=ppt/slides/slide14.xml><?xml version="1.0" encoding="utf-8"?>
-<p:sld xmlns:a="http://schemas.openxmlformats.org/drawingml/2006/main" xmlns:r="http://schemas.openxmlformats.org/officeDocument/2006/relationships" xmlns:p="http://schemas.openxmlformats.org/presentationml/2006/main">
-  <p:cSld>
-    <p:spTree>
-      <p:nvGrpSpPr>
-        <p:cNvPr id="1" name="Shape 182"/>
-        <p:cNvGrpSpPr/>
-        <p:nvPr/>
-      </p:nvGrpSpPr>
-      <p:grpSpPr>
-        <a:xfrm>
-          <a:off x="0" y="0"/>
-          <a:ext cx="0" cy="0"/>
-          <a:chOff x="0" y="0"/>
-          <a:chExt cx="0" cy="0"/>
-        </a:xfrm>
-      </p:grpSpPr>
-      <p:sp>
-        <p:nvSpPr>
-          <p:cNvPr id="183" name="Google Shape;183;p35"/>
-          <p:cNvSpPr txBox="1">
-            <a:spLocks noGrp="1"/>
-          </p:cNvSpPr>
-          <p:nvPr>
-            <p:ph type="title"/>
-          </p:nvPr>
-        </p:nvSpPr>
-        <p:spPr>
-          <a:xfrm>
-            <a:off x="403675" y="1110538"/>
-            <a:ext cx="8229600" cy="1143300"/>
-          </a:xfrm>
-          <a:prstGeom prst="rect">
-            <a:avLst/>
-          </a:prstGeom>
-        </p:spPr>
-        <p:txBody>
-          <a:bodyPr spcFirstLastPara="1" wrap="square" lIns="91425" tIns="91425" rIns="91425" bIns="91425" anchor="b" anchorCtr="0">
-            <a:noAutofit/>
-          </a:bodyPr>
-          <a:lstStyle/>
-          <a:p>
-            <a:pPr marL="0" lvl="0" indent="0" algn="l" rtl="0">
-              <a:spcBef>
-                <a:spcPts val="0"/>
-              </a:spcBef>
-              <a:spcAft>
-                <a:spcPts val="0"/>
-              </a:spcAft>
-              <a:buNone/>
-            </a:pPr>
-            <a:r>
-              <a:rPr lang="en-US" sz="2400"/>
-              <a:t>1-IBFE-Example_TetherForceFullPlate2D-Rotate</a:t>
-            </a:r>
-            <a:endParaRPr sz="2400" dirty="0"/>
-          </a:p>
-          <a:p>
-            <a:pPr marL="0" lvl="0" indent="0" algn="l" rtl="0">
-              <a:spcBef>
-                <a:spcPts val="0"/>
-              </a:spcBef>
-              <a:spcAft>
-                <a:spcPts val="0"/>
-              </a:spcAft>
-              <a:buNone/>
-            </a:pPr>
-            <a:endParaRPr sz="2400" dirty="0"/>
-          </a:p>
-          <a:p>
-            <a:pPr marL="0" lvl="0" indent="0" algn="l" rtl="0">
-              <a:spcBef>
-                <a:spcPts val="0"/>
-              </a:spcBef>
-              <a:spcAft>
-                <a:spcPts val="0"/>
-              </a:spcAft>
-              <a:buNone/>
-            </a:pPr>
-            <a:r>
-              <a:rPr lang="en-US" sz="2400" b="0" dirty="0"/>
-              <a:t>The goal here is to spin the beam about its center for t&lt;1, and then release it.</a:t>
-            </a:r>
-            <a:endParaRPr sz="2400" b="0" dirty="0"/>
-          </a:p>
-        </p:txBody>
-      </p:sp>
-      <p:pic>
-        <p:nvPicPr>
-          <p:cNvPr id="184" name="Google Shape;184;p35" descr="Screen Shot 2016-06-27 at 1.30.46 PM.png"/>
-          <p:cNvPicPr preferRelativeResize="0"/>
-          <p:nvPr/>
-        </p:nvPicPr>
-        <p:blipFill>
-          <a:blip r:embed="rId3">
-            <a:alphaModFix/>
-          </a:blip>
-          <a:stretch>
-            <a:fillRect/>
-          </a:stretch>
-        </p:blipFill>
-        <p:spPr>
-          <a:xfrm>
-            <a:off x="2174425" y="2394600"/>
-            <a:ext cx="3712026" cy="3219600"/>
           </a:xfrm>
           <a:prstGeom prst="rect">
             <a:avLst/>
@@ -21309,8 +21800,8 @@
         </p:nvSpPr>
         <p:spPr>
           <a:xfrm>
-            <a:off x="350175" y="1039533"/>
-            <a:ext cx="8229600" cy="4967700"/>
+            <a:off x="390686" y="2694713"/>
+            <a:ext cx="8229600" cy="3833409"/>
           </a:xfrm>
           <a:prstGeom prst="rect">
             <a:avLst/>
@@ -21337,10 +21828,18 @@
               <a:buNone/>
             </a:pPr>
             <a:r>
-              <a:rPr lang="en-US" sz="1400" dirty="0"/>
+              <a:rPr lang="en-US" sz="1200" dirty="0">
+                <a:solidFill>
+                  <a:schemeClr val="bg2"/>
+                </a:solidFill>
+              </a:rPr>
               <a:t>if(time&lt;1) 	 </a:t>
             </a:r>
-            <a:endParaRPr sz="1400" dirty="0"/>
+            <a:endParaRPr sz="1200" dirty="0">
+              <a:solidFill>
+                <a:schemeClr val="bg2"/>
+              </a:solidFill>
+            </a:endParaRPr>
           </a:p>
           <a:p>
             <a:pPr marL="0" lvl="0" indent="0" algn="l" rtl="0">
@@ -21358,10 +21857,18 @@
               <a:buNone/>
             </a:pPr>
             <a:r>
-              <a:rPr lang="en-US" sz="1400" dirty="0"/>
+              <a:rPr lang="en-US" sz="1200" dirty="0">
+                <a:solidFill>
+                  <a:schemeClr val="bg2"/>
+                </a:solidFill>
+              </a:rPr>
               <a:t>{</a:t>
             </a:r>
-            <a:endParaRPr sz="1400" dirty="0"/>
+            <a:endParaRPr sz="1200" dirty="0">
+              <a:solidFill>
+                <a:schemeClr val="bg2"/>
+              </a:solidFill>
+            </a:endParaRPr>
           </a:p>
           <a:p>
             <a:pPr marL="0" lvl="0" indent="0" algn="l" rtl="0">
@@ -21374,18 +21881,34 @@
               <a:buNone/>
             </a:pPr>
             <a:r>
-              <a:rPr lang="en-US" sz="1400" dirty="0"/>
+              <a:rPr lang="en-US" sz="1200" dirty="0">
+                <a:solidFill>
+                  <a:schemeClr val="bg2"/>
+                </a:solidFill>
+              </a:rPr>
               <a:t>	</a:t>
             </a:r>
             <a:r>
-              <a:rPr lang="en-US" sz="1400" dirty="0" err="1"/>
+              <a:rPr lang="en-US" sz="1200" dirty="0" err="1">
+                <a:solidFill>
+                  <a:schemeClr val="bg2"/>
+                </a:solidFill>
+              </a:rPr>
               <a:t>s_dump</a:t>
             </a:r>
             <a:r>
-              <a:rPr lang="en-US" sz="1400" dirty="0"/>
+              <a:rPr lang="en-US" sz="1200" dirty="0">
+                <a:solidFill>
+                  <a:schemeClr val="bg2"/>
+                </a:solidFill>
+              </a:rPr>
               <a:t>(1)=s(1)+s(0)*sin(2*3.14*0.5*time);  //y-coordinate gets moved more the farther along the beam you are, We should really define PI better here</a:t>
             </a:r>
-            <a:endParaRPr sz="1400" dirty="0"/>
+            <a:endParaRPr sz="1200" dirty="0">
+              <a:solidFill>
+                <a:schemeClr val="bg2"/>
+              </a:solidFill>
+            </a:endParaRPr>
           </a:p>
           <a:p>
             <a:pPr marL="0" lvl="0" indent="0" algn="l" rtl="0">
@@ -21403,18 +21926,34 @@
               <a:buNone/>
             </a:pPr>
             <a:r>
-              <a:rPr lang="en-US" sz="1400" dirty="0"/>
+              <a:rPr lang="en-US" sz="1200" dirty="0">
+                <a:solidFill>
+                  <a:schemeClr val="bg2"/>
+                </a:solidFill>
+              </a:rPr>
               <a:t>	</a:t>
             </a:r>
             <a:r>
-              <a:rPr lang="en-US" sz="1400" dirty="0" err="1"/>
+              <a:rPr lang="en-US" sz="1200" dirty="0" err="1">
+                <a:solidFill>
+                  <a:schemeClr val="bg2"/>
+                </a:solidFill>
+              </a:rPr>
               <a:t>s_dump</a:t>
             </a:r>
             <a:r>
-              <a:rPr lang="en-US" sz="1400" dirty="0"/>
+              <a:rPr lang="en-US" sz="1200" dirty="0">
+                <a:solidFill>
+                  <a:schemeClr val="bg2"/>
+                </a:solidFill>
+              </a:rPr>
               <a:t>(0)=s(0)*cos(2*3.14*0.5*time); //adjustment for x-coordinate along the length</a:t>
             </a:r>
-            <a:endParaRPr sz="1400" dirty="0"/>
+            <a:endParaRPr sz="1200" dirty="0">
+              <a:solidFill>
+                <a:schemeClr val="bg2"/>
+              </a:solidFill>
+            </a:endParaRPr>
           </a:p>
           <a:p>
             <a:pPr marL="0" lvl="0" indent="0" algn="l" rtl="0">
@@ -21432,10 +21971,18 @@
               <a:buNone/>
             </a:pPr>
             <a:r>
-              <a:rPr lang="en-US" sz="1400" dirty="0"/>
+              <a:rPr lang="en-US" sz="1200" dirty="0">
+                <a:solidFill>
+                  <a:schemeClr val="bg2"/>
+                </a:solidFill>
+              </a:rPr>
               <a:t>}</a:t>
             </a:r>
-            <a:endParaRPr sz="1400" dirty="0"/>
+            <a:endParaRPr sz="1200" dirty="0">
+              <a:solidFill>
+                <a:schemeClr val="bg2"/>
+              </a:solidFill>
+            </a:endParaRPr>
           </a:p>
           <a:p>
             <a:pPr marL="0" lvl="0" indent="0" algn="l" rtl="0">
@@ -21453,10 +22000,18 @@
               <a:buNone/>
             </a:pPr>
             <a:r>
-              <a:rPr lang="en-US" sz="1400" dirty="0"/>
+              <a:rPr lang="en-US" sz="1200" dirty="0">
+                <a:solidFill>
+                  <a:schemeClr val="bg2"/>
+                </a:solidFill>
+              </a:rPr>
               <a:t>else //turns off all forcing, target coordinates set to current coordinates</a:t>
             </a:r>
-            <a:endParaRPr sz="1400" dirty="0"/>
+            <a:endParaRPr sz="1200" dirty="0">
+              <a:solidFill>
+                <a:schemeClr val="bg2"/>
+              </a:solidFill>
+            </a:endParaRPr>
           </a:p>
           <a:p>
             <a:pPr marL="0" lvl="0" indent="0" algn="l" rtl="0">
@@ -21474,10 +22029,18 @@
               <a:buNone/>
             </a:pPr>
             <a:r>
-              <a:rPr lang="en-US" sz="1400" dirty="0"/>
+              <a:rPr lang="en-US" sz="1200" dirty="0">
+                <a:solidFill>
+                  <a:schemeClr val="bg2"/>
+                </a:solidFill>
+              </a:rPr>
               <a:t>{</a:t>
             </a:r>
-            <a:endParaRPr sz="1400" dirty="0"/>
+            <a:endParaRPr sz="1200" dirty="0">
+              <a:solidFill>
+                <a:schemeClr val="bg2"/>
+              </a:solidFill>
+            </a:endParaRPr>
           </a:p>
           <a:p>
             <a:pPr marL="0" lvl="0" indent="0" algn="l" rtl="0">
@@ -21495,18 +22058,34 @@
               <a:buNone/>
             </a:pPr>
             <a:r>
-              <a:rPr lang="en-US" sz="1400" dirty="0"/>
+              <a:rPr lang="en-US" sz="1200" dirty="0">
+                <a:solidFill>
+                  <a:schemeClr val="bg2"/>
+                </a:solidFill>
+              </a:rPr>
               <a:t>      </a:t>
             </a:r>
             <a:r>
-              <a:rPr lang="en-US" sz="1400" dirty="0" err="1"/>
+              <a:rPr lang="en-US" sz="1200" dirty="0" err="1">
+                <a:solidFill>
+                  <a:schemeClr val="bg2"/>
+                </a:solidFill>
+              </a:rPr>
               <a:t>s_dump</a:t>
             </a:r>
             <a:r>
-              <a:rPr lang="en-US" sz="1400" dirty="0"/>
+              <a:rPr lang="en-US" sz="1200" dirty="0">
+                <a:solidFill>
+                  <a:schemeClr val="bg2"/>
+                </a:solidFill>
+              </a:rPr>
               <a:t>(1)=X(1);</a:t>
             </a:r>
-            <a:endParaRPr sz="1400" dirty="0"/>
+            <a:endParaRPr sz="1200" dirty="0">
+              <a:solidFill>
+                <a:schemeClr val="bg2"/>
+              </a:solidFill>
+            </a:endParaRPr>
           </a:p>
           <a:p>
             <a:pPr marL="0" lvl="0" indent="0" algn="l" rtl="0">
@@ -21524,18 +22103,34 @@
               <a:buNone/>
             </a:pPr>
             <a:r>
-              <a:rPr lang="en-US" sz="1400" dirty="0"/>
+              <a:rPr lang="en-US" sz="1200" dirty="0">
+                <a:solidFill>
+                  <a:schemeClr val="bg2"/>
+                </a:solidFill>
+              </a:rPr>
               <a:t>      </a:t>
             </a:r>
             <a:r>
-              <a:rPr lang="en-US" sz="1400" dirty="0" err="1"/>
+              <a:rPr lang="en-US" sz="1200" dirty="0" err="1">
+                <a:solidFill>
+                  <a:schemeClr val="bg2"/>
+                </a:solidFill>
+              </a:rPr>
               <a:t>s_dump</a:t>
             </a:r>
             <a:r>
-              <a:rPr lang="en-US" sz="1400" dirty="0"/>
+              <a:rPr lang="en-US" sz="1200" dirty="0">
+                <a:solidFill>
+                  <a:schemeClr val="bg2"/>
+                </a:solidFill>
+              </a:rPr>
               <a:t>(0)=X(0);</a:t>
             </a:r>
-            <a:endParaRPr sz="1400" dirty="0"/>
+            <a:endParaRPr sz="1200" dirty="0">
+              <a:solidFill>
+                <a:schemeClr val="bg2"/>
+              </a:solidFill>
+            </a:endParaRPr>
           </a:p>
           <a:p>
             <a:pPr marL="0" lvl="0" indent="0" algn="l" rtl="0">
@@ -21553,10 +22148,18 @@
               <a:buNone/>
             </a:pPr>
             <a:r>
-              <a:rPr lang="en-US" sz="1400" dirty="0"/>
+              <a:rPr lang="en-US" sz="1200" dirty="0">
+                <a:solidFill>
+                  <a:schemeClr val="bg2"/>
+                </a:solidFill>
+              </a:rPr>
               <a:t>}</a:t>
             </a:r>
-            <a:endParaRPr sz="1400" dirty="0"/>
+            <a:endParaRPr sz="1200" dirty="0">
+              <a:solidFill>
+                <a:schemeClr val="bg2"/>
+              </a:solidFill>
+            </a:endParaRPr>
           </a:p>
           <a:p>
             <a:pPr marL="0" lvl="0" indent="0" algn="l" rtl="0">
@@ -21574,26 +22177,50 @@
               <a:buNone/>
             </a:pPr>
             <a:r>
-              <a:rPr lang="en-US" sz="1400" dirty="0"/>
+              <a:rPr lang="en-US" sz="1200" dirty="0">
+                <a:solidFill>
+                  <a:schemeClr val="bg2"/>
+                </a:solidFill>
+              </a:rPr>
               <a:t>F = </a:t>
             </a:r>
             <a:r>
-              <a:rPr lang="en-US" sz="1400" dirty="0" err="1"/>
+              <a:rPr lang="en-US" sz="1200" dirty="0" err="1">
+                <a:solidFill>
+                  <a:schemeClr val="bg2"/>
+                </a:solidFill>
+              </a:rPr>
               <a:t>kappa_s</a:t>
             </a:r>
             <a:r>
-              <a:rPr lang="en-US" sz="1400" dirty="0"/>
+              <a:rPr lang="en-US" sz="1200" dirty="0">
+                <a:solidFill>
+                  <a:schemeClr val="bg2"/>
+                </a:solidFill>
+              </a:rPr>
               <a:t>*(</a:t>
             </a:r>
             <a:r>
-              <a:rPr lang="en-US" sz="1400" dirty="0" err="1"/>
+              <a:rPr lang="en-US" sz="1200" dirty="0" err="1">
+                <a:solidFill>
+                  <a:schemeClr val="bg2"/>
+                </a:solidFill>
+              </a:rPr>
               <a:t>s_dump</a:t>
             </a:r>
             <a:r>
-              <a:rPr lang="en-US" sz="1400" dirty="0"/>
+              <a:rPr lang="en-US" sz="1200" dirty="0">
+                <a:solidFill>
+                  <a:schemeClr val="bg2"/>
+                </a:solidFill>
+              </a:rPr>
               <a:t>-X);</a:t>
             </a:r>
-            <a:endParaRPr sz="1400" dirty="0"/>
+            <a:endParaRPr sz="1200" dirty="0">
+              <a:solidFill>
+                <a:schemeClr val="bg2"/>
+              </a:solidFill>
+            </a:endParaRPr>
           </a:p>
           <a:p>
             <a:pPr marL="0" lvl="0" indent="0" algn="l" rtl="0">
@@ -21611,10 +22238,18 @@
               <a:buNone/>
             </a:pPr>
             <a:r>
-              <a:rPr lang="en-US" sz="1400" dirty="0"/>
+              <a:rPr lang="en-US" sz="1200" dirty="0">
+                <a:solidFill>
+                  <a:schemeClr val="bg2"/>
+                </a:solidFill>
+              </a:rPr>
               <a:t>return;</a:t>
             </a:r>
-            <a:endParaRPr sz="1400" dirty="0"/>
+            <a:endParaRPr sz="1200" dirty="0">
+              <a:solidFill>
+                <a:schemeClr val="bg2"/>
+              </a:solidFill>
+            </a:endParaRPr>
           </a:p>
           <a:p>
             <a:pPr marL="0" lvl="0" indent="0" algn="l" rtl="0">
@@ -21627,10 +22262,113 @@
               <a:buNone/>
             </a:pPr>
             <a:r>
-              <a:rPr lang="en-US" sz="1400" dirty="0"/>
+              <a:rPr lang="en-US" sz="1200" dirty="0">
+                <a:solidFill>
+                  <a:schemeClr val="bg2"/>
+                </a:solidFill>
+              </a:rPr>
               <a:t>}</a:t>
             </a:r>
-            <a:endParaRPr sz="1400" dirty="0"/>
+            <a:endParaRPr sz="1200" dirty="0">
+              <a:solidFill>
+                <a:schemeClr val="bg2"/>
+              </a:solidFill>
+            </a:endParaRPr>
+          </a:p>
+        </p:txBody>
+      </p:sp>
+      <p:sp>
+        <p:nvSpPr>
+          <p:cNvPr id="3" name="TextBox 2">
+            <a:extLst>
+              <a:ext uri="{FF2B5EF4-FFF2-40B4-BE49-F238E27FC236}">
+                <a16:creationId xmlns:a16="http://schemas.microsoft.com/office/drawing/2014/main" id="{D2CBEADE-6B99-F220-B2A5-DDF64D7EF6DD}"/>
+              </a:ext>
+            </a:extLst>
+          </p:cNvPr>
+          <p:cNvSpPr txBox="1"/>
+          <p:nvPr/>
+        </p:nvSpPr>
+        <p:spPr>
+          <a:xfrm>
+            <a:off x="350175" y="502478"/>
+            <a:ext cx="8229600" cy="584775"/>
+          </a:xfrm>
+          <a:prstGeom prst="rect">
+            <a:avLst/>
+          </a:prstGeom>
+          <a:noFill/>
+        </p:spPr>
+        <p:txBody>
+          <a:bodyPr wrap="square">
+            <a:spAutoFit/>
+          </a:bodyPr>
+          <a:lstStyle/>
+          <a:p>
+            <a:r>
+              <a:rPr lang="en-US" sz="3200" b="1" dirty="0"/>
+              <a:t>Code to rotate the plate</a:t>
+            </a:r>
+          </a:p>
+        </p:txBody>
+      </p:sp>
+      <p:sp>
+        <p:nvSpPr>
+          <p:cNvPr id="4" name="Google Shape;183;p35">
+            <a:extLst>
+              <a:ext uri="{FF2B5EF4-FFF2-40B4-BE49-F238E27FC236}">
+                <a16:creationId xmlns:a16="http://schemas.microsoft.com/office/drawing/2014/main" id="{467CB553-7946-7FB9-7BC0-01CE0FEC30FB}"/>
+              </a:ext>
+            </a:extLst>
+          </p:cNvPr>
+          <p:cNvSpPr txBox="1">
+            <a:spLocks noGrp="1"/>
+          </p:cNvSpPr>
+          <p:nvPr>
+            <p:ph type="title"/>
+          </p:nvPr>
+        </p:nvSpPr>
+        <p:spPr>
+          <a:xfrm>
+            <a:off x="403675" y="1110538"/>
+            <a:ext cx="8229600" cy="1143300"/>
+          </a:xfrm>
+          <a:prstGeom prst="rect">
+            <a:avLst/>
+          </a:prstGeom>
+        </p:spPr>
+        <p:txBody>
+          <a:bodyPr spcFirstLastPara="1" wrap="square" lIns="91425" tIns="91425" rIns="91425" bIns="91425" anchor="b" anchorCtr="0">
+            <a:noAutofit/>
+          </a:bodyPr>
+          <a:lstStyle/>
+          <a:p>
+            <a:pPr marL="0" lvl="0" indent="0" algn="l" rtl="0">
+              <a:spcBef>
+                <a:spcPts val="0"/>
+              </a:spcBef>
+              <a:spcAft>
+                <a:spcPts val="0"/>
+              </a:spcAft>
+              <a:buNone/>
+            </a:pPr>
+            <a:endParaRPr sz="2400" dirty="0"/>
+          </a:p>
+          <a:p>
+            <a:pPr marL="0" lvl="0" indent="0" algn="l" rtl="0">
+              <a:spcBef>
+                <a:spcPts val="0"/>
+              </a:spcBef>
+              <a:spcAft>
+                <a:spcPts val="0"/>
+              </a:spcAft>
+              <a:buNone/>
+            </a:pPr>
+            <a:r>
+              <a:rPr lang="en-US" sz="2400" b="0" dirty="0"/>
+              <a:t>The goal here is to spin the beam about its center for t&lt;1, and then release it.</a:t>
+            </a:r>
+            <a:endParaRPr sz="2400" b="0" dirty="0"/>
           </a:p>
         </p:txBody>
       </p:sp>
@@ -21643,6 +22381,129 @@
 </file>
 
 <file path=ppt/slides/slide16.xml><?xml version="1.0" encoding="utf-8"?>
+<p:sld xmlns:a="http://schemas.openxmlformats.org/drawingml/2006/main" xmlns:r="http://schemas.openxmlformats.org/officeDocument/2006/relationships" xmlns:p="http://schemas.openxmlformats.org/presentationml/2006/main">
+  <p:cSld>
+    <p:spTree>
+      <p:nvGrpSpPr>
+        <p:cNvPr id="1" name="Shape 182"/>
+        <p:cNvGrpSpPr/>
+        <p:nvPr/>
+      </p:nvGrpSpPr>
+      <p:grpSpPr>
+        <a:xfrm>
+          <a:off x="0" y="0"/>
+          <a:ext cx="0" cy="0"/>
+          <a:chOff x="0" y="0"/>
+          <a:chExt cx="0" cy="0"/>
+        </a:xfrm>
+      </p:grpSpPr>
+      <p:sp>
+        <p:nvSpPr>
+          <p:cNvPr id="183" name="Google Shape;183;p35"/>
+          <p:cNvSpPr txBox="1">
+            <a:spLocks noGrp="1"/>
+          </p:cNvSpPr>
+          <p:nvPr>
+            <p:ph type="title"/>
+          </p:nvPr>
+        </p:nvSpPr>
+        <p:spPr>
+          <a:xfrm>
+            <a:off x="403675" y="1110538"/>
+            <a:ext cx="8229600" cy="1143300"/>
+          </a:xfrm>
+          <a:prstGeom prst="rect">
+            <a:avLst/>
+          </a:prstGeom>
+        </p:spPr>
+        <p:txBody>
+          <a:bodyPr spcFirstLastPara="1" wrap="square" lIns="91425" tIns="91425" rIns="91425" bIns="91425" anchor="b" anchorCtr="0">
+            <a:noAutofit/>
+          </a:bodyPr>
+          <a:lstStyle/>
+          <a:p>
+            <a:pPr marL="0" lvl="0" indent="0" algn="l" rtl="0">
+              <a:spcBef>
+                <a:spcPts val="0"/>
+              </a:spcBef>
+              <a:spcAft>
+                <a:spcPts val="0"/>
+              </a:spcAft>
+              <a:buNone/>
+            </a:pPr>
+            <a:r>
+              <a:rPr lang="en-US" sz="2400" dirty="0"/>
+              <a:t>1-IBFE-Example_TetherForceFullPlate2D-Rotate</a:t>
+            </a:r>
+            <a:endParaRPr sz="2400" dirty="0"/>
+          </a:p>
+          <a:p>
+            <a:pPr marL="0" lvl="0" indent="0" algn="l" rtl="0">
+              <a:spcBef>
+                <a:spcPts val="0"/>
+              </a:spcBef>
+              <a:spcAft>
+                <a:spcPts val="0"/>
+              </a:spcAft>
+              <a:buNone/>
+            </a:pPr>
+            <a:endParaRPr sz="2400" dirty="0"/>
+          </a:p>
+          <a:p>
+            <a:pPr marL="0" lvl="0" indent="0" algn="l" rtl="0">
+              <a:spcBef>
+                <a:spcPts val="0"/>
+              </a:spcBef>
+              <a:spcAft>
+                <a:spcPts val="0"/>
+              </a:spcAft>
+              <a:buNone/>
+            </a:pPr>
+            <a:r>
+              <a:rPr lang="en-US" sz="2400" b="0" dirty="0"/>
+              <a:t>The goal here is to spin the beam about its center for t&lt;1, and then release it.</a:t>
+            </a:r>
+            <a:endParaRPr sz="2400" b="0" dirty="0"/>
+          </a:p>
+        </p:txBody>
+      </p:sp>
+      <p:pic>
+        <p:nvPicPr>
+          <p:cNvPr id="184" name="Google Shape;184;p35" descr="Screen Shot 2016-06-27 at 1.30.46 PM.png"/>
+          <p:cNvPicPr preferRelativeResize="0"/>
+          <p:nvPr/>
+        </p:nvPicPr>
+        <p:blipFill>
+          <a:blip r:embed="rId3">
+            <a:alphaModFix/>
+          </a:blip>
+          <a:stretch>
+            <a:fillRect/>
+          </a:stretch>
+        </p:blipFill>
+        <p:spPr>
+          <a:xfrm>
+            <a:off x="2174425" y="2394600"/>
+            <a:ext cx="3712026" cy="3219600"/>
+          </a:xfrm>
+          <a:prstGeom prst="rect">
+            <a:avLst/>
+          </a:prstGeom>
+          <a:noFill/>
+          <a:ln>
+            <a:noFill/>
+          </a:ln>
+        </p:spPr>
+      </p:pic>
+    </p:spTree>
+  </p:cSld>
+  <p:clrMapOvr>
+    <a:masterClrMapping/>
+  </p:clrMapOvr>
+</p:sld>
+</file>
+
+<file path=ppt/slides/slide17.xml><?xml version="1.0" encoding="utf-8"?>
 <p:sld xmlns:a="http://schemas.openxmlformats.org/drawingml/2006/main" xmlns:r="http://schemas.openxmlformats.org/officeDocument/2006/relationships" xmlns:p="http://schemas.openxmlformats.org/presentationml/2006/main">
   <p:cSld>
     <p:spTree>
@@ -21977,7 +22838,7 @@
 </p:sld>
 </file>
 
-<file path=ppt/slides/slide17.xml><?xml version="1.0" encoding="utf-8"?>
+<file path=ppt/slides/slide18.xml><?xml version="1.0" encoding="utf-8"?>
 <p:sld xmlns:a="http://schemas.openxmlformats.org/drawingml/2006/main" xmlns:r="http://schemas.openxmlformats.org/officeDocument/2006/relationships" xmlns:p="http://schemas.openxmlformats.org/presentationml/2006/main">
   <p:cSld>
     <p:spTree>
@@ -22060,7 +22921,7 @@
 </p:sld>
 </file>
 
-<file path=ppt/slides/slide18.xml><?xml version="1.0" encoding="utf-8"?>
+<file path=ppt/slides/slide19.xml><?xml version="1.0" encoding="utf-8"?>
 <p:sld xmlns:a="http://schemas.openxmlformats.org/drawingml/2006/main" xmlns:r="http://schemas.openxmlformats.org/officeDocument/2006/relationships" xmlns:p="http://schemas.openxmlformats.org/presentationml/2006/main">
   <p:cSld>
     <p:spTree>
@@ -22132,275 +22993,6 @@
               <a:t>https://www.youtube.com/watch?v=Kj_MACemSd0</a:t>
             </a:r>
             <a:endParaRPr sz="2400"/>
-          </a:p>
-        </p:txBody>
-      </p:sp>
-    </p:spTree>
-  </p:cSld>
-  <p:clrMapOvr>
-    <a:masterClrMapping/>
-  </p:clrMapOvr>
-</p:sld>
-</file>
-
-<file path=ppt/slides/slide19.xml><?xml version="1.0" encoding="utf-8"?>
-<p:sld xmlns:a="http://schemas.openxmlformats.org/drawingml/2006/main" xmlns:r="http://schemas.openxmlformats.org/officeDocument/2006/relationships" xmlns:p="http://schemas.openxmlformats.org/presentationml/2006/main">
-  <p:cSld>
-    <p:spTree>
-      <p:nvGrpSpPr>
-        <p:cNvPr id="1" name="Shape 209"/>
-        <p:cNvGrpSpPr/>
-        <p:nvPr/>
-      </p:nvGrpSpPr>
-      <p:grpSpPr>
-        <a:xfrm>
-          <a:off x="0" y="0"/>
-          <a:ext cx="0" cy="0"/>
-          <a:chOff x="0" y="0"/>
-          <a:chExt cx="0" cy="0"/>
-        </a:xfrm>
-      </p:grpSpPr>
-      <p:sp>
-        <p:nvSpPr>
-          <p:cNvPr id="210" name="Google Shape;210;p40"/>
-          <p:cNvSpPr txBox="1">
-            <a:spLocks noGrp="1"/>
-          </p:cNvSpPr>
-          <p:nvPr>
-            <p:ph type="title"/>
-          </p:nvPr>
-        </p:nvSpPr>
-        <p:spPr>
-          <a:xfrm>
-            <a:off x="457200" y="274638"/>
-            <a:ext cx="8229600" cy="1143000"/>
-          </a:xfrm>
-          <a:prstGeom prst="rect">
-            <a:avLst/>
-          </a:prstGeom>
-          <a:noFill/>
-          <a:ln>
-            <a:noFill/>
-          </a:ln>
-        </p:spPr>
-        <p:txBody>
-          <a:bodyPr spcFirstLastPara="1" wrap="square" lIns="91425" tIns="45700" rIns="91425" bIns="45700" anchor="ctr" anchorCtr="0">
-            <a:noAutofit/>
-          </a:bodyPr>
-          <a:lstStyle/>
-          <a:p>
-            <a:pPr marL="0" marR="0" lvl="0" indent="0" algn="ctr" rtl="0">
-              <a:spcBef>
-                <a:spcPts val="0"/>
-              </a:spcBef>
-              <a:spcAft>
-                <a:spcPts val="0"/>
-              </a:spcAft>
-              <a:buClr>
-                <a:schemeClr val="dk1"/>
-              </a:buClr>
-              <a:buFont typeface="Calibri"/>
-              <a:buNone/>
-            </a:pPr>
-            <a:r>
-              <a:rPr lang="en-US" sz="4400" b="0" i="0" u="none" strike="noStrike" cap="none">
-                <a:solidFill>
-                  <a:schemeClr val="dk1"/>
-                </a:solidFill>
-                <a:latin typeface="Calibri"/>
-                <a:ea typeface="Calibri"/>
-                <a:cs typeface="Calibri"/>
-                <a:sym typeface="Calibri"/>
-              </a:rPr>
-              <a:t>File Formats</a:t>
-            </a:r>
-            <a:endParaRPr sz="1800" b="0" i="0" u="none" strike="noStrike" cap="none">
-              <a:solidFill>
-                <a:schemeClr val="dk1"/>
-              </a:solidFill>
-              <a:latin typeface="Calibri"/>
-              <a:ea typeface="Calibri"/>
-              <a:cs typeface="Calibri"/>
-              <a:sym typeface="Calibri"/>
-            </a:endParaRPr>
-          </a:p>
-        </p:txBody>
-      </p:sp>
-      <p:sp>
-        <p:nvSpPr>
-          <p:cNvPr id="211" name="Google Shape;211;p40"/>
-          <p:cNvSpPr txBox="1">
-            <a:spLocks noGrp="1"/>
-          </p:cNvSpPr>
-          <p:nvPr>
-            <p:ph type="body" idx="1"/>
-          </p:nvPr>
-        </p:nvSpPr>
-        <p:spPr>
-          <a:xfrm>
-            <a:off x="457200" y="1600200"/>
-            <a:ext cx="8229600" cy="4525963"/>
-          </a:xfrm>
-          <a:prstGeom prst="rect">
-            <a:avLst/>
-          </a:prstGeom>
-          <a:noFill/>
-          <a:ln>
-            <a:noFill/>
-          </a:ln>
-        </p:spPr>
-        <p:txBody>
-          <a:bodyPr spcFirstLastPara="1" wrap="square" lIns="91425" tIns="45700" rIns="91425" bIns="45700" anchor="t" anchorCtr="0">
-            <a:noAutofit/>
-          </a:bodyPr>
-          <a:lstStyle/>
-          <a:p>
-            <a:pPr marL="342900" marR="0" lvl="0" indent="-342900" algn="l" rtl="0">
-              <a:spcBef>
-                <a:spcPts val="640"/>
-              </a:spcBef>
-              <a:spcAft>
-                <a:spcPts val="0"/>
-              </a:spcAft>
-              <a:buClr>
-                <a:schemeClr val="dk1"/>
-              </a:buClr>
-              <a:buSzPts val="1900"/>
-              <a:buFont typeface="Calibri"/>
-              <a:buChar char="●"/>
-            </a:pPr>
-            <a:r>
-              <a:rPr lang="en-US" sz="3200" b="0" i="0" u="none" strike="noStrike" cap="none">
-                <a:solidFill>
-                  <a:schemeClr val="dk1"/>
-                </a:solidFill>
-                <a:latin typeface="Calibri"/>
-                <a:ea typeface="Calibri"/>
-                <a:cs typeface="Calibri"/>
-                <a:sym typeface="Calibri"/>
-              </a:rPr>
-              <a:t>dumps.visit – Eulerian data</a:t>
-            </a:r>
-            <a:endParaRPr sz="3200" b="0" i="0" u="none" strike="noStrike" cap="none">
-              <a:solidFill>
-                <a:schemeClr val="dk1"/>
-              </a:solidFill>
-              <a:latin typeface="Calibri"/>
-              <a:ea typeface="Calibri"/>
-              <a:cs typeface="Calibri"/>
-              <a:sym typeface="Calibri"/>
-            </a:endParaRPr>
-          </a:p>
-          <a:p>
-            <a:pPr marL="342900" marR="0" lvl="0" indent="-342900" algn="l" rtl="0">
-              <a:spcBef>
-                <a:spcPts val="0"/>
-              </a:spcBef>
-              <a:spcAft>
-                <a:spcPts val="0"/>
-              </a:spcAft>
-              <a:buClr>
-                <a:schemeClr val="dk1"/>
-              </a:buClr>
-              <a:buSzPts val="1900"/>
-              <a:buFont typeface="Calibri"/>
-              <a:buChar char="●"/>
-            </a:pPr>
-            <a:r>
-              <a:rPr lang="en-US" sz="3200" b="0" i="0" u="none" strike="noStrike" cap="none">
-                <a:solidFill>
-                  <a:schemeClr val="dk1"/>
-                </a:solidFill>
-                <a:latin typeface="Calibri"/>
-                <a:ea typeface="Calibri"/>
-                <a:cs typeface="Calibri"/>
-                <a:sym typeface="Calibri"/>
-              </a:rPr>
-              <a:t>output.ex2 – Finite Element/Lagrangian data</a:t>
-            </a:r>
-            <a:endParaRPr sz="3200" b="0" i="0" u="none" strike="noStrike" cap="none">
-              <a:solidFill>
-                <a:schemeClr val="dk1"/>
-              </a:solidFill>
-              <a:latin typeface="Calibri"/>
-              <a:ea typeface="Calibri"/>
-              <a:cs typeface="Calibri"/>
-              <a:sym typeface="Calibri"/>
-            </a:endParaRPr>
-          </a:p>
-          <a:p>
-            <a:pPr marL="742950" marR="0" lvl="1" indent="-285750" algn="l" rtl="0">
-              <a:spcBef>
-                <a:spcPts val="0"/>
-              </a:spcBef>
-              <a:spcAft>
-                <a:spcPts val="0"/>
-              </a:spcAft>
-              <a:buClr>
-                <a:schemeClr val="dk1"/>
-              </a:buClr>
-              <a:buSzPts val="1700"/>
-              <a:buFont typeface="Calibri"/>
-              <a:buChar char="●"/>
-            </a:pPr>
-            <a:r>
-              <a:rPr lang="en-US" sz="2800" b="0" i="0" u="none" strike="noStrike" cap="none">
-                <a:solidFill>
-                  <a:schemeClr val="dk1"/>
-                </a:solidFill>
-                <a:latin typeface="Calibri"/>
-                <a:ea typeface="Calibri"/>
-                <a:cs typeface="Calibri"/>
-                <a:sym typeface="Calibri"/>
-              </a:rPr>
-              <a:t>Exodus II type file</a:t>
-            </a:r>
-            <a:endParaRPr sz="2800" b="0" i="0" u="none" strike="noStrike" cap="none">
-              <a:solidFill>
-                <a:schemeClr val="dk1"/>
-              </a:solidFill>
-              <a:latin typeface="Calibri"/>
-              <a:ea typeface="Calibri"/>
-              <a:cs typeface="Calibri"/>
-              <a:sym typeface="Calibri"/>
-            </a:endParaRPr>
-          </a:p>
-          <a:p>
-            <a:pPr marL="742950" marR="0" lvl="1" indent="-285750" algn="l" rtl="0">
-              <a:spcBef>
-                <a:spcPts val="0"/>
-              </a:spcBef>
-              <a:spcAft>
-                <a:spcPts val="0"/>
-              </a:spcAft>
-              <a:buClr>
-                <a:schemeClr val="dk1"/>
-              </a:buClr>
-              <a:buSzPts val="1700"/>
-              <a:buFont typeface="Calibri"/>
-              <a:buChar char="●"/>
-            </a:pPr>
-            <a:r>
-              <a:rPr lang="en-US" sz="2800" b="0" i="0" u="none" strike="noStrike" cap="none">
-                <a:solidFill>
-                  <a:schemeClr val="dk1"/>
-                </a:solidFill>
-                <a:latin typeface="Calibri"/>
-                <a:ea typeface="Calibri"/>
-                <a:cs typeface="Calibri"/>
-                <a:sym typeface="Calibri"/>
-              </a:rPr>
-              <a:t>Can have multiple files of this type for different parts of object</a:t>
-            </a:r>
-            <a:endParaRPr sz="1800" b="0" i="0" u="none" strike="noStrike" cap="none">
-              <a:solidFill>
-                <a:schemeClr val="dk1"/>
-              </a:solidFill>
-              <a:latin typeface="Calibri"/>
-              <a:ea typeface="Calibri"/>
-              <a:cs typeface="Calibri"/>
-              <a:sym typeface="Calibri"/>
-            </a:endParaRPr>
           </a:p>
         </p:txBody>
       </p:sp>
@@ -22720,6 +23312,275 @@
   <p:cSld>
     <p:spTree>
       <p:nvGrpSpPr>
+        <p:cNvPr id="1" name="Shape 209"/>
+        <p:cNvGrpSpPr/>
+        <p:nvPr/>
+      </p:nvGrpSpPr>
+      <p:grpSpPr>
+        <a:xfrm>
+          <a:off x="0" y="0"/>
+          <a:ext cx="0" cy="0"/>
+          <a:chOff x="0" y="0"/>
+          <a:chExt cx="0" cy="0"/>
+        </a:xfrm>
+      </p:grpSpPr>
+      <p:sp>
+        <p:nvSpPr>
+          <p:cNvPr id="210" name="Google Shape;210;p40"/>
+          <p:cNvSpPr txBox="1">
+            <a:spLocks noGrp="1"/>
+          </p:cNvSpPr>
+          <p:nvPr>
+            <p:ph type="title"/>
+          </p:nvPr>
+        </p:nvSpPr>
+        <p:spPr>
+          <a:xfrm>
+            <a:off x="457200" y="274638"/>
+            <a:ext cx="8229600" cy="1143000"/>
+          </a:xfrm>
+          <a:prstGeom prst="rect">
+            <a:avLst/>
+          </a:prstGeom>
+          <a:noFill/>
+          <a:ln>
+            <a:noFill/>
+          </a:ln>
+        </p:spPr>
+        <p:txBody>
+          <a:bodyPr spcFirstLastPara="1" wrap="square" lIns="91425" tIns="45700" rIns="91425" bIns="45700" anchor="ctr" anchorCtr="0">
+            <a:noAutofit/>
+          </a:bodyPr>
+          <a:lstStyle/>
+          <a:p>
+            <a:pPr marL="0" marR="0" lvl="0" indent="0" algn="ctr" rtl="0">
+              <a:spcBef>
+                <a:spcPts val="0"/>
+              </a:spcBef>
+              <a:spcAft>
+                <a:spcPts val="0"/>
+              </a:spcAft>
+              <a:buClr>
+                <a:schemeClr val="dk1"/>
+              </a:buClr>
+              <a:buFont typeface="Calibri"/>
+              <a:buNone/>
+            </a:pPr>
+            <a:r>
+              <a:rPr lang="en-US" sz="4400" b="0" i="0" u="none" strike="noStrike" cap="none">
+                <a:solidFill>
+                  <a:schemeClr val="dk1"/>
+                </a:solidFill>
+                <a:latin typeface="Calibri"/>
+                <a:ea typeface="Calibri"/>
+                <a:cs typeface="Calibri"/>
+                <a:sym typeface="Calibri"/>
+              </a:rPr>
+              <a:t>File Formats</a:t>
+            </a:r>
+            <a:endParaRPr sz="1800" b="0" i="0" u="none" strike="noStrike" cap="none">
+              <a:solidFill>
+                <a:schemeClr val="dk1"/>
+              </a:solidFill>
+              <a:latin typeface="Calibri"/>
+              <a:ea typeface="Calibri"/>
+              <a:cs typeface="Calibri"/>
+              <a:sym typeface="Calibri"/>
+            </a:endParaRPr>
+          </a:p>
+        </p:txBody>
+      </p:sp>
+      <p:sp>
+        <p:nvSpPr>
+          <p:cNvPr id="211" name="Google Shape;211;p40"/>
+          <p:cNvSpPr txBox="1">
+            <a:spLocks noGrp="1"/>
+          </p:cNvSpPr>
+          <p:nvPr>
+            <p:ph type="body" idx="1"/>
+          </p:nvPr>
+        </p:nvSpPr>
+        <p:spPr>
+          <a:xfrm>
+            <a:off x="457200" y="1600200"/>
+            <a:ext cx="8229600" cy="4525963"/>
+          </a:xfrm>
+          <a:prstGeom prst="rect">
+            <a:avLst/>
+          </a:prstGeom>
+          <a:noFill/>
+          <a:ln>
+            <a:noFill/>
+          </a:ln>
+        </p:spPr>
+        <p:txBody>
+          <a:bodyPr spcFirstLastPara="1" wrap="square" lIns="91425" tIns="45700" rIns="91425" bIns="45700" anchor="t" anchorCtr="0">
+            <a:noAutofit/>
+          </a:bodyPr>
+          <a:lstStyle/>
+          <a:p>
+            <a:pPr marL="342900" marR="0" lvl="0" indent="-342900" algn="l" rtl="0">
+              <a:spcBef>
+                <a:spcPts val="640"/>
+              </a:spcBef>
+              <a:spcAft>
+                <a:spcPts val="0"/>
+              </a:spcAft>
+              <a:buClr>
+                <a:schemeClr val="dk1"/>
+              </a:buClr>
+              <a:buSzPts val="1900"/>
+              <a:buFont typeface="Calibri"/>
+              <a:buChar char="●"/>
+            </a:pPr>
+            <a:r>
+              <a:rPr lang="en-US" sz="3200" b="0" i="0" u="none" strike="noStrike" cap="none">
+                <a:solidFill>
+                  <a:schemeClr val="dk1"/>
+                </a:solidFill>
+                <a:latin typeface="Calibri"/>
+                <a:ea typeface="Calibri"/>
+                <a:cs typeface="Calibri"/>
+                <a:sym typeface="Calibri"/>
+              </a:rPr>
+              <a:t>dumps.visit – Eulerian data</a:t>
+            </a:r>
+            <a:endParaRPr sz="3200" b="0" i="0" u="none" strike="noStrike" cap="none">
+              <a:solidFill>
+                <a:schemeClr val="dk1"/>
+              </a:solidFill>
+              <a:latin typeface="Calibri"/>
+              <a:ea typeface="Calibri"/>
+              <a:cs typeface="Calibri"/>
+              <a:sym typeface="Calibri"/>
+            </a:endParaRPr>
+          </a:p>
+          <a:p>
+            <a:pPr marL="342900" marR="0" lvl="0" indent="-342900" algn="l" rtl="0">
+              <a:spcBef>
+                <a:spcPts val="0"/>
+              </a:spcBef>
+              <a:spcAft>
+                <a:spcPts val="0"/>
+              </a:spcAft>
+              <a:buClr>
+                <a:schemeClr val="dk1"/>
+              </a:buClr>
+              <a:buSzPts val="1900"/>
+              <a:buFont typeface="Calibri"/>
+              <a:buChar char="●"/>
+            </a:pPr>
+            <a:r>
+              <a:rPr lang="en-US" sz="3200" b="0" i="0" u="none" strike="noStrike" cap="none">
+                <a:solidFill>
+                  <a:schemeClr val="dk1"/>
+                </a:solidFill>
+                <a:latin typeface="Calibri"/>
+                <a:ea typeface="Calibri"/>
+                <a:cs typeface="Calibri"/>
+                <a:sym typeface="Calibri"/>
+              </a:rPr>
+              <a:t>output.ex2 – Finite Element/Lagrangian data</a:t>
+            </a:r>
+            <a:endParaRPr sz="3200" b="0" i="0" u="none" strike="noStrike" cap="none">
+              <a:solidFill>
+                <a:schemeClr val="dk1"/>
+              </a:solidFill>
+              <a:latin typeface="Calibri"/>
+              <a:ea typeface="Calibri"/>
+              <a:cs typeface="Calibri"/>
+              <a:sym typeface="Calibri"/>
+            </a:endParaRPr>
+          </a:p>
+          <a:p>
+            <a:pPr marL="742950" marR="0" lvl="1" indent="-285750" algn="l" rtl="0">
+              <a:spcBef>
+                <a:spcPts val="0"/>
+              </a:spcBef>
+              <a:spcAft>
+                <a:spcPts val="0"/>
+              </a:spcAft>
+              <a:buClr>
+                <a:schemeClr val="dk1"/>
+              </a:buClr>
+              <a:buSzPts val="1700"/>
+              <a:buFont typeface="Calibri"/>
+              <a:buChar char="●"/>
+            </a:pPr>
+            <a:r>
+              <a:rPr lang="en-US" sz="2800" b="0" i="0" u="none" strike="noStrike" cap="none">
+                <a:solidFill>
+                  <a:schemeClr val="dk1"/>
+                </a:solidFill>
+                <a:latin typeface="Calibri"/>
+                <a:ea typeface="Calibri"/>
+                <a:cs typeface="Calibri"/>
+                <a:sym typeface="Calibri"/>
+              </a:rPr>
+              <a:t>Exodus II type file</a:t>
+            </a:r>
+            <a:endParaRPr sz="2800" b="0" i="0" u="none" strike="noStrike" cap="none">
+              <a:solidFill>
+                <a:schemeClr val="dk1"/>
+              </a:solidFill>
+              <a:latin typeface="Calibri"/>
+              <a:ea typeface="Calibri"/>
+              <a:cs typeface="Calibri"/>
+              <a:sym typeface="Calibri"/>
+            </a:endParaRPr>
+          </a:p>
+          <a:p>
+            <a:pPr marL="742950" marR="0" lvl="1" indent="-285750" algn="l" rtl="0">
+              <a:spcBef>
+                <a:spcPts val="0"/>
+              </a:spcBef>
+              <a:spcAft>
+                <a:spcPts val="0"/>
+              </a:spcAft>
+              <a:buClr>
+                <a:schemeClr val="dk1"/>
+              </a:buClr>
+              <a:buSzPts val="1700"/>
+              <a:buFont typeface="Calibri"/>
+              <a:buChar char="●"/>
+            </a:pPr>
+            <a:r>
+              <a:rPr lang="en-US" sz="2800" b="0" i="0" u="none" strike="noStrike" cap="none">
+                <a:solidFill>
+                  <a:schemeClr val="dk1"/>
+                </a:solidFill>
+                <a:latin typeface="Calibri"/>
+                <a:ea typeface="Calibri"/>
+                <a:cs typeface="Calibri"/>
+                <a:sym typeface="Calibri"/>
+              </a:rPr>
+              <a:t>Can have multiple files of this type for different parts of object</a:t>
+            </a:r>
+            <a:endParaRPr sz="1800" b="0" i="0" u="none" strike="noStrike" cap="none">
+              <a:solidFill>
+                <a:schemeClr val="dk1"/>
+              </a:solidFill>
+              <a:latin typeface="Calibri"/>
+              <a:ea typeface="Calibri"/>
+              <a:cs typeface="Calibri"/>
+              <a:sym typeface="Calibri"/>
+            </a:endParaRPr>
+          </a:p>
+        </p:txBody>
+      </p:sp>
+    </p:spTree>
+  </p:cSld>
+  <p:clrMapOvr>
+    <a:masterClrMapping/>
+  </p:clrMapOvr>
+</p:sld>
+</file>
+
+<file path=ppt/slides/slide21.xml><?xml version="1.0" encoding="utf-8"?>
+<p:sld xmlns:a="http://schemas.openxmlformats.org/drawingml/2006/main" xmlns:r="http://schemas.openxmlformats.org/officeDocument/2006/relationships" xmlns:p="http://schemas.openxmlformats.org/presentationml/2006/main">
+  <p:cSld>
+    <p:spTree>
+      <p:nvGrpSpPr>
         <p:cNvPr id="1" name="Shape 215"/>
         <p:cNvGrpSpPr/>
         <p:nvPr/>
@@ -22993,7 +23854,7 @@
 </p:sld>
 </file>
 
-<file path=ppt/slides/slide21.xml><?xml version="1.0" encoding="utf-8"?>
+<file path=ppt/slides/slide22.xml><?xml version="1.0" encoding="utf-8"?>
 <p:sld xmlns:a="http://schemas.openxmlformats.org/drawingml/2006/main" xmlns:r="http://schemas.openxmlformats.org/officeDocument/2006/relationships" xmlns:p="http://schemas.openxmlformats.org/presentationml/2006/main">
   <p:cSld>
     <p:spTree>
@@ -23486,7 +24347,7 @@
 </p:sld>
 </file>
 
-<file path=ppt/slides/slide22.xml><?xml version="1.0" encoding="utf-8"?>
+<file path=ppt/slides/slide23.xml><?xml version="1.0" encoding="utf-8"?>
 <p:sld xmlns:a="http://schemas.openxmlformats.org/drawingml/2006/main" xmlns:r="http://schemas.openxmlformats.org/officeDocument/2006/relationships" xmlns:p="http://schemas.openxmlformats.org/presentationml/2006/main">
   <p:cSld>
     <p:spTree>
@@ -23794,7 +24655,7 @@
 </p:sld>
 </file>
 
-<file path=ppt/slides/slide23.xml><?xml version="1.0" encoding="utf-8"?>
+<file path=ppt/slides/slide24.xml><?xml version="1.0" encoding="utf-8"?>
 <p:sld xmlns:a="http://schemas.openxmlformats.org/drawingml/2006/main" xmlns:r="http://schemas.openxmlformats.org/officeDocument/2006/relationships" xmlns:p="http://schemas.openxmlformats.org/presentationml/2006/main">
   <p:cSld>
     <p:spTree>
@@ -24163,7 +25024,7 @@
 </p:sld>
 </file>
 
-<file path=ppt/slides/slide24.xml><?xml version="1.0" encoding="utf-8"?>
+<file path=ppt/slides/slide25.xml><?xml version="1.0" encoding="utf-8"?>
 <p:sld xmlns:a="http://schemas.openxmlformats.org/drawingml/2006/main" xmlns:r="http://schemas.openxmlformats.org/officeDocument/2006/relationships" xmlns:p="http://schemas.openxmlformats.org/presentationml/2006/main">
   <p:cSld>
     <p:spTree>
@@ -24461,7 +25322,7 @@
 </p:sld>
 </file>
 
-<file path=ppt/slides/slide25.xml><?xml version="1.0" encoding="utf-8"?>
+<file path=ppt/slides/slide26.xml><?xml version="1.0" encoding="utf-8"?>
 <p:sld xmlns:a="http://schemas.openxmlformats.org/drawingml/2006/main" xmlns:r="http://schemas.openxmlformats.org/officeDocument/2006/relationships" xmlns:p="http://schemas.openxmlformats.org/presentationml/2006/main">
   <p:cSld>
     <p:spTree>

</xml_diff>

<commit_message>
Update 1-IBFE Getting Starting and Visualizing a Mesh.pptx
</commit_message>
<xml_diff>
--- a/IBFE Lectures/1-IBFE Getting Starting and Visualizing a Mesh.pptx
+++ b/IBFE Lectures/1-IBFE Getting Starting and Visualizing a Mesh.pptx
@@ -22973,10 +22973,18 @@
               <a:buNone/>
             </a:pPr>
             <a:r>
-              <a:rPr lang="en-US" sz="2400"/>
-              <a:t>Please also see the youtube tutorial from Shannon Jones here:</a:t>
-            </a:r>
-            <a:endParaRPr sz="2400"/>
+              <a:rPr lang="en-US" sz="2400" dirty="0"/>
+              <a:t>Please also see the </a:t>
+            </a:r>
+            <a:r>
+              <a:rPr lang="en-US" sz="2400" dirty="0" err="1"/>
+              <a:t>youtube</a:t>
+            </a:r>
+            <a:r>
+              <a:rPr lang="en-US" sz="2400" dirty="0"/>
+              <a:t> tutorial from Shannon Jones here:</a:t>
+            </a:r>
+            <a:endParaRPr sz="2400" dirty="0"/>
           </a:p>
           <a:p>
             <a:pPr marL="0" lvl="0" indent="0" algn="ctr" rtl="0">
@@ -22989,10 +22997,10 @@
               <a:buNone/>
             </a:pPr>
             <a:r>
-              <a:rPr lang="en-US" sz="2400"/>
+              <a:rPr lang="en-US" sz="2400" dirty="0"/>
               <a:t>https://www.youtube.com/watch?v=Kj_MACemSd0</a:t>
             </a:r>
-            <a:endParaRPr sz="2400"/>
+            <a:endParaRPr sz="2400" dirty="0"/>
           </a:p>
         </p:txBody>
       </p:sp>
@@ -23106,6 +23114,22 @@
               <a:rPr lang="en-US" sz="1800" dirty="0"/>
               <a:t>Original Paper: </a:t>
             </a:r>
+          </a:p>
+          <a:p>
+            <a:pPr marL="0" lvl="0" indent="0" algn="l" rtl="0">
+              <a:spcBef>
+                <a:spcPts val="600"/>
+              </a:spcBef>
+              <a:spcAft>
+                <a:spcPts val="0"/>
+              </a:spcAft>
+              <a:buClr>
+                <a:schemeClr val="dk1"/>
+              </a:buClr>
+              <a:buSzPts val="1100"/>
+              <a:buFont typeface="Arial"/>
+              <a:buNone/>
+            </a:pPr>
             <a:r>
               <a:rPr lang="en-US" sz="1800" u="sng" dirty="0">
                 <a:solidFill>
@@ -23113,7 +23137,38 @@
                 </a:solidFill>
                 <a:hlinkClick r:id="rId3"/>
               </a:rPr>
-              <a:t>http://www.math.nyu.edu/phd_students/griffith/docs/griffith_luo_ibfem.pdf</a:t>
+              <a:t>https://arxiv.org/abs/1612.05916</a:t>
+            </a:r>
+            <a:endParaRPr lang="en-US" sz="1800" u="sng" dirty="0">
+              <a:solidFill>
+                <a:schemeClr val="hlink"/>
+              </a:solidFill>
+            </a:endParaRPr>
+          </a:p>
+          <a:p>
+            <a:pPr marL="0" lvl="0" indent="0" algn="l" rtl="0">
+              <a:spcBef>
+                <a:spcPts val="600"/>
+              </a:spcBef>
+              <a:spcAft>
+                <a:spcPts val="0"/>
+              </a:spcAft>
+              <a:buClr>
+                <a:schemeClr val="dk1"/>
+              </a:buClr>
+              <a:buSzPts val="1100"/>
+              <a:buFont typeface="Arial"/>
+              <a:buNone/>
+            </a:pPr>
+            <a:r>
+              <a:rPr lang="en-US" sz="1800" dirty="0">
+                <a:hlinkClick r:id="rId4"/>
+              </a:rPr>
+              <a:t>https://onlinelibrary.wiley.com/doi/full/10.1002/cnm.2888</a:t>
+            </a:r>
+            <a:r>
+              <a:rPr lang="en-US" sz="1800" dirty="0"/>
+              <a:t> </a:t>
             </a:r>
             <a:endParaRPr sz="1800" dirty="0"/>
           </a:p>
@@ -23152,7 +23207,7 @@
                 <a:solidFill>
                   <a:schemeClr val="hlink"/>
                 </a:solidFill>
-                <a:hlinkClick r:id="rId4"/>
+                <a:hlinkClick r:id="rId5"/>
               </a:rPr>
               <a:t>http://libmesh.sourceforge.net/doxygen/index.php</a:t>
             </a:r>
@@ -23193,7 +23248,7 @@
                 <a:solidFill>
                   <a:schemeClr val="hlink"/>
                 </a:solidFill>
-                <a:hlinkClick r:id="rId5"/>
+                <a:hlinkClick r:id="rId6"/>
               </a:rPr>
               <a:t>http://libmesh.sourceforge.net/doxygen/classlibMesh_1_1MeshInput.php</a:t>
             </a:r>
@@ -23234,7 +23289,7 @@
                 <a:solidFill>
                   <a:schemeClr val="hlink"/>
                 </a:solidFill>
-                <a:hlinkClick r:id="rId6"/>
+                <a:hlinkClick r:id="rId7"/>
               </a:rPr>
               <a:t>http://libmesh.sourceforge.net/doxygen/classlibMesh_1_1TensorValue.php</a:t>
             </a:r>
@@ -23279,7 +23334,7 @@
                 <a:solidFill>
                   <a:schemeClr val="hlink"/>
                 </a:solidFill>
-                <a:hlinkClick r:id="rId7"/>
+                <a:hlinkClick r:id="rId8"/>
               </a:rPr>
               <a:t>https://code.google.com/p/ibamr/source/browse/branches/boyceg/ibtk/src/utilities/libmesh_utilities.h?spec=svn2564&amp;r=2564</a:t>
             </a:r>
@@ -24716,7 +24771,7 @@
               <a:buChar char="●"/>
             </a:pPr>
             <a:r>
-              <a:rPr lang="en-US" sz="2950" b="0" i="0" u="none" strike="noStrike" cap="none">
+              <a:rPr lang="en-US" sz="2950" b="0" i="0" u="none" strike="noStrike" cap="none" dirty="0">
                 <a:solidFill>
                   <a:schemeClr val="dk1"/>
                 </a:solidFill>
@@ -24728,7 +24783,7 @@
               <a:t>I</a:t>
             </a:r>
             <a:r>
-              <a:rPr lang="en-US" sz="2400" b="0" i="0" u="none" strike="noStrike" cap="none">
+              <a:rPr lang="en-US" sz="2400" b="0" i="0" u="none" strike="noStrike" cap="none" dirty="0">
                 <a:solidFill>
                   <a:schemeClr val="dk1"/>
                 </a:solidFill>
@@ -24740,11 +24795,11 @@
               <a:t>n the ‘Definition’ section, write ‘{dX_0,dX_1,0}’ if 2D and ‘</a:t>
             </a:r>
             <a:r>
-              <a:rPr lang="en-US" sz="2400"/>
+              <a:rPr lang="en-US" sz="2400" dirty="0"/>
               <a:t>{dX_0,dX_1,dX_2}</a:t>
             </a:r>
             <a:r>
-              <a:rPr lang="en-US" sz="2400" b="0" i="0" u="none" strike="noStrike" cap="none">
+              <a:rPr lang="en-US" sz="2400" b="0" i="0" u="none" strike="noStrike" cap="none" dirty="0">
                 <a:solidFill>
                   <a:schemeClr val="dk1"/>
                 </a:solidFill>
@@ -24755,7 +24810,7 @@
               </a:rPr>
               <a:t>’ if 3D.  </a:t>
             </a:r>
-            <a:endParaRPr sz="2400" b="0" i="0" u="none" strike="noStrike" cap="none">
+            <a:endParaRPr sz="2400" b="0" i="0" u="none" strike="noStrike" cap="none" dirty="0">
               <a:solidFill>
                 <a:schemeClr val="dk1"/>
               </a:solidFill>
@@ -24781,14 +24836,30 @@
               <a:buChar char="●"/>
             </a:pPr>
             <a:r>
-              <a:rPr lang="en-US" sz="2400">
+              <a:rPr lang="en-US" sz="2400" dirty="0">
                 <a:solidFill>
                   <a:srgbClr val="FF0000"/>
                 </a:solidFill>
               </a:rPr>
-              <a:t>Note: For new ibamr install in 2D, use {dX_0,dX_1}</a:t>
-            </a:r>
-            <a:endParaRPr sz="2400" b="0" i="0" u="none" strike="noStrike" cap="none">
+              <a:t>Note: For new </a:t>
+            </a:r>
+            <a:r>
+              <a:rPr lang="en-US" sz="2400" dirty="0" err="1">
+                <a:solidFill>
+                  <a:srgbClr val="FF0000"/>
+                </a:solidFill>
+              </a:rPr>
+              <a:t>ibamr</a:t>
+            </a:r>
+            <a:r>
+              <a:rPr lang="en-US" sz="2400" dirty="0">
+                <a:solidFill>
+                  <a:srgbClr val="FF0000"/>
+                </a:solidFill>
+              </a:rPr>
+              <a:t> install in 2D, use {dX_0,dX_1}</a:t>
+            </a:r>
+            <a:endParaRPr sz="2400" b="0" i="0" u="none" strike="noStrike" cap="none" dirty="0">
               <a:solidFill>
                 <a:srgbClr val="FF0000"/>
               </a:solidFill>
@@ -24813,7 +24884,7 @@
               <a:buFont typeface="Calibri"/>
               <a:buNone/>
             </a:pPr>
-            <a:endParaRPr sz="2400" b="0" i="0" u="none" strike="noStrike" cap="none">
+            <a:endParaRPr sz="2400" b="0" i="0" u="none" strike="noStrike" cap="none" dirty="0">
               <a:solidFill>
                 <a:schemeClr val="dk1"/>
               </a:solidFill>
@@ -24838,7 +24909,7 @@
               <a:buFont typeface="Calibri"/>
               <a:buNone/>
             </a:pPr>
-            <a:endParaRPr sz="2400" b="0" i="0" u="none" strike="noStrike" cap="none">
+            <a:endParaRPr sz="2400" b="0" i="0" u="none" strike="noStrike" cap="none" dirty="0">
               <a:solidFill>
                 <a:schemeClr val="dk1"/>
               </a:solidFill>
@@ -24863,7 +24934,7 @@
               <a:buFont typeface="Calibri"/>
               <a:buNone/>
             </a:pPr>
-            <a:endParaRPr sz="2400" b="0" i="0" u="none" strike="noStrike" cap="none">
+            <a:endParaRPr sz="2400" b="0" i="0" u="none" strike="noStrike" cap="none" dirty="0">
               <a:solidFill>
                 <a:schemeClr val="dk1"/>
               </a:solidFill>
@@ -24888,7 +24959,7 @@
               <a:buFont typeface="Calibri"/>
               <a:buNone/>
             </a:pPr>
-            <a:endParaRPr sz="2400" b="0" i="0" u="none" strike="noStrike" cap="none">
+            <a:endParaRPr sz="2400" b="0" i="0" u="none" strike="noStrike" cap="none" dirty="0">
               <a:solidFill>
                 <a:schemeClr val="dk1"/>
               </a:solidFill>
@@ -24913,7 +24984,7 @@
               <a:buFont typeface="Calibri"/>
               <a:buNone/>
             </a:pPr>
-            <a:endParaRPr sz="2400"/>
+            <a:endParaRPr sz="2400" dirty="0"/>
           </a:p>
           <a:p>
             <a:pPr marL="342900" marR="0" lvl="0" indent="-222250" algn="l" rtl="0">
@@ -24930,7 +25001,7 @@
               <a:buFont typeface="Calibri"/>
               <a:buNone/>
             </a:pPr>
-            <a:endParaRPr sz="2400"/>
+            <a:endParaRPr sz="2400" dirty="0"/>
           </a:p>
           <a:p>
             <a:pPr marL="342900" marR="0" lvl="0" indent="-222250" algn="l" rtl="0">
@@ -24947,7 +25018,7 @@
               <a:buFont typeface="Calibri"/>
               <a:buNone/>
             </a:pPr>
-            <a:endParaRPr sz="2400"/>
+            <a:endParaRPr sz="2400" dirty="0"/>
           </a:p>
           <a:p>
             <a:pPr marL="342900" marR="0" lvl="0" indent="-374650" algn="l" rtl="0">
@@ -24965,7 +25036,7 @@
               <a:buChar char="●"/>
             </a:pPr>
             <a:r>
-              <a:rPr lang="en-US" sz="2400" b="0" i="0" u="none" strike="noStrike" cap="none">
+              <a:rPr lang="en-US" sz="2400" b="0" i="0" u="none" strike="noStrike" cap="none" dirty="0">
                 <a:solidFill>
                   <a:schemeClr val="dk1"/>
                 </a:solidFill>
@@ -24976,7 +25047,7 @@
               </a:rPr>
               <a:t>At this point I would save this variable as an XML file because you will need to do this every time. Hit ‘Apply’ on the ‘Expressions’ window and close it.</a:t>
             </a:r>
-            <a:endParaRPr sz="2400" b="0" i="0" u="none" strike="noStrike" cap="none">
+            <a:endParaRPr sz="2400" b="0" i="0" u="none" strike="noStrike" cap="none" dirty="0">
               <a:solidFill>
                 <a:schemeClr val="dk1"/>
               </a:solidFill>
@@ -25085,7 +25156,7 @@
               <a:buChar char="●"/>
             </a:pPr>
             <a:r>
-              <a:rPr lang="en-US" sz="2400" b="0" i="0" u="none" strike="noStrike" cap="none">
+              <a:rPr lang="en-US" sz="2400" b="0" i="0" u="none" strike="noStrike" cap="none" dirty="0">
                 <a:solidFill>
                   <a:schemeClr val="dk1"/>
                 </a:solidFill>
@@ -25094,9 +25165,33 @@
                 <a:cs typeface="Calibri"/>
                 <a:sym typeface="Calibri"/>
               </a:rPr>
-              <a:t>Now change the Displacement variable option to Vectors&gt;dX. Hit Apply and close the menu. This allows changes from the reference configuration.</a:t>
-            </a:r>
-            <a:endParaRPr sz="2400" b="0" i="0" u="none" strike="noStrike" cap="none">
+              <a:t>Now change the Displacement variable option to Vectors&gt;</a:t>
+            </a:r>
+            <a:r>
+              <a:rPr lang="en-US" sz="2400" b="0" i="0" u="none" strike="noStrike" cap="none" dirty="0" err="1">
+                <a:solidFill>
+                  <a:schemeClr val="dk1"/>
+                </a:solidFill>
+                <a:latin typeface="Calibri"/>
+                <a:ea typeface="Calibri"/>
+                <a:cs typeface="Calibri"/>
+                <a:sym typeface="Calibri"/>
+              </a:rPr>
+              <a:t>dX</a:t>
+            </a:r>
+            <a:r>
+              <a:rPr lang="en-US" sz="2400" b="0" i="0" u="none" strike="noStrike" cap="none" dirty="0">
+                <a:solidFill>
+                  <a:schemeClr val="dk1"/>
+                </a:solidFill>
+                <a:latin typeface="Calibri"/>
+                <a:ea typeface="Calibri"/>
+                <a:cs typeface="Calibri"/>
+                <a:sym typeface="Calibri"/>
+              </a:rPr>
+              <a:t>. Hit Apply and close the menu. This allows changes from the reference configuration.</a:t>
+            </a:r>
+            <a:endParaRPr sz="2400" b="0" i="0" u="none" strike="noStrike" cap="none" dirty="0">
               <a:solidFill>
                 <a:schemeClr val="dk1"/>
               </a:solidFill>
@@ -25122,7 +25217,7 @@
               <a:buChar char="●"/>
             </a:pPr>
             <a:r>
-              <a:rPr lang="en-US" sz="2400" b="0" i="0" u="none" strike="noStrike" cap="none">
+              <a:rPr lang="en-US" sz="2400" b="0" i="0" u="none" strike="noStrike" cap="none" dirty="0">
                 <a:solidFill>
                   <a:schemeClr val="dk1"/>
                 </a:solidFill>
@@ -25133,7 +25228,7 @@
               </a:rPr>
               <a:t>Add whatever other variable you want (for instance Omega)</a:t>
             </a:r>
-            <a:endParaRPr sz="2400" b="0" i="0" u="none" strike="noStrike" cap="none">
+            <a:endParaRPr sz="2400" b="0" i="0" u="none" strike="noStrike" cap="none" dirty="0">
               <a:solidFill>
                 <a:schemeClr val="dk1"/>
               </a:solidFill>
@@ -25159,10 +25254,18 @@
               <a:buChar char="●"/>
             </a:pPr>
             <a:r>
-              <a:rPr lang="en-US" sz="2400"/>
-              <a:t>You may not need to do the steps below with new ibamr module (if you displace using {dX_0, dX_1}).</a:t>
-            </a:r>
-            <a:endParaRPr sz="2400"/>
+              <a:rPr lang="en-US" sz="2400" dirty="0"/>
+              <a:t>You may not need to do the steps below with new </a:t>
+            </a:r>
+            <a:r>
+              <a:rPr lang="en-US" sz="2400" dirty="0" err="1"/>
+              <a:t>ibamr</a:t>
+            </a:r>
+            <a:r>
+              <a:rPr lang="en-US" sz="2400" dirty="0"/>
+              <a:t> module (if you displace using {dX_0, dX_1}).</a:t>
+            </a:r>
+            <a:endParaRPr sz="2400" dirty="0"/>
           </a:p>
           <a:p>
             <a:pPr marL="742950" marR="0" lvl="1" indent="-304800" algn="l" rtl="0">
@@ -25180,7 +25283,7 @@
               <a:buChar char="●"/>
             </a:pPr>
             <a:r>
-              <a:rPr lang="en-US" sz="2000" b="0" i="0" u="none" strike="noStrike" cap="none">
+              <a:rPr lang="en-US" sz="2000" b="0" i="0" u="none" strike="noStrike" cap="none" dirty="0">
                 <a:solidFill>
                   <a:schemeClr val="dk1"/>
                 </a:solidFill>
@@ -25191,7 +25294,7 @@
               </a:rPr>
               <a:t>Remember, the Finite Element mesh is in 3D and the Eulerian variables are all in 2D so we will need to project the mesh to 2D.</a:t>
             </a:r>
-            <a:endParaRPr sz="2000" b="0" i="0" u="none" strike="noStrike" cap="none">
+            <a:endParaRPr sz="2000" b="0" i="0" u="none" strike="noStrike" cap="none" dirty="0">
               <a:solidFill>
                 <a:schemeClr val="dk1"/>
               </a:solidFill>
@@ -25217,7 +25320,7 @@
               <a:buChar char="●"/>
             </a:pPr>
             <a:r>
-              <a:rPr lang="en-US" sz="2000" b="0" i="0" u="none" strike="noStrike" cap="none">
+              <a:rPr lang="en-US" sz="2000" b="0" i="0" u="none" strike="noStrike" cap="none" dirty="0">
                 <a:solidFill>
                   <a:schemeClr val="dk1"/>
                 </a:solidFill>
@@ -25228,7 +25331,7 @@
               </a:rPr>
               <a:t>Highlight the mesh and click Operators&gt;Transforms&gt;Project </a:t>
             </a:r>
-            <a:endParaRPr sz="2000" b="0" i="0" u="none" strike="noStrike" cap="none">
+            <a:endParaRPr sz="2000" b="0" i="0" u="none" strike="noStrike" cap="none" dirty="0">
               <a:solidFill>
                 <a:schemeClr val="dk1"/>
               </a:solidFill>
@@ -25254,7 +25357,7 @@
               <a:buChar char="●"/>
             </a:pPr>
             <a:r>
-              <a:rPr lang="en-US" sz="2000" b="0" i="0" u="none" strike="noStrike" cap="none">
+              <a:rPr lang="en-US" sz="2000" b="0" i="0" u="none" strike="noStrike" cap="none" dirty="0">
                 <a:solidFill>
                   <a:schemeClr val="dk1"/>
                 </a:solidFill>
@@ -25263,9 +25366,33 @@
                 <a:cs typeface="Calibri"/>
                 <a:sym typeface="Calibri"/>
               </a:rPr>
-              <a:t>The default projections should be for the xy-plane(which is what we want), but you can change this if you want if you double click Project in the collapsed menu from the Mesh Object.</a:t>
-            </a:r>
-            <a:endParaRPr sz="2000" b="0" i="0" u="none" strike="noStrike" cap="none">
+              <a:t>The default projections should be for the </a:t>
+            </a:r>
+            <a:r>
+              <a:rPr lang="en-US" sz="2000" b="0" i="0" u="none" strike="noStrike" cap="none" dirty="0" err="1">
+                <a:solidFill>
+                  <a:schemeClr val="dk1"/>
+                </a:solidFill>
+                <a:latin typeface="Calibri"/>
+                <a:ea typeface="Calibri"/>
+                <a:cs typeface="Calibri"/>
+                <a:sym typeface="Calibri"/>
+              </a:rPr>
+              <a:t>xy</a:t>
+            </a:r>
+            <a:r>
+              <a:rPr lang="en-US" sz="2000" b="0" i="0" u="none" strike="noStrike" cap="none" dirty="0">
+                <a:solidFill>
+                  <a:schemeClr val="dk1"/>
+                </a:solidFill>
+                <a:latin typeface="Calibri"/>
+                <a:ea typeface="Calibri"/>
+                <a:cs typeface="Calibri"/>
+                <a:sym typeface="Calibri"/>
+              </a:rPr>
+              <a:t>-plane(which is what we want), but you can change this if you want if you double click Project in the collapsed menu from the Mesh Object.</a:t>
+            </a:r>
+            <a:endParaRPr sz="2000" b="0" i="0" u="none" strike="noStrike" cap="none" dirty="0">
               <a:solidFill>
                 <a:schemeClr val="dk1"/>
               </a:solidFill>
@@ -25291,7 +25418,7 @@
               <a:buChar char="●"/>
             </a:pPr>
             <a:r>
-              <a:rPr lang="en-US" sz="2400" b="0" i="0" u="none" strike="noStrike" cap="none">
+              <a:rPr lang="en-US" sz="2400" b="0" i="0" u="none" strike="noStrike" cap="none" dirty="0">
                 <a:solidFill>
                   <a:schemeClr val="dk1"/>
                 </a:solidFill>
@@ -25302,7 +25429,7 @@
               </a:rPr>
               <a:t>Draw!</a:t>
             </a:r>
-            <a:endParaRPr sz="2400" b="0" i="0" u="none" strike="noStrike" cap="none">
+            <a:endParaRPr sz="2400" b="0" i="0" u="none" strike="noStrike" cap="none" dirty="0">
               <a:solidFill>
                 <a:schemeClr val="dk1"/>
               </a:solidFill>
@@ -25878,7 +26005,15 @@
             </a:r>
             <a:r>
               <a:rPr lang="en-US" sz="1800" dirty="0"/>
-              <a:t>, Trellis, Bolt) and read it in your </a:t>
+              <a:t>, </a:t>
+            </a:r>
+            <a:r>
+              <a:rPr lang="en-US" sz="1800" dirty="0" err="1"/>
+              <a:t>Salome,Trellis</a:t>
+            </a:r>
+            <a:r>
+              <a:rPr lang="en-US" sz="1800" dirty="0"/>
+              <a:t>, Bolt) and read it in your </a:t>
             </a:r>
             <a:r>
               <a:rPr lang="en-US" sz="1800" dirty="0" err="1"/>
@@ -26041,9 +26176,12 @@
               <a:rPr lang="en-US" sz="1800" dirty="0">
                 <a:hlinkClick r:id="rId3"/>
               </a:rPr>
-              <a:t>http://homepages.engineering.auckland.ac.nz/~pkel015/SolidMechanicsBooks/Part_III/</a:t>
-            </a:r>
-            <a:endParaRPr sz="1800" dirty="0"/>
+              <a:t>https://humanrobotinteraction.santannapisa.it/NonLinearElasticity/download/OtherMaterial/Solids-2015.pdf</a:t>
+            </a:r>
+            <a:r>
+              <a:rPr lang="en-US" sz="1800" dirty="0"/>
+              <a:t> </a:t>
+            </a:r>
           </a:p>
           <a:p>
             <a:pPr marL="0" lvl="0" indent="0">
@@ -26051,9 +26189,8 @@
             </a:pPr>
             <a:r>
               <a:rPr lang="en-US" sz="1800" dirty="0"/>
-              <a:t>For PK1, see 3.5 Stress Measures for Large Deformations</a:t>
-            </a:r>
-            <a:endParaRPr sz="1800" dirty="0"/>
+              <a:t>Look for Stress Measures for Large Deformations</a:t>
+            </a:r>
           </a:p>
         </p:txBody>
       </p:sp>
@@ -27039,6 +27176,128 @@
                 <a:cs typeface="Courier New"/>
                 <a:sym typeface="Courier New"/>
               </a:rPr>
+              <a:t>IBAMR_SRC_DIR = /groups/lauram9/ib10/</a:t>
+            </a:r>
+            <a:r>
+              <a:rPr lang="en-US" sz="1200" dirty="0" err="1">
+                <a:latin typeface="Courier New"/>
+                <a:ea typeface="Courier New"/>
+                <a:cs typeface="Courier New"/>
+                <a:sym typeface="Courier New"/>
+              </a:rPr>
+              <a:t>ibamr</a:t>
+            </a:r>
+            <a:r>
+              <a:rPr lang="en-US" sz="1200" dirty="0">
+                <a:latin typeface="Courier New"/>
+                <a:ea typeface="Courier New"/>
+                <a:cs typeface="Courier New"/>
+                <a:sym typeface="Courier New"/>
+              </a:rPr>
+              <a:t>/IBAMR </a:t>
+            </a:r>
+          </a:p>
+          <a:p>
+            <a:pPr marL="0" lvl="0" indent="0" algn="l" rtl="0">
+              <a:spcBef>
+                <a:spcPts val="600"/>
+              </a:spcBef>
+              <a:spcAft>
+                <a:spcPts val="0"/>
+              </a:spcAft>
+              <a:buClr>
+                <a:schemeClr val="dk1"/>
+              </a:buClr>
+              <a:buSzPts val="1100"/>
+              <a:buFont typeface="Arial"/>
+              <a:buNone/>
+            </a:pPr>
+            <a:r>
+              <a:rPr lang="en-US" sz="1200" dirty="0">
+                <a:latin typeface="Courier New"/>
+                <a:ea typeface="Courier New"/>
+                <a:cs typeface="Courier New"/>
+                <a:sym typeface="Courier New"/>
+              </a:rPr>
+              <a:t>IBAMR_BUILD_DIR = /groups/lauram9/ib10/</a:t>
+            </a:r>
+            <a:r>
+              <a:rPr lang="en-US" sz="1200" dirty="0" err="1">
+                <a:latin typeface="Courier New"/>
+                <a:ea typeface="Courier New"/>
+                <a:cs typeface="Courier New"/>
+                <a:sym typeface="Courier New"/>
+              </a:rPr>
+              <a:t>ibamr</a:t>
+            </a:r>
+            <a:r>
+              <a:rPr lang="en-US" sz="1200" dirty="0">
+                <a:latin typeface="Courier New"/>
+                <a:ea typeface="Courier New"/>
+                <a:cs typeface="Courier New"/>
+                <a:sym typeface="Courier New"/>
+              </a:rPr>
+              <a:t>/</a:t>
+            </a:r>
+            <a:r>
+              <a:rPr lang="en-US" sz="1200" dirty="0" err="1">
+                <a:latin typeface="Courier New"/>
+                <a:ea typeface="Courier New"/>
+                <a:cs typeface="Courier New"/>
+                <a:sym typeface="Courier New"/>
+              </a:rPr>
+              <a:t>ibamr</a:t>
+            </a:r>
+            <a:r>
+              <a:rPr lang="en-US" sz="1200" dirty="0">
+                <a:latin typeface="Courier New"/>
+                <a:ea typeface="Courier New"/>
+                <a:cs typeface="Courier New"/>
+                <a:sym typeface="Courier New"/>
+              </a:rPr>
+              <a:t>-</a:t>
+            </a:r>
+            <a:r>
+              <a:rPr lang="en-US" sz="1200" dirty="0" err="1">
+                <a:latin typeface="Courier New"/>
+                <a:ea typeface="Courier New"/>
+                <a:cs typeface="Courier New"/>
+                <a:sym typeface="Courier New"/>
+              </a:rPr>
+              <a:t>objs</a:t>
+            </a:r>
+            <a:r>
+              <a:rPr lang="en-US" sz="1200" dirty="0">
+                <a:latin typeface="Courier New"/>
+                <a:ea typeface="Courier New"/>
+                <a:cs typeface="Courier New"/>
+                <a:sym typeface="Courier New"/>
+              </a:rPr>
+              <a:t>-opt</a:t>
+            </a:r>
+          </a:p>
+          <a:p>
+            <a:pPr marL="0" lvl="0" indent="0" algn="l" rtl="0">
+              <a:spcBef>
+                <a:spcPts val="600"/>
+              </a:spcBef>
+              <a:spcAft>
+                <a:spcPts val="0"/>
+              </a:spcAft>
+              <a:buClr>
+                <a:schemeClr val="dk1"/>
+              </a:buClr>
+              <a:buSzPts val="1100"/>
+              <a:buFont typeface="Arial"/>
+              <a:buNone/>
+            </a:pPr>
+            <a:r>
+              <a:rPr lang="en-US" sz="1200" dirty="0">
+                <a:latin typeface="Courier New"/>
+                <a:ea typeface="Courier New"/>
+                <a:cs typeface="Courier New"/>
+                <a:sym typeface="Courier New"/>
+              </a:rPr>
               <a:t>LIBSNEW = $(LIBS) -</a:t>
             </a:r>
             <a:r>
@@ -27075,241 +27334,8 @@
                 <a:cs typeface="Courier New"/>
                 <a:sym typeface="Courier New"/>
               </a:rPr>
-              <a:t> </a:t>
-            </a:r>
-            <a:endParaRPr sz="1200" dirty="0">
-              <a:latin typeface="Courier New"/>
-              <a:ea typeface="Courier New"/>
-              <a:cs typeface="Courier New"/>
-              <a:sym typeface="Courier New"/>
-            </a:endParaRPr>
-          </a:p>
-          <a:p>
-            <a:pPr marL="0" lvl="0" indent="0">
-              <a:buSzPts val="1100"/>
-              <a:buNone/>
-            </a:pPr>
-            <a:r>
-              <a:rPr lang="en-US" sz="1200" dirty="0">
-                <a:latin typeface="Courier New"/>
-                <a:ea typeface="Courier New"/>
-                <a:cs typeface="Courier New"/>
-                <a:sym typeface="Courier New"/>
-              </a:rPr>
-              <a:t>IBAMR_SRC_DIR = /</a:t>
-            </a:r>
-            <a:r>
-              <a:rPr lang="en-US" sz="1200" dirty="0" err="1">
-                <a:latin typeface="Courier New"/>
-                <a:ea typeface="Courier New"/>
-                <a:cs typeface="Courier New"/>
-                <a:sym typeface="Courier New"/>
-              </a:rPr>
-              <a:t>nas</a:t>
-            </a:r>
-            <a:r>
-              <a:rPr lang="en-US" sz="1200" dirty="0">
-                <a:latin typeface="Courier New"/>
-                <a:ea typeface="Courier New"/>
-                <a:cs typeface="Courier New"/>
-                <a:sym typeface="Courier New"/>
-              </a:rPr>
-              <a:t>/longleaf/apps-dogwood/</a:t>
-            </a:r>
-            <a:r>
-              <a:rPr lang="en-US" sz="1200" dirty="0" err="1">
-                <a:latin typeface="Courier New"/>
-                <a:ea typeface="Courier New"/>
-                <a:cs typeface="Courier New"/>
-                <a:sym typeface="Courier New"/>
-              </a:rPr>
-              <a:t>ibamr</a:t>
-            </a:r>
-            <a:r>
-              <a:rPr lang="en-US" sz="1200" dirty="0">
-                <a:latin typeface="Courier New"/>
-                <a:ea typeface="Courier New"/>
-                <a:cs typeface="Courier New"/>
-                <a:sym typeface="Courier New"/>
-              </a:rPr>
-              <a:t>/2018-03/</a:t>
-            </a:r>
-            <a:r>
-              <a:rPr lang="en-US" sz="1200" dirty="0" err="1">
-                <a:latin typeface="Courier New"/>
-                <a:ea typeface="Courier New"/>
-                <a:cs typeface="Courier New"/>
-                <a:sym typeface="Courier New"/>
-              </a:rPr>
-              <a:t>sfw</a:t>
-            </a:r>
-            <a:r>
-              <a:rPr lang="en-US" sz="1200" dirty="0">
-                <a:latin typeface="Courier New"/>
-                <a:ea typeface="Courier New"/>
-                <a:cs typeface="Courier New"/>
-                <a:sym typeface="Courier New"/>
-              </a:rPr>
-              <a:t>/</a:t>
-            </a:r>
-            <a:r>
-              <a:rPr lang="en-US" sz="1200" dirty="0" err="1">
-                <a:latin typeface="Courier New"/>
-                <a:ea typeface="Courier New"/>
-                <a:cs typeface="Courier New"/>
-                <a:sym typeface="Courier New"/>
-              </a:rPr>
-              <a:t>ibamr</a:t>
-            </a:r>
-            <a:r>
-              <a:rPr lang="en-US" sz="1200" dirty="0">
-                <a:latin typeface="Courier New"/>
-                <a:ea typeface="Courier New"/>
-                <a:cs typeface="Courier New"/>
-                <a:sym typeface="Courier New"/>
-              </a:rPr>
-              <a:t>/IBAMR</a:t>
-            </a:r>
-          </a:p>
-          <a:p>
-            <a:pPr marL="0" lvl="0" indent="0">
-              <a:buSzPts val="1100"/>
-              <a:buNone/>
-            </a:pPr>
-            <a:r>
-              <a:rPr lang="en-US" sz="1200" dirty="0">
-                <a:latin typeface="Courier New"/>
-                <a:ea typeface="Courier New"/>
-                <a:cs typeface="Courier New"/>
-                <a:sym typeface="Courier New"/>
-              </a:rPr>
-              <a:t>IBAMR_BUILD_DIR  =/</a:t>
-            </a:r>
-            <a:r>
-              <a:rPr lang="en-US" sz="1200" dirty="0" err="1">
-                <a:latin typeface="Courier New"/>
-                <a:ea typeface="Courier New"/>
-                <a:cs typeface="Courier New"/>
-                <a:sym typeface="Courier New"/>
-              </a:rPr>
-              <a:t>nas</a:t>
-            </a:r>
-            <a:r>
-              <a:rPr lang="en-US" sz="1200" dirty="0">
-                <a:latin typeface="Courier New"/>
-                <a:ea typeface="Courier New"/>
-                <a:cs typeface="Courier New"/>
-                <a:sym typeface="Courier New"/>
-              </a:rPr>
-              <a:t>/longleaf/apps-dogwood/</a:t>
-            </a:r>
-            <a:r>
-              <a:rPr lang="en-US" sz="1200" dirty="0" err="1">
-                <a:latin typeface="Courier New"/>
-                <a:ea typeface="Courier New"/>
-                <a:cs typeface="Courier New"/>
-                <a:sym typeface="Courier New"/>
-              </a:rPr>
-              <a:t>ibamr</a:t>
-            </a:r>
-            <a:r>
-              <a:rPr lang="en-US" sz="1200" dirty="0">
-                <a:latin typeface="Courier New"/>
-                <a:ea typeface="Courier New"/>
-                <a:cs typeface="Courier New"/>
-                <a:sym typeface="Courier New"/>
-              </a:rPr>
-              <a:t>/2018-03/</a:t>
-            </a:r>
-            <a:r>
-              <a:rPr lang="en-US" sz="1200" dirty="0" err="1">
-                <a:latin typeface="Courier New"/>
-                <a:ea typeface="Courier New"/>
-                <a:cs typeface="Courier New"/>
-                <a:sym typeface="Courier New"/>
-              </a:rPr>
-              <a:t>sfw</a:t>
-            </a:r>
-            <a:r>
-              <a:rPr lang="en-US" sz="1200" dirty="0">
-                <a:latin typeface="Courier New"/>
-                <a:ea typeface="Courier New"/>
-                <a:cs typeface="Courier New"/>
-                <a:sym typeface="Courier New"/>
-              </a:rPr>
-              <a:t>/</a:t>
-            </a:r>
-            <a:r>
-              <a:rPr lang="en-US" sz="1200" dirty="0" err="1">
-                <a:latin typeface="Courier New"/>
-                <a:ea typeface="Courier New"/>
-                <a:cs typeface="Courier New"/>
-                <a:sym typeface="Courier New"/>
-              </a:rPr>
-              <a:t>ibamr</a:t>
-            </a:r>
-            <a:r>
-              <a:rPr lang="en-US" sz="1200" dirty="0">
-                <a:latin typeface="Courier New"/>
-                <a:ea typeface="Courier New"/>
-                <a:cs typeface="Courier New"/>
-                <a:sym typeface="Courier New"/>
-              </a:rPr>
-              <a:t>/</a:t>
-            </a:r>
-            <a:r>
-              <a:rPr lang="en-US" sz="1200" dirty="0" err="1">
-                <a:latin typeface="Courier New"/>
-                <a:ea typeface="Courier New"/>
-                <a:cs typeface="Courier New"/>
-                <a:sym typeface="Courier New"/>
-              </a:rPr>
-              <a:t>ibamr</a:t>
-            </a:r>
-            <a:r>
-              <a:rPr lang="en-US" sz="1200" dirty="0">
-                <a:latin typeface="Courier New"/>
-                <a:ea typeface="Courier New"/>
-                <a:cs typeface="Courier New"/>
-                <a:sym typeface="Courier New"/>
-              </a:rPr>
-              <a:t>-</a:t>
-            </a:r>
-            <a:r>
-              <a:rPr lang="en-US" sz="1200" dirty="0" err="1">
-                <a:latin typeface="Courier New"/>
-                <a:ea typeface="Courier New"/>
-                <a:cs typeface="Courier New"/>
-                <a:sym typeface="Courier New"/>
-              </a:rPr>
-              <a:t>objs</a:t>
-            </a:r>
-            <a:r>
-              <a:rPr lang="en-US" sz="1200" dirty="0">
-                <a:latin typeface="Courier New"/>
-                <a:ea typeface="Courier New"/>
-                <a:cs typeface="Courier New"/>
-                <a:sym typeface="Courier New"/>
-              </a:rPr>
-              <a:t>-opt</a:t>
-            </a:r>
-            <a:endParaRPr sz="1200" dirty="0">
-              <a:latin typeface="Courier New"/>
-              <a:ea typeface="Courier New"/>
-              <a:cs typeface="Courier New"/>
-              <a:sym typeface="Courier New"/>
-            </a:endParaRPr>
-          </a:p>
-          <a:p>
-            <a:pPr marL="0" lvl="0" indent="0" algn="l" rtl="0">
-              <a:spcBef>
-                <a:spcPts val="600"/>
-              </a:spcBef>
-              <a:spcAft>
-                <a:spcPts val="0"/>
-              </a:spcAft>
-              <a:buNone/>
-            </a:pPr>
+              <a:t> </a:t>
+            </a:r>
             <a:endParaRPr lang="en-US" sz="1400" dirty="0"/>
           </a:p>
           <a:p>
@@ -27893,7 +27919,7 @@
             </a:r>
             <a:r>
               <a:rPr lang="en-US" sz="1600" dirty="0"/>
-              <a:t>(1)=s(1)+.5*time; 	// s(1) is the x-coordinate of the reference configuration. </a:t>
+              <a:t>(1)=s(1)+.5*time; 	// s(1) is the y-coordinate of the reference configuration. </a:t>
             </a:r>
             <a:endParaRPr sz="1600" dirty="0"/>
           </a:p>

</xml_diff>